<commit_message>
Word on PPP, collected pictures
</commit_message>
<xml_diff>
--- a/Documentation/Hammer Man.pptx
+++ b/Documentation/Hammer Man.pptx
@@ -15,9 +15,10 @@
     <p:sldId id="261" r:id="rId9"/>
     <p:sldId id="270" r:id="rId10"/>
     <p:sldId id="267" r:id="rId11"/>
-    <p:sldId id="266" r:id="rId12"/>
-    <p:sldId id="265" r:id="rId13"/>
-    <p:sldId id="257" r:id="rId14"/>
+    <p:sldId id="271" r:id="rId12"/>
+    <p:sldId id="266" r:id="rId13"/>
+    <p:sldId id="265" r:id="rId14"/>
+    <p:sldId id="257" r:id="rId15"/>
   </p:sldIdLst>
   <p:sldSz cx="9144000" cy="6858000" type="screen4x3"/>
   <p:notesSz cx="6858000" cy="9144000"/>
@@ -3244,6 +3245,13 @@
         </dgm:presLayoutVars>
       </dgm:prSet>
       <dgm:spPr/>
+      <dgm:t>
+        <a:bodyPr/>
+        <a:lstStyle/>
+        <a:p>
+          <a:endParaRPr lang="de-DE"/>
+        </a:p>
+      </dgm:t>
     </dgm:pt>
     <dgm:pt modelId="{354449BB-0B46-4C11-9134-8DB5FB2F99C6}" type="pres">
       <dgm:prSet presAssocID="{740EF86F-B076-4C59-AE42-D4D80FC39A80}" presName="node" presStyleLbl="node1" presStyleIdx="0" presStyleCnt="3">
@@ -3252,6 +3260,13 @@
         </dgm:presLayoutVars>
       </dgm:prSet>
       <dgm:spPr/>
+      <dgm:t>
+        <a:bodyPr/>
+        <a:lstStyle/>
+        <a:p>
+          <a:endParaRPr lang="de-DE"/>
+        </a:p>
+      </dgm:t>
     </dgm:pt>
     <dgm:pt modelId="{494CCD5B-D3DD-4D37-B19B-CC9742BD6FFC}" type="pres">
       <dgm:prSet presAssocID="{740EF86F-B076-4C59-AE42-D4D80FC39A80}" presName="spNode" presStyleCnt="0"/>
@@ -3260,6 +3275,13 @@
     <dgm:pt modelId="{C717F32B-C9D9-4405-87E8-96F537F320D8}" type="pres">
       <dgm:prSet presAssocID="{C1CAF616-E0AF-4AA9-A052-1D325D32B2DB}" presName="sibTrans" presStyleLbl="sibTrans1D1" presStyleIdx="0" presStyleCnt="3"/>
       <dgm:spPr/>
+      <dgm:t>
+        <a:bodyPr/>
+        <a:lstStyle/>
+        <a:p>
+          <a:endParaRPr lang="de-DE"/>
+        </a:p>
+      </dgm:t>
     </dgm:pt>
     <dgm:pt modelId="{4529D1E9-320E-48D5-BC65-8DB29EBF18BF}" type="pres">
       <dgm:prSet presAssocID="{57E6587E-A19D-4B62-88D4-67000147672C}" presName="node" presStyleLbl="node1" presStyleIdx="1" presStyleCnt="3">
@@ -3283,6 +3305,13 @@
     <dgm:pt modelId="{D92A7E3E-0AF7-4958-A3AE-A24DD2F922A8}" type="pres">
       <dgm:prSet presAssocID="{89476B55-F10A-4780-8D37-2A0B55258904}" presName="sibTrans" presStyleLbl="sibTrans1D1" presStyleIdx="1" presStyleCnt="3"/>
       <dgm:spPr/>
+      <dgm:t>
+        <a:bodyPr/>
+        <a:lstStyle/>
+        <a:p>
+          <a:endParaRPr lang="de-DE"/>
+        </a:p>
+      </dgm:t>
     </dgm:pt>
     <dgm:pt modelId="{572ADCD4-3005-40F1-BC9E-A1BF3103D95E}" type="pres">
       <dgm:prSet presAssocID="{95B844A8-6B7C-4F29-A398-72201D964135}" presName="node" presStyleLbl="node1" presStyleIdx="2" presStyleCnt="3">
@@ -3306,19 +3335,26 @@
     <dgm:pt modelId="{C03B017B-D526-4168-B33C-86F58F8D2514}" type="pres">
       <dgm:prSet presAssocID="{8B8A93D2-170F-40A9-946C-02EB0BEE0B33}" presName="sibTrans" presStyleLbl="sibTrans1D1" presStyleIdx="2" presStyleCnt="3"/>
       <dgm:spPr/>
+      <dgm:t>
+        <a:bodyPr/>
+        <a:lstStyle/>
+        <a:p>
+          <a:endParaRPr lang="de-DE"/>
+        </a:p>
+      </dgm:t>
     </dgm:pt>
   </dgm:ptLst>
   <dgm:cxnLst>
+    <dgm:cxn modelId="{C07DA67C-38EE-4EF0-8FE8-F5FD5E6E46AB}" srcId="{5342101B-1734-4053-B4AD-4B96492968E1}" destId="{95B844A8-6B7C-4F29-A398-72201D964135}" srcOrd="2" destOrd="0" parTransId="{A5AAAB0C-44E3-4DF0-B5E6-03213BF2D0CC}" sibTransId="{8B8A93D2-170F-40A9-946C-02EB0BEE0B33}"/>
+    <dgm:cxn modelId="{279D605E-E99C-42E3-9A71-B3CE3AAB6FEB}" srcId="{5342101B-1734-4053-B4AD-4B96492968E1}" destId="{57E6587E-A19D-4B62-88D4-67000147672C}" srcOrd="1" destOrd="0" parTransId="{2D3F9B4C-0A77-4FA6-8A41-CD0FC6190857}" sibTransId="{89476B55-F10A-4780-8D37-2A0B55258904}"/>
+    <dgm:cxn modelId="{58FD8AE5-BF07-41C6-A155-422819A51FFA}" type="presOf" srcId="{95B844A8-6B7C-4F29-A398-72201D964135}" destId="{572ADCD4-3005-40F1-BC9E-A1BF3103D95E}" srcOrd="0" destOrd="0" presId="urn:microsoft.com/office/officeart/2005/8/layout/cycle5"/>
+    <dgm:cxn modelId="{B6D57B28-2558-4D66-B7E8-05FB072148F5}" srcId="{5342101B-1734-4053-B4AD-4B96492968E1}" destId="{740EF86F-B076-4C59-AE42-D4D80FC39A80}" srcOrd="0" destOrd="0" parTransId="{842EBE08-0204-45A8-B8FD-D75CD0B7FAA3}" sibTransId="{C1CAF616-E0AF-4AA9-A052-1D325D32B2DB}"/>
+    <dgm:cxn modelId="{597FD176-2096-447D-914A-813740991E53}" type="presOf" srcId="{C1CAF616-E0AF-4AA9-A052-1D325D32B2DB}" destId="{C717F32B-C9D9-4405-87E8-96F537F320D8}" srcOrd="0" destOrd="0" presId="urn:microsoft.com/office/officeart/2005/8/layout/cycle5"/>
+    <dgm:cxn modelId="{1F367310-765F-4BFA-9B9C-ABF7B2599F9E}" type="presOf" srcId="{89476B55-F10A-4780-8D37-2A0B55258904}" destId="{D92A7E3E-0AF7-4958-A3AE-A24DD2F922A8}" srcOrd="0" destOrd="0" presId="urn:microsoft.com/office/officeart/2005/8/layout/cycle5"/>
+    <dgm:cxn modelId="{58146B81-AE4E-4CF6-907C-7207ED5E41B4}" type="presOf" srcId="{8B8A93D2-170F-40A9-946C-02EB0BEE0B33}" destId="{C03B017B-D526-4168-B33C-86F58F8D2514}" srcOrd="0" destOrd="0" presId="urn:microsoft.com/office/officeart/2005/8/layout/cycle5"/>
+    <dgm:cxn modelId="{92B58ABD-91BE-42C6-B04B-86560DB2122F}" type="presOf" srcId="{5342101B-1734-4053-B4AD-4B96492968E1}" destId="{AF51655B-2A03-4078-8076-316868FC4F7D}" srcOrd="0" destOrd="0" presId="urn:microsoft.com/office/officeart/2005/8/layout/cycle5"/>
+    <dgm:cxn modelId="{4381C918-24A7-44C8-91CC-E47ED2FFEE6B}" type="presOf" srcId="{740EF86F-B076-4C59-AE42-D4D80FC39A80}" destId="{354449BB-0B46-4C11-9134-8DB5FB2F99C6}" srcOrd="0" destOrd="0" presId="urn:microsoft.com/office/officeart/2005/8/layout/cycle5"/>
     <dgm:cxn modelId="{F6C055A3-6687-420E-ABE1-08EAFB24DBEE}" type="presOf" srcId="{57E6587E-A19D-4B62-88D4-67000147672C}" destId="{4529D1E9-320E-48D5-BC65-8DB29EBF18BF}" srcOrd="0" destOrd="0" presId="urn:microsoft.com/office/officeart/2005/8/layout/cycle5"/>
-    <dgm:cxn modelId="{1F367310-765F-4BFA-9B9C-ABF7B2599F9E}" type="presOf" srcId="{89476B55-F10A-4780-8D37-2A0B55258904}" destId="{D92A7E3E-0AF7-4958-A3AE-A24DD2F922A8}" srcOrd="0" destOrd="0" presId="urn:microsoft.com/office/officeart/2005/8/layout/cycle5"/>
-    <dgm:cxn modelId="{58FD8AE5-BF07-41C6-A155-422819A51FFA}" type="presOf" srcId="{95B844A8-6B7C-4F29-A398-72201D964135}" destId="{572ADCD4-3005-40F1-BC9E-A1BF3103D95E}" srcOrd="0" destOrd="0" presId="urn:microsoft.com/office/officeart/2005/8/layout/cycle5"/>
-    <dgm:cxn modelId="{C07DA67C-38EE-4EF0-8FE8-F5FD5E6E46AB}" srcId="{5342101B-1734-4053-B4AD-4B96492968E1}" destId="{95B844A8-6B7C-4F29-A398-72201D964135}" srcOrd="2" destOrd="0" parTransId="{A5AAAB0C-44E3-4DF0-B5E6-03213BF2D0CC}" sibTransId="{8B8A93D2-170F-40A9-946C-02EB0BEE0B33}"/>
-    <dgm:cxn modelId="{4381C918-24A7-44C8-91CC-E47ED2FFEE6B}" type="presOf" srcId="{740EF86F-B076-4C59-AE42-D4D80FC39A80}" destId="{354449BB-0B46-4C11-9134-8DB5FB2F99C6}" srcOrd="0" destOrd="0" presId="urn:microsoft.com/office/officeart/2005/8/layout/cycle5"/>
-    <dgm:cxn modelId="{92B58ABD-91BE-42C6-B04B-86560DB2122F}" type="presOf" srcId="{5342101B-1734-4053-B4AD-4B96492968E1}" destId="{AF51655B-2A03-4078-8076-316868FC4F7D}" srcOrd="0" destOrd="0" presId="urn:microsoft.com/office/officeart/2005/8/layout/cycle5"/>
-    <dgm:cxn modelId="{597FD176-2096-447D-914A-813740991E53}" type="presOf" srcId="{C1CAF616-E0AF-4AA9-A052-1D325D32B2DB}" destId="{C717F32B-C9D9-4405-87E8-96F537F320D8}" srcOrd="0" destOrd="0" presId="urn:microsoft.com/office/officeart/2005/8/layout/cycle5"/>
-    <dgm:cxn modelId="{58146B81-AE4E-4CF6-907C-7207ED5E41B4}" type="presOf" srcId="{8B8A93D2-170F-40A9-946C-02EB0BEE0B33}" destId="{C03B017B-D526-4168-B33C-86F58F8D2514}" srcOrd="0" destOrd="0" presId="urn:microsoft.com/office/officeart/2005/8/layout/cycle5"/>
-    <dgm:cxn modelId="{B6D57B28-2558-4D66-B7E8-05FB072148F5}" srcId="{5342101B-1734-4053-B4AD-4B96492968E1}" destId="{740EF86F-B076-4C59-AE42-D4D80FC39A80}" srcOrd="0" destOrd="0" parTransId="{842EBE08-0204-45A8-B8FD-D75CD0B7FAA3}" sibTransId="{C1CAF616-E0AF-4AA9-A052-1D325D32B2DB}"/>
-    <dgm:cxn modelId="{279D605E-E99C-42E3-9A71-B3CE3AAB6FEB}" srcId="{5342101B-1734-4053-B4AD-4B96492968E1}" destId="{57E6587E-A19D-4B62-88D4-67000147672C}" srcOrd="1" destOrd="0" parTransId="{2D3F9B4C-0A77-4FA6-8A41-CD0FC6190857}" sibTransId="{89476B55-F10A-4780-8D37-2A0B55258904}"/>
     <dgm:cxn modelId="{40242DA9-A7DA-4491-9C63-D5AB35FF195D}" type="presParOf" srcId="{AF51655B-2A03-4078-8076-316868FC4F7D}" destId="{354449BB-0B46-4C11-9134-8DB5FB2F99C6}" srcOrd="0" destOrd="0" presId="urn:microsoft.com/office/officeart/2005/8/layout/cycle5"/>
     <dgm:cxn modelId="{CCE55A20-6365-4AFA-99D7-E88E88B746BE}" type="presParOf" srcId="{AF51655B-2A03-4078-8076-316868FC4F7D}" destId="{494CCD5B-D3DD-4D37-B19B-CC9742BD6FFC}" srcOrd="1" destOrd="0" presId="urn:microsoft.com/office/officeart/2005/8/layout/cycle5"/>
     <dgm:cxn modelId="{A073D98A-5A97-47BD-A615-C2296A5C5C6C}" type="presParOf" srcId="{AF51655B-2A03-4078-8076-316868FC4F7D}" destId="{C717F32B-C9D9-4405-87E8-96F537F320D8}" srcOrd="2" destOrd="0" presId="urn:microsoft.com/office/officeart/2005/8/layout/cycle5"/>
@@ -3476,6 +3512,13 @@
         </dgm:presLayoutVars>
       </dgm:prSet>
       <dgm:spPr/>
+      <dgm:t>
+        <a:bodyPr/>
+        <a:lstStyle/>
+        <a:p>
+          <a:endParaRPr lang="de-DE"/>
+        </a:p>
+      </dgm:t>
     </dgm:pt>
     <dgm:pt modelId="{E9F05097-1B9E-4B8E-AF59-3EEC4B3947A4}" type="pres">
       <dgm:prSet presAssocID="{5591ADDC-9A24-438D-B29A-0ED83069F02A}" presName="node" presStyleLbl="node1" presStyleIdx="0" presStyleCnt="3" custRadScaleRad="82742" custRadScaleInc="-14080">
@@ -3499,6 +3542,13 @@
     <dgm:pt modelId="{9DC02F61-6382-491B-A9CC-411B82EC0C16}" type="pres">
       <dgm:prSet presAssocID="{C9CCBA24-4CE2-4805-A55C-2E3DDA773317}" presName="sibTrans" presStyleLbl="sibTrans1D1" presStyleIdx="0" presStyleCnt="3"/>
       <dgm:spPr/>
+      <dgm:t>
+        <a:bodyPr/>
+        <a:lstStyle/>
+        <a:p>
+          <a:endParaRPr lang="de-DE"/>
+        </a:p>
+      </dgm:t>
     </dgm:pt>
     <dgm:pt modelId="{5928E8AF-DB95-435B-B7F9-41BAA85F8D37}" type="pres">
       <dgm:prSet presAssocID="{2E0DE6A3-8034-4359-878F-D27C479A2DB9}" presName="node" presStyleLbl="node1" presStyleIdx="1" presStyleCnt="3">
@@ -3522,6 +3572,13 @@
     <dgm:pt modelId="{27248C72-71CC-4066-997C-1CBA8A51950D}" type="pres">
       <dgm:prSet presAssocID="{2B91CD3D-8560-4716-90F0-5E008007679F}" presName="sibTrans" presStyleLbl="sibTrans1D1" presStyleIdx="1" presStyleCnt="3"/>
       <dgm:spPr/>
+      <dgm:t>
+        <a:bodyPr/>
+        <a:lstStyle/>
+        <a:p>
+          <a:endParaRPr lang="de-DE"/>
+        </a:p>
+      </dgm:t>
     </dgm:pt>
     <dgm:pt modelId="{7698C44A-1705-4A41-9F8F-9426CBF08A80}" type="pres">
       <dgm:prSet presAssocID="{1284DB41-E929-4B56-AFDF-ADD660A4BD31}" presName="node" presStyleLbl="node1" presStyleIdx="2" presStyleCnt="3" custRadScaleRad="114941" custRadScaleInc="11908">
@@ -3545,19 +3602,26 @@
     <dgm:pt modelId="{A12364B4-E76E-4847-BD61-628D76E7F5F9}" type="pres">
       <dgm:prSet presAssocID="{96A2FDD7-7F47-46BB-8EE9-F8B08790343E}" presName="sibTrans" presStyleLbl="sibTrans1D1" presStyleIdx="2" presStyleCnt="3"/>
       <dgm:spPr/>
+      <dgm:t>
+        <a:bodyPr/>
+        <a:lstStyle/>
+        <a:p>
+          <a:endParaRPr lang="de-DE"/>
+        </a:p>
+      </dgm:t>
     </dgm:pt>
   </dgm:ptLst>
   <dgm:cxnLst>
-    <dgm:cxn modelId="{DA4F948B-A940-4F33-ADA9-42911521A4E4}" type="presOf" srcId="{9F3E0990-04F3-42EE-8CB8-3FB1B42597FB}" destId="{A66598BC-BDA5-49A3-950C-4B3E6CD78539}" srcOrd="0" destOrd="0" presId="urn:microsoft.com/office/officeart/2005/8/layout/cycle5"/>
+    <dgm:cxn modelId="{288558AC-3BA8-43A8-B786-A65EDF433BCA}" srcId="{9F3E0990-04F3-42EE-8CB8-3FB1B42597FB}" destId="{1284DB41-E929-4B56-AFDF-ADD660A4BD31}" srcOrd="2" destOrd="0" parTransId="{BBBFA594-0347-4D49-909F-918380282AF3}" sibTransId="{96A2FDD7-7F47-46BB-8EE9-F8B08790343E}"/>
+    <dgm:cxn modelId="{096680AD-3D66-4A09-B0C6-AB57D2CA4398}" srcId="{9F3E0990-04F3-42EE-8CB8-3FB1B42597FB}" destId="{5591ADDC-9A24-438D-B29A-0ED83069F02A}" srcOrd="0" destOrd="0" parTransId="{2D76D716-EA07-4ECB-9B72-7EF856F622CD}" sibTransId="{C9CCBA24-4CE2-4805-A55C-2E3DDA773317}"/>
     <dgm:cxn modelId="{D06A93C0-764F-440F-BDDE-FD242E8B4B66}" type="presOf" srcId="{96A2FDD7-7F47-46BB-8EE9-F8B08790343E}" destId="{A12364B4-E76E-4847-BD61-628D76E7F5F9}" srcOrd="0" destOrd="0" presId="urn:microsoft.com/office/officeart/2005/8/layout/cycle5"/>
-    <dgm:cxn modelId="{F6FAD302-6D7D-4E0B-BE77-E0DE8091AE7E}" srcId="{9F3E0990-04F3-42EE-8CB8-3FB1B42597FB}" destId="{2E0DE6A3-8034-4359-878F-D27C479A2DB9}" srcOrd="1" destOrd="0" parTransId="{FD2AC929-3D74-4428-A1AA-B00EB183AC27}" sibTransId="{2B91CD3D-8560-4716-90F0-5E008007679F}"/>
+    <dgm:cxn modelId="{41EC55BD-6832-4E5E-A895-00AE4B6E071D}" type="presOf" srcId="{1284DB41-E929-4B56-AFDF-ADD660A4BD31}" destId="{7698C44A-1705-4A41-9F8F-9426CBF08A80}" srcOrd="0" destOrd="0" presId="urn:microsoft.com/office/officeart/2005/8/layout/cycle5"/>
+    <dgm:cxn modelId="{2E6D4EE7-F8C2-4C90-A5E8-658FE6243591}" type="presOf" srcId="{C9CCBA24-4CE2-4805-A55C-2E3DDA773317}" destId="{9DC02F61-6382-491B-A9CC-411B82EC0C16}" srcOrd="0" destOrd="0" presId="urn:microsoft.com/office/officeart/2005/8/layout/cycle5"/>
+    <dgm:cxn modelId="{EEED33FA-FFAE-43F8-92A7-A255756732A9}" type="presOf" srcId="{2E0DE6A3-8034-4359-878F-D27C479A2DB9}" destId="{5928E8AF-DB95-435B-B7F9-41BAA85F8D37}" srcOrd="0" destOrd="0" presId="urn:microsoft.com/office/officeart/2005/8/layout/cycle5"/>
     <dgm:cxn modelId="{A537E225-1BC9-45F1-ADB1-0A06E8A433F4}" type="presOf" srcId="{2B91CD3D-8560-4716-90F0-5E008007679F}" destId="{27248C72-71CC-4066-997C-1CBA8A51950D}" srcOrd="0" destOrd="0" presId="urn:microsoft.com/office/officeart/2005/8/layout/cycle5"/>
     <dgm:cxn modelId="{E58E2773-A360-47FB-B481-3E79226EE48F}" type="presOf" srcId="{5591ADDC-9A24-438D-B29A-0ED83069F02A}" destId="{E9F05097-1B9E-4B8E-AF59-3EEC4B3947A4}" srcOrd="0" destOrd="0" presId="urn:microsoft.com/office/officeart/2005/8/layout/cycle5"/>
-    <dgm:cxn modelId="{EEED33FA-FFAE-43F8-92A7-A255756732A9}" type="presOf" srcId="{2E0DE6A3-8034-4359-878F-D27C479A2DB9}" destId="{5928E8AF-DB95-435B-B7F9-41BAA85F8D37}" srcOrd="0" destOrd="0" presId="urn:microsoft.com/office/officeart/2005/8/layout/cycle5"/>
-    <dgm:cxn modelId="{096680AD-3D66-4A09-B0C6-AB57D2CA4398}" srcId="{9F3E0990-04F3-42EE-8CB8-3FB1B42597FB}" destId="{5591ADDC-9A24-438D-B29A-0ED83069F02A}" srcOrd="0" destOrd="0" parTransId="{2D76D716-EA07-4ECB-9B72-7EF856F622CD}" sibTransId="{C9CCBA24-4CE2-4805-A55C-2E3DDA773317}"/>
-    <dgm:cxn modelId="{2E6D4EE7-F8C2-4C90-A5E8-658FE6243591}" type="presOf" srcId="{C9CCBA24-4CE2-4805-A55C-2E3DDA773317}" destId="{9DC02F61-6382-491B-A9CC-411B82EC0C16}" srcOrd="0" destOrd="0" presId="urn:microsoft.com/office/officeart/2005/8/layout/cycle5"/>
-    <dgm:cxn modelId="{288558AC-3BA8-43A8-B786-A65EDF433BCA}" srcId="{9F3E0990-04F3-42EE-8CB8-3FB1B42597FB}" destId="{1284DB41-E929-4B56-AFDF-ADD660A4BD31}" srcOrd="2" destOrd="0" parTransId="{BBBFA594-0347-4D49-909F-918380282AF3}" sibTransId="{96A2FDD7-7F47-46BB-8EE9-F8B08790343E}"/>
-    <dgm:cxn modelId="{41EC55BD-6832-4E5E-A895-00AE4B6E071D}" type="presOf" srcId="{1284DB41-E929-4B56-AFDF-ADD660A4BD31}" destId="{7698C44A-1705-4A41-9F8F-9426CBF08A80}" srcOrd="0" destOrd="0" presId="urn:microsoft.com/office/officeart/2005/8/layout/cycle5"/>
+    <dgm:cxn modelId="{DA4F948B-A940-4F33-ADA9-42911521A4E4}" type="presOf" srcId="{9F3E0990-04F3-42EE-8CB8-3FB1B42597FB}" destId="{A66598BC-BDA5-49A3-950C-4B3E6CD78539}" srcOrd="0" destOrd="0" presId="urn:microsoft.com/office/officeart/2005/8/layout/cycle5"/>
+    <dgm:cxn modelId="{F6FAD302-6D7D-4E0B-BE77-E0DE8091AE7E}" srcId="{9F3E0990-04F3-42EE-8CB8-3FB1B42597FB}" destId="{2E0DE6A3-8034-4359-878F-D27C479A2DB9}" srcOrd="1" destOrd="0" parTransId="{FD2AC929-3D74-4428-A1AA-B00EB183AC27}" sibTransId="{2B91CD3D-8560-4716-90F0-5E008007679F}"/>
     <dgm:cxn modelId="{B5A77B33-8BF3-4128-9327-98F1A705E6FB}" type="presParOf" srcId="{A66598BC-BDA5-49A3-950C-4B3E6CD78539}" destId="{E9F05097-1B9E-4B8E-AF59-3EEC4B3947A4}" srcOrd="0" destOrd="0" presId="urn:microsoft.com/office/officeart/2005/8/layout/cycle5"/>
     <dgm:cxn modelId="{FE9DE62C-DA85-4D0D-84A9-D16C100D3639}" type="presParOf" srcId="{A66598BC-BDA5-49A3-950C-4B3E6CD78539}" destId="{3752A788-1234-4928-9171-839CF91958EF}" srcOrd="1" destOrd="0" presId="urn:microsoft.com/office/officeart/2005/8/layout/cycle5"/>
     <dgm:cxn modelId="{077ABB69-8B46-4243-B3EA-C869330AC8E8}" type="presParOf" srcId="{A66598BC-BDA5-49A3-950C-4B3E6CD78539}" destId="{9DC02F61-6382-491B-A9CC-411B82EC0C16}" srcOrd="2" destOrd="0" presId="urn:microsoft.com/office/officeart/2005/8/layout/cycle5"/>
@@ -3715,6 +3779,13 @@
         </dgm:presLayoutVars>
       </dgm:prSet>
       <dgm:spPr/>
+      <dgm:t>
+        <a:bodyPr/>
+        <a:lstStyle/>
+        <a:p>
+          <a:endParaRPr lang="de-DE"/>
+        </a:p>
+      </dgm:t>
     </dgm:pt>
     <dgm:pt modelId="{354449BB-0B46-4C11-9134-8DB5FB2F99C6}" type="pres">
       <dgm:prSet presAssocID="{740EF86F-B076-4C59-AE42-D4D80FC39A80}" presName="node" presStyleLbl="node1" presStyleIdx="0" presStyleCnt="3" custRadScaleRad="141912" custRadScaleInc="-1865">
@@ -3738,6 +3809,13 @@
     <dgm:pt modelId="{C717F32B-C9D9-4405-87E8-96F537F320D8}" type="pres">
       <dgm:prSet presAssocID="{C1CAF616-E0AF-4AA9-A052-1D325D32B2DB}" presName="sibTrans" presStyleLbl="sibTrans1D1" presStyleIdx="0" presStyleCnt="3"/>
       <dgm:spPr/>
+      <dgm:t>
+        <a:bodyPr/>
+        <a:lstStyle/>
+        <a:p>
+          <a:endParaRPr lang="de-DE"/>
+        </a:p>
+      </dgm:t>
     </dgm:pt>
     <dgm:pt modelId="{4529D1E9-320E-48D5-BC65-8DB29EBF18BF}" type="pres">
       <dgm:prSet presAssocID="{57E6587E-A19D-4B62-88D4-67000147672C}" presName="node" presStyleLbl="node1" presStyleIdx="1" presStyleCnt="3" custRadScaleRad="110837" custRadScaleInc="-13930">
@@ -3761,6 +3839,13 @@
     <dgm:pt modelId="{D92A7E3E-0AF7-4958-A3AE-A24DD2F922A8}" type="pres">
       <dgm:prSet presAssocID="{89476B55-F10A-4780-8D37-2A0B55258904}" presName="sibTrans" presStyleLbl="sibTrans1D1" presStyleIdx="1" presStyleCnt="3"/>
       <dgm:spPr/>
+      <dgm:t>
+        <a:bodyPr/>
+        <a:lstStyle/>
+        <a:p>
+          <a:endParaRPr lang="de-DE"/>
+        </a:p>
+      </dgm:t>
     </dgm:pt>
     <dgm:pt modelId="{572ADCD4-3005-40F1-BC9E-A1BF3103D95E}" type="pres">
       <dgm:prSet presAssocID="{95B844A8-6B7C-4F29-A398-72201D964135}" presName="node" presStyleLbl="node1" presStyleIdx="2" presStyleCnt="3" custRadScaleRad="111524" custRadScaleInc="14331">
@@ -3784,6 +3869,13 @@
     <dgm:pt modelId="{C03B017B-D526-4168-B33C-86F58F8D2514}" type="pres">
       <dgm:prSet presAssocID="{8B8A93D2-170F-40A9-946C-02EB0BEE0B33}" presName="sibTrans" presStyleLbl="sibTrans1D1" presStyleIdx="2" presStyleCnt="3"/>
       <dgm:spPr/>
+      <dgm:t>
+        <a:bodyPr/>
+        <a:lstStyle/>
+        <a:p>
+          <a:endParaRPr lang="de-DE"/>
+        </a:p>
+      </dgm:t>
     </dgm:pt>
   </dgm:ptLst>
   <dgm:cxnLst>
@@ -3954,6 +4046,13 @@
         </dgm:presLayoutVars>
       </dgm:prSet>
       <dgm:spPr/>
+      <dgm:t>
+        <a:bodyPr/>
+        <a:lstStyle/>
+        <a:p>
+          <a:endParaRPr lang="de-DE"/>
+        </a:p>
+      </dgm:t>
     </dgm:pt>
     <dgm:pt modelId="{354449BB-0B46-4C11-9134-8DB5FB2F99C6}" type="pres">
       <dgm:prSet presAssocID="{740EF86F-B076-4C59-AE42-D4D80FC39A80}" presName="node" presStyleLbl="node1" presStyleIdx="0" presStyleCnt="3" custRadScaleRad="141912" custRadScaleInc="-1865">
@@ -3977,6 +4076,13 @@
     <dgm:pt modelId="{C717F32B-C9D9-4405-87E8-96F537F320D8}" type="pres">
       <dgm:prSet presAssocID="{C1CAF616-E0AF-4AA9-A052-1D325D32B2DB}" presName="sibTrans" presStyleLbl="sibTrans1D1" presStyleIdx="0" presStyleCnt="3"/>
       <dgm:spPr/>
+      <dgm:t>
+        <a:bodyPr/>
+        <a:lstStyle/>
+        <a:p>
+          <a:endParaRPr lang="de-DE"/>
+        </a:p>
+      </dgm:t>
     </dgm:pt>
     <dgm:pt modelId="{4529D1E9-320E-48D5-BC65-8DB29EBF18BF}" type="pres">
       <dgm:prSet presAssocID="{57E6587E-A19D-4B62-88D4-67000147672C}" presName="node" presStyleLbl="node1" presStyleIdx="1" presStyleCnt="3" custRadScaleRad="110837" custRadScaleInc="-13930">
@@ -4000,6 +4106,13 @@
     <dgm:pt modelId="{D92A7E3E-0AF7-4958-A3AE-A24DD2F922A8}" type="pres">
       <dgm:prSet presAssocID="{89476B55-F10A-4780-8D37-2A0B55258904}" presName="sibTrans" presStyleLbl="sibTrans1D1" presStyleIdx="1" presStyleCnt="3"/>
       <dgm:spPr/>
+      <dgm:t>
+        <a:bodyPr/>
+        <a:lstStyle/>
+        <a:p>
+          <a:endParaRPr lang="de-DE"/>
+        </a:p>
+      </dgm:t>
     </dgm:pt>
     <dgm:pt modelId="{572ADCD4-3005-40F1-BC9E-A1BF3103D95E}" type="pres">
       <dgm:prSet presAssocID="{95B844A8-6B7C-4F29-A398-72201D964135}" presName="node" presStyleLbl="node1" presStyleIdx="2" presStyleCnt="3" custRadScaleRad="111524" custRadScaleInc="14331">
@@ -4023,6 +4136,13 @@
     <dgm:pt modelId="{C03B017B-D526-4168-B33C-86F58F8D2514}" type="pres">
       <dgm:prSet presAssocID="{8B8A93D2-170F-40A9-946C-02EB0BEE0B33}" presName="sibTrans" presStyleLbl="sibTrans1D1" presStyleIdx="2" presStyleCnt="3"/>
       <dgm:spPr/>
+      <dgm:t>
+        <a:bodyPr/>
+        <a:lstStyle/>
+        <a:p>
+          <a:endParaRPr lang="de-DE"/>
+        </a:p>
+      </dgm:t>
     </dgm:pt>
   </dgm:ptLst>
   <dgm:cxnLst>
@@ -13113,9 +13233,19 @@
 <p:sldMaster xmlns:a="http://schemas.openxmlformats.org/drawingml/2006/main" xmlns:r="http://schemas.openxmlformats.org/officeDocument/2006/relationships" xmlns:p="http://schemas.openxmlformats.org/presentationml/2006/main">
   <p:cSld>
     <p:bg>
-      <p:bgRef idx="1001">
-        <a:schemeClr val="bg1"/>
-      </p:bgRef>
+      <p:bgPr>
+        <a:blipFill dpi="0" rotWithShape="1">
+          <a:blip r:embed="rId13">
+            <a:alphaModFix amt="90000"/>
+            <a:lum/>
+          </a:blip>
+          <a:srcRect/>
+          <a:stretch>
+            <a:fillRect l="-17000" r="-17000"/>
+          </a:stretch>
+        </a:blipFill>
+        <a:effectLst/>
+      </p:bgPr>
     </p:bg>
     <p:spTree>
       <p:nvGrpSpPr>
@@ -13652,10 +13782,18 @@
           <a:lstStyle/>
           <a:p>
             <a:r>
-              <a:rPr lang="de-DE" dirty="0" smtClean="0"/>
+              <a:rPr lang="de-DE" dirty="0" smtClean="0">
+                <a:solidFill>
+                  <a:schemeClr val="bg1"/>
+                </a:solidFill>
+              </a:rPr>
               <a:t>Hammer Man</a:t>
             </a:r>
-            <a:endParaRPr lang="de-DE" dirty="0"/>
+            <a:endParaRPr lang="de-DE" dirty="0">
+              <a:solidFill>
+                <a:schemeClr val="bg1"/>
+              </a:solidFill>
+            </a:endParaRPr>
           </a:p>
         </p:txBody>
       </p:sp>
@@ -13675,14 +13813,26 @@
           <a:lstStyle/>
           <a:p>
             <a:r>
-              <a:rPr lang="de-DE" dirty="0" err="1" smtClean="0"/>
+              <a:rPr lang="de-DE" dirty="0" err="1" smtClean="0">
+                <a:solidFill>
+                  <a:schemeClr val="bg1"/>
+                </a:solidFill>
+              </a:rPr>
               <a:t>It‘s</a:t>
             </a:r>
             <a:r>
-              <a:rPr lang="de-DE" dirty="0" smtClean="0"/>
+              <a:rPr lang="de-DE" dirty="0" smtClean="0">
+                <a:solidFill>
+                  <a:schemeClr val="bg1"/>
+                </a:solidFill>
+              </a:rPr>
               <a:t> Hammer Time!</a:t>
             </a:r>
-            <a:endParaRPr lang="de-DE" dirty="0"/>
+            <a:endParaRPr lang="de-DE" dirty="0">
+              <a:solidFill>
+                <a:schemeClr val="bg1"/>
+              </a:solidFill>
+            </a:endParaRPr>
           </a:p>
         </p:txBody>
       </p:sp>
@@ -13696,6 +13846,13 @@
   <p:clrMapOvr>
     <a:masterClrMapping/>
   </p:clrMapOvr>
+  <p:timing>
+    <p:tnLst>
+      <p:par>
+        <p:cTn id="1" dur="indefinite" restart="never" nodeType="tmRoot"/>
+      </p:par>
+    </p:tnLst>
+  </p:timing>
 </p:sld>
 </file>
 
@@ -13732,10 +13889,30 @@
           <a:lstStyle/>
           <a:p>
             <a:r>
+              <a:rPr lang="de-DE" dirty="0" smtClean="0">
+                <a:solidFill>
+                  <a:schemeClr val="bg1"/>
+                </a:solidFill>
+              </a:rPr>
+              <a:t>Design</a:t>
+            </a:r>
+            <a:r>
               <a:rPr lang="de-DE" dirty="0" smtClean="0"/>
-              <a:t>Design Prinzipien/Spielspaß</a:t>
-            </a:r>
-            <a:endParaRPr lang="de-DE" dirty="0"/>
+              <a:t> </a:t>
+            </a:r>
+            <a:r>
+              <a:rPr lang="de-DE" dirty="0" smtClean="0">
+                <a:solidFill>
+                  <a:schemeClr val="bg1"/>
+                </a:solidFill>
+              </a:rPr>
+              <a:t>Prinzipien</a:t>
+            </a:r>
+            <a:endParaRPr lang="de-DE" dirty="0">
+              <a:solidFill>
+                <a:schemeClr val="bg1"/>
+              </a:solidFill>
+            </a:endParaRPr>
           </a:p>
         </p:txBody>
       </p:sp>
@@ -13749,12 +13926,204 @@
             <p:ph idx="1"/>
           </p:nvPr>
         </p:nvSpPr>
-        <p:spPr/>
+        <p:spPr>
+          <a:xfrm>
+            <a:off x="1619672" y="1600200"/>
+            <a:ext cx="5915000" cy="4525963"/>
+          </a:xfrm>
+        </p:spPr>
         <p:txBody>
-          <a:bodyPr/>
+          <a:bodyPr>
+            <a:normAutofit fontScale="92500" lnSpcReduction="20000"/>
+          </a:bodyPr>
           <a:lstStyle/>
           <a:p>
-            <a:endParaRPr lang="de-DE"/>
+            <a:pPr lvl="0"/>
+            <a:r>
+              <a:rPr lang="de-DE" dirty="0">
+                <a:solidFill>
+                  <a:schemeClr val="bg1"/>
+                </a:solidFill>
+              </a:rPr>
+              <a:t>Roboter zertrümmern </a:t>
+            </a:r>
+            <a:r>
+              <a:rPr lang="de-DE" dirty="0" smtClean="0">
+                <a:solidFill>
+                  <a:schemeClr val="bg1"/>
+                </a:solidFill>
+              </a:rPr>
+              <a:t>fetzt richtig!</a:t>
+            </a:r>
+            <a:endParaRPr lang="de-DE" dirty="0">
+              <a:solidFill>
+                <a:schemeClr val="bg1"/>
+              </a:solidFill>
+            </a:endParaRPr>
+          </a:p>
+          <a:p>
+            <a:pPr lvl="0"/>
+            <a:r>
+              <a:rPr lang="de-DE" dirty="0">
+                <a:solidFill>
+                  <a:schemeClr val="bg1"/>
+                </a:solidFill>
+              </a:rPr>
+              <a:t>Angriff ist beste </a:t>
+            </a:r>
+            <a:r>
+              <a:rPr lang="de-DE" dirty="0" smtClean="0">
+                <a:solidFill>
+                  <a:schemeClr val="bg1"/>
+                </a:solidFill>
+              </a:rPr>
+              <a:t>Verteidigung!</a:t>
+            </a:r>
+          </a:p>
+          <a:p>
+            <a:pPr lvl="0"/>
+            <a:r>
+              <a:rPr lang="de-DE" dirty="0" smtClean="0">
+                <a:solidFill>
+                  <a:schemeClr val="bg1"/>
+                </a:solidFill>
+              </a:rPr>
+              <a:t>Der </a:t>
+            </a:r>
+            <a:r>
+              <a:rPr lang="de-DE" dirty="0">
+                <a:solidFill>
+                  <a:schemeClr val="bg1"/>
+                </a:solidFill>
+              </a:rPr>
+              <a:t>Hammer schlägt den </a:t>
+            </a:r>
+            <a:r>
+              <a:rPr lang="de-DE" dirty="0" smtClean="0">
+                <a:solidFill>
+                  <a:schemeClr val="bg1"/>
+                </a:solidFill>
+              </a:rPr>
+              <a:t>Takt!</a:t>
+            </a:r>
+            <a:endParaRPr lang="de-DE" dirty="0">
+              <a:solidFill>
+                <a:schemeClr val="bg1"/>
+              </a:solidFill>
+            </a:endParaRPr>
+          </a:p>
+          <a:p>
+            <a:pPr lvl="0"/>
+            <a:r>
+              <a:rPr lang="de-DE" dirty="0">
+                <a:solidFill>
+                  <a:schemeClr val="bg1"/>
+                </a:solidFill>
+              </a:rPr>
+              <a:t>Immer in </a:t>
+            </a:r>
+            <a:r>
+              <a:rPr lang="de-DE" dirty="0" smtClean="0">
+                <a:solidFill>
+                  <a:schemeClr val="bg1"/>
+                </a:solidFill>
+              </a:rPr>
+              <a:t>Bewegung!</a:t>
+            </a:r>
+            <a:endParaRPr lang="de-DE" dirty="0">
+              <a:solidFill>
+                <a:schemeClr val="bg1"/>
+              </a:solidFill>
+            </a:endParaRPr>
+          </a:p>
+          <a:p>
+            <a:pPr lvl="0"/>
+            <a:r>
+              <a:rPr lang="de-DE" dirty="0" smtClean="0">
+                <a:solidFill>
+                  <a:schemeClr val="bg1"/>
+                </a:solidFill>
+              </a:rPr>
+              <a:t>Hammer Man – der wahre Held!</a:t>
+            </a:r>
+          </a:p>
+          <a:p>
+            <a:pPr lvl="0"/>
+            <a:r>
+              <a:rPr lang="de-DE" dirty="0" smtClean="0">
+                <a:solidFill>
+                  <a:schemeClr val="bg1"/>
+                </a:solidFill>
+              </a:rPr>
+              <a:t>Roboter – etwas trottelig!</a:t>
+            </a:r>
+          </a:p>
+          <a:p>
+            <a:pPr lvl="0"/>
+            <a:r>
+              <a:rPr lang="de-DE" dirty="0" smtClean="0">
+                <a:solidFill>
+                  <a:schemeClr val="bg1"/>
+                </a:solidFill>
+              </a:rPr>
+              <a:t>Warum so ernst?</a:t>
+            </a:r>
+            <a:endParaRPr lang="de-DE" dirty="0">
+              <a:solidFill>
+                <a:schemeClr val="bg1"/>
+              </a:solidFill>
+            </a:endParaRPr>
+          </a:p>
+          <a:p>
+            <a:pPr lvl="0"/>
+            <a:r>
+              <a:rPr lang="de-DE" dirty="0">
+                <a:solidFill>
+                  <a:schemeClr val="bg1"/>
+                </a:solidFill>
+              </a:rPr>
+              <a:t>Einfach zu </a:t>
+            </a:r>
+            <a:r>
+              <a:rPr lang="de-DE" dirty="0" smtClean="0">
+                <a:solidFill>
+                  <a:schemeClr val="bg1"/>
+                </a:solidFill>
+              </a:rPr>
+              <a:t>verstehen!</a:t>
+            </a:r>
+          </a:p>
+          <a:p>
+            <a:pPr lvl="0"/>
+            <a:r>
+              <a:rPr lang="de-DE" dirty="0" smtClean="0">
+                <a:solidFill>
+                  <a:schemeClr val="bg1"/>
+                </a:solidFill>
+              </a:rPr>
+              <a:t>Bewegung </a:t>
+            </a:r>
+            <a:r>
+              <a:rPr lang="de-DE" dirty="0">
+                <a:solidFill>
+                  <a:schemeClr val="bg1"/>
+                </a:solidFill>
+              </a:rPr>
+              <a:t>macht </a:t>
+            </a:r>
+            <a:r>
+              <a:rPr lang="de-DE" dirty="0" smtClean="0">
+                <a:solidFill>
+                  <a:schemeClr val="bg1"/>
+                </a:solidFill>
+              </a:rPr>
+              <a:t>Spaß!</a:t>
+            </a:r>
+            <a:endParaRPr lang="de-DE" dirty="0">
+              <a:solidFill>
+                <a:schemeClr val="bg1"/>
+              </a:solidFill>
+            </a:endParaRPr>
           </a:p>
         </p:txBody>
       </p:sp>
@@ -13768,6 +14137,13 @@
   <p:clrMapOvr>
     <a:masterClrMapping/>
   </p:clrMapOvr>
+  <p:timing>
+    <p:tnLst>
+      <p:par>
+        <p:cTn id="1" dur="indefinite" restart="never" nodeType="tmRoot"/>
+      </p:par>
+    </p:tnLst>
+  </p:timing>
 </p:sld>
 </file>
 
@@ -13804,54 +14180,128 @@
           <a:lstStyle/>
           <a:p>
             <a:r>
-              <a:rPr lang="de-DE" dirty="0" smtClean="0"/>
-              <a:t>Nice </a:t>
-            </a:r>
-            <a:r>
-              <a:rPr lang="de-DE" dirty="0" err="1" smtClean="0"/>
-              <a:t>To</a:t>
-            </a:r>
-            <a:r>
-              <a:rPr lang="de-DE" dirty="0" smtClean="0"/>
-              <a:t> </a:t>
-            </a:r>
-            <a:r>
-              <a:rPr lang="de-DE" dirty="0" err="1" smtClean="0"/>
-              <a:t>Haves</a:t>
-            </a:r>
-            <a:endParaRPr lang="de-DE" dirty="0"/>
+              <a:rPr lang="de-DE" dirty="0" smtClean="0">
+                <a:solidFill>
+                  <a:schemeClr val="bg1"/>
+                </a:solidFill>
+              </a:rPr>
+              <a:t>Wo liegt der Spaß?</a:t>
+            </a:r>
+            <a:endParaRPr lang="de-DE" dirty="0">
+              <a:solidFill>
+                <a:schemeClr val="bg1"/>
+              </a:solidFill>
+            </a:endParaRPr>
           </a:p>
         </p:txBody>
       </p:sp>
-      <p:sp>
-        <p:nvSpPr>
-          <p:cNvPr id="3" name="Inhaltsplatzhalter 2"/>
-          <p:cNvSpPr>
-            <a:spLocks noGrp="1"/>
-          </p:cNvSpPr>
-          <p:nvPr>
-            <p:ph idx="1"/>
-          </p:nvPr>
-        </p:nvSpPr>
-        <p:spPr/>
-        <p:txBody>
-          <a:bodyPr/>
-          <a:lstStyle/>
-          <a:p>
-            <a:endParaRPr lang="de-DE"/>
-          </a:p>
-        </p:txBody>
-      </p:sp>
+      <p:pic>
+        <p:nvPicPr>
+          <p:cNvPr id="4" name="Grafik 3"/>
+          <p:cNvPicPr>
+            <a:picLocks noChangeAspect="1"/>
+          </p:cNvPicPr>
+          <p:nvPr/>
+        </p:nvPicPr>
+        <p:blipFill>
+          <a:blip r:embed="rId2">
+            <a:extLst>
+              <a:ext uri="{28A0092B-C50C-407E-A947-70E740481C1C}">
+                <a14:useLocalDpi xmlns:a14="http://schemas.microsoft.com/office/drawing/2010/main" val="0"/>
+              </a:ext>
+            </a:extLst>
+          </a:blip>
+          <a:stretch>
+            <a:fillRect/>
+          </a:stretch>
+        </p:blipFill>
+        <p:spPr>
+          <a:xfrm>
+            <a:off x="882799" y="2420888"/>
+            <a:ext cx="2105025" cy="2171700"/>
+          </a:xfrm>
+          <a:prstGeom prst="rect">
+            <a:avLst/>
+          </a:prstGeom>
+        </p:spPr>
+      </p:pic>
+      <p:pic>
+        <p:nvPicPr>
+          <p:cNvPr id="5" name="Grafik 4"/>
+          <p:cNvPicPr>
+            <a:picLocks noChangeAspect="1"/>
+          </p:cNvPicPr>
+          <p:nvPr/>
+        </p:nvPicPr>
+        <p:blipFill>
+          <a:blip r:embed="rId3" cstate="print">
+            <a:extLst>
+              <a:ext uri="{28A0092B-C50C-407E-A947-70E740481C1C}">
+                <a14:useLocalDpi xmlns:a14="http://schemas.microsoft.com/office/drawing/2010/main" val="0"/>
+              </a:ext>
+            </a:extLst>
+          </a:blip>
+          <a:stretch>
+            <a:fillRect/>
+          </a:stretch>
+        </p:blipFill>
+        <p:spPr>
+          <a:xfrm>
+            <a:off x="3480420" y="2420888"/>
+            <a:ext cx="2171700" cy="2171700"/>
+          </a:xfrm>
+          <a:prstGeom prst="rect">
+            <a:avLst/>
+          </a:prstGeom>
+        </p:spPr>
+      </p:pic>
+      <p:pic>
+        <p:nvPicPr>
+          <p:cNvPr id="6" name="Grafik 5"/>
+          <p:cNvPicPr>
+            <a:picLocks noChangeAspect="1"/>
+          </p:cNvPicPr>
+          <p:nvPr/>
+        </p:nvPicPr>
+        <p:blipFill>
+          <a:blip r:embed="rId4" cstate="print">
+            <a:extLst>
+              <a:ext uri="{28A0092B-C50C-407E-A947-70E740481C1C}">
+                <a14:useLocalDpi xmlns:a14="http://schemas.microsoft.com/office/drawing/2010/main" val="0"/>
+              </a:ext>
+            </a:extLst>
+          </a:blip>
+          <a:stretch>
+            <a:fillRect/>
+          </a:stretch>
+        </p:blipFill>
+        <p:spPr>
+          <a:xfrm>
+            <a:off x="6156176" y="2420888"/>
+            <a:ext cx="2188111" cy="2171700"/>
+          </a:xfrm>
+          <a:prstGeom prst="rect">
+            <a:avLst/>
+          </a:prstGeom>
+        </p:spPr>
+      </p:pic>
     </p:spTree>
     <p:extLst>
       <p:ext uri="{BB962C8B-B14F-4D97-AF65-F5344CB8AC3E}">
-        <p14:creationId xmlns:p14="http://schemas.microsoft.com/office/powerpoint/2010/main" val="542370561"/>
+        <p14:creationId xmlns:p14="http://schemas.microsoft.com/office/powerpoint/2010/main" val="4058561566"/>
       </p:ext>
     </p:extLst>
   </p:cSld>
   <p:clrMapOvr>
     <a:masterClrMapping/>
   </p:clrMapOvr>
+  <p:timing>
+    <p:tnLst>
+      <p:par>
+        <p:cTn id="1" dur="indefinite" restart="never" nodeType="tmRoot"/>
+      </p:par>
+    </p:tnLst>
+  </p:timing>
 </p:sld>
 </file>
 
@@ -13888,10 +14338,18 @@
           <a:lstStyle/>
           <a:p>
             <a:r>
-              <a:rPr lang="de-DE" dirty="0" smtClean="0"/>
-              <a:t>Ziele für Gate 1</a:t>
-            </a:r>
-            <a:endParaRPr lang="de-DE" dirty="0"/>
+              <a:rPr lang="de-DE" dirty="0" smtClean="0">
+                <a:solidFill>
+                  <a:schemeClr val="bg1"/>
+                </a:solidFill>
+              </a:rPr>
+              <a:t>Vision</a:t>
+            </a:r>
+            <a:endParaRPr lang="de-DE" dirty="0">
+              <a:solidFill>
+                <a:schemeClr val="bg1"/>
+              </a:solidFill>
+            </a:endParaRPr>
           </a:p>
         </p:txBody>
       </p:sp>
@@ -13905,25 +14363,157 @@
             <p:ph idx="1"/>
           </p:nvPr>
         </p:nvSpPr>
-        <p:spPr/>
+        <p:spPr>
+          <a:xfrm>
+            <a:off x="1547664" y="1628800"/>
+            <a:ext cx="6048672" cy="4525963"/>
+          </a:xfrm>
+        </p:spPr>
         <p:txBody>
-          <a:bodyPr/>
+          <a:bodyPr>
+            <a:normAutofit/>
+          </a:bodyPr>
           <a:lstStyle/>
           <a:p>
-            <a:endParaRPr lang="de-DE"/>
+            <a:pPr lvl="0"/>
+            <a:r>
+              <a:rPr lang="de-DE" dirty="0" smtClean="0">
+                <a:solidFill>
+                  <a:schemeClr val="bg1"/>
+                </a:solidFill>
+              </a:rPr>
+              <a:t>Items/Power </a:t>
+            </a:r>
+            <a:r>
+              <a:rPr lang="de-DE" dirty="0" err="1" smtClean="0">
+                <a:solidFill>
+                  <a:schemeClr val="bg1"/>
+                </a:solidFill>
+              </a:rPr>
+              <a:t>Ups</a:t>
+            </a:r>
+            <a:endParaRPr lang="de-DE" dirty="0" smtClean="0">
+              <a:solidFill>
+                <a:schemeClr val="bg1"/>
+              </a:solidFill>
+            </a:endParaRPr>
+          </a:p>
+          <a:p>
+            <a:pPr lvl="0"/>
+            <a:r>
+              <a:rPr lang="de-DE" dirty="0" smtClean="0">
+                <a:solidFill>
+                  <a:schemeClr val="bg1"/>
+                </a:solidFill>
+              </a:rPr>
+              <a:t>Shop/Upgrades</a:t>
+            </a:r>
+            <a:endParaRPr lang="de-DE" dirty="0">
+              <a:solidFill>
+                <a:schemeClr val="bg1"/>
+              </a:solidFill>
+            </a:endParaRPr>
+          </a:p>
+          <a:p>
+            <a:pPr lvl="0"/>
+            <a:r>
+              <a:rPr lang="de-DE" dirty="0">
+                <a:solidFill>
+                  <a:schemeClr val="bg1"/>
+                </a:solidFill>
+              </a:rPr>
+              <a:t>Zerstörbare Wände/Hindernisse</a:t>
+            </a:r>
+          </a:p>
+          <a:p>
+            <a:pPr lvl="0"/>
+            <a:r>
+              <a:rPr lang="de-DE" dirty="0">
+                <a:solidFill>
+                  <a:schemeClr val="bg1"/>
+                </a:solidFill>
+              </a:rPr>
+              <a:t>Boss Gegner</a:t>
+            </a:r>
+          </a:p>
+          <a:p>
+            <a:pPr lvl="0"/>
+            <a:r>
+              <a:rPr lang="de-DE" dirty="0">
+                <a:solidFill>
+                  <a:schemeClr val="bg1"/>
+                </a:solidFill>
+              </a:rPr>
+              <a:t>Gegner </a:t>
+            </a:r>
+            <a:r>
+              <a:rPr lang="de-DE" dirty="0" smtClean="0">
+                <a:solidFill>
+                  <a:schemeClr val="bg1"/>
+                </a:solidFill>
+              </a:rPr>
+              <a:t>fliehen vor Hammer Man</a:t>
+            </a:r>
+            <a:endParaRPr lang="de-DE" dirty="0">
+              <a:solidFill>
+                <a:schemeClr val="bg1"/>
+              </a:solidFill>
+            </a:endParaRPr>
+          </a:p>
+          <a:p>
+            <a:pPr lvl="0"/>
+            <a:r>
+              <a:rPr lang="de-DE" dirty="0" smtClean="0">
+                <a:solidFill>
+                  <a:schemeClr val="bg1"/>
+                </a:solidFill>
+              </a:rPr>
+              <a:t>Ebenen bewegen sich</a:t>
+            </a:r>
+            <a:endParaRPr lang="de-DE" dirty="0">
+              <a:solidFill>
+                <a:schemeClr val="bg1"/>
+              </a:solidFill>
+            </a:endParaRPr>
+          </a:p>
+          <a:p>
+            <a:pPr lvl="0"/>
+            <a:r>
+              <a:rPr lang="de-DE" dirty="0" err="1" smtClean="0">
+                <a:solidFill>
+                  <a:schemeClr val="bg1"/>
+                </a:solidFill>
+              </a:rPr>
+              <a:t>Spawner</a:t>
+            </a:r>
+            <a:r>
+              <a:rPr lang="de-DE" dirty="0" smtClean="0">
+                <a:solidFill>
+                  <a:schemeClr val="bg1"/>
+                </a:solidFill>
+              </a:rPr>
+              <a:t> bewegen sich</a:t>
+            </a:r>
           </a:p>
         </p:txBody>
       </p:sp>
     </p:spTree>
     <p:extLst>
       <p:ext uri="{BB962C8B-B14F-4D97-AF65-F5344CB8AC3E}">
-        <p14:creationId xmlns:p14="http://schemas.microsoft.com/office/powerpoint/2010/main" val="4215226063"/>
+        <p14:creationId xmlns:p14="http://schemas.microsoft.com/office/powerpoint/2010/main" val="542370561"/>
       </p:ext>
     </p:extLst>
   </p:cSld>
   <p:clrMapOvr>
     <a:masterClrMapping/>
   </p:clrMapOvr>
+  <p:timing>
+    <p:tnLst>
+      <p:par>
+        <p:cTn id="1" dur="indefinite" restart="never" nodeType="tmRoot"/>
+      </p:par>
+    </p:tnLst>
+  </p:timing>
 </p:sld>
 </file>
 
@@ -13960,10 +14550,18 @@
           <a:lstStyle/>
           <a:p>
             <a:r>
-              <a:rPr lang="de-DE" dirty="0" smtClean="0"/>
-              <a:t>Das Team</a:t>
-            </a:r>
-            <a:endParaRPr lang="de-DE" dirty="0"/>
+              <a:rPr lang="de-DE" dirty="0" smtClean="0">
+                <a:solidFill>
+                  <a:schemeClr val="bg1"/>
+                </a:solidFill>
+              </a:rPr>
+              <a:t>Ziele für Gate 1</a:t>
+            </a:r>
+            <a:endParaRPr lang="de-DE" dirty="0">
+              <a:solidFill>
+                <a:schemeClr val="bg1"/>
+              </a:solidFill>
+            </a:endParaRPr>
           </a:p>
         </p:txBody>
       </p:sp>
@@ -13977,12 +14575,290 @@
             <p:ph idx="1"/>
           </p:nvPr>
         </p:nvSpPr>
+        <p:spPr>
+          <a:xfrm>
+            <a:off x="2627784" y="1628800"/>
+            <a:ext cx="3816424" cy="4525963"/>
+          </a:xfrm>
+        </p:spPr>
+        <p:txBody>
+          <a:bodyPr anchor="ctr"/>
+          <a:lstStyle/>
+          <a:p>
+            <a:r>
+              <a:rPr lang="de-DE" dirty="0" smtClean="0">
+                <a:solidFill>
+                  <a:schemeClr val="bg1"/>
+                </a:solidFill>
+              </a:rPr>
+              <a:t>Spaß durch Balance</a:t>
+            </a:r>
+          </a:p>
+          <a:p>
+            <a:pPr lvl="0"/>
+            <a:r>
+              <a:rPr lang="de-DE" dirty="0" smtClean="0">
+                <a:solidFill>
+                  <a:schemeClr val="bg1"/>
+                </a:solidFill>
+              </a:rPr>
+              <a:t>Treffer-Feedback</a:t>
+            </a:r>
+          </a:p>
+          <a:p>
+            <a:pPr lvl="0"/>
+            <a:r>
+              <a:rPr lang="de-DE" dirty="0" smtClean="0">
+                <a:solidFill>
+                  <a:schemeClr val="bg1"/>
+                </a:solidFill>
+              </a:rPr>
+              <a:t>Flüssige Steuerung</a:t>
+            </a:r>
+          </a:p>
+          <a:p>
+            <a:pPr lvl="0"/>
+            <a:r>
+              <a:rPr lang="de-DE" dirty="0" smtClean="0">
+                <a:solidFill>
+                  <a:schemeClr val="bg1"/>
+                </a:solidFill>
+              </a:rPr>
+              <a:t>Selbsterklärend</a:t>
+            </a:r>
+          </a:p>
+          <a:p>
+            <a:pPr lvl="0"/>
+            <a:r>
+              <a:rPr lang="de-DE" dirty="0" smtClean="0">
+                <a:solidFill>
+                  <a:schemeClr val="bg1"/>
+                </a:solidFill>
+              </a:rPr>
+              <a:t>Art &amp; Music</a:t>
+            </a:r>
+          </a:p>
+          <a:p>
+            <a:endParaRPr lang="de-DE" dirty="0"/>
+          </a:p>
+        </p:txBody>
+      </p:sp>
+    </p:spTree>
+    <p:extLst>
+      <p:ext uri="{BB962C8B-B14F-4D97-AF65-F5344CB8AC3E}">
+        <p14:creationId xmlns:p14="http://schemas.microsoft.com/office/powerpoint/2010/main" val="4215226063"/>
+      </p:ext>
+    </p:extLst>
+  </p:cSld>
+  <p:clrMapOvr>
+    <a:masterClrMapping/>
+  </p:clrMapOvr>
+  <p:timing>
+    <p:tnLst>
+      <p:par>
+        <p:cTn id="1" dur="indefinite" restart="never" nodeType="tmRoot"/>
+      </p:par>
+    </p:tnLst>
+  </p:timing>
+</p:sld>
+</file>
+
+<file path=ppt/slides/slide14.xml><?xml version="1.0" encoding="utf-8"?>
+<p:sld xmlns:a="http://schemas.openxmlformats.org/drawingml/2006/main" xmlns:r="http://schemas.openxmlformats.org/officeDocument/2006/relationships" xmlns:p="http://schemas.openxmlformats.org/presentationml/2006/main">
+  <p:cSld>
+    <p:spTree>
+      <p:nvGrpSpPr>
+        <p:cNvPr id="1" name=""/>
+        <p:cNvGrpSpPr/>
+        <p:nvPr/>
+      </p:nvGrpSpPr>
+      <p:grpSpPr>
+        <a:xfrm>
+          <a:off x="0" y="0"/>
+          <a:ext cx="0" cy="0"/>
+          <a:chOff x="0" y="0"/>
+          <a:chExt cx="0" cy="0"/>
+        </a:xfrm>
+      </p:grpSpPr>
+      <p:sp>
+        <p:nvSpPr>
+          <p:cNvPr id="2" name="Titel 1"/>
+          <p:cNvSpPr>
+            <a:spLocks noGrp="1"/>
+          </p:cNvSpPr>
+          <p:nvPr>
+            <p:ph type="title"/>
+          </p:nvPr>
+        </p:nvSpPr>
         <p:spPr/>
         <p:txBody>
           <a:bodyPr/>
           <a:lstStyle/>
           <a:p>
-            <a:endParaRPr lang="de-DE"/>
+            <a:r>
+              <a:rPr lang="de-DE" dirty="0" smtClean="0">
+                <a:solidFill>
+                  <a:schemeClr val="bg1"/>
+                </a:solidFill>
+              </a:rPr>
+              <a:t>Das Team</a:t>
+            </a:r>
+            <a:endParaRPr lang="de-DE" dirty="0">
+              <a:solidFill>
+                <a:schemeClr val="bg1"/>
+              </a:solidFill>
+            </a:endParaRPr>
+          </a:p>
+        </p:txBody>
+      </p:sp>
+      <p:sp>
+        <p:nvSpPr>
+          <p:cNvPr id="3" name="Inhaltsplatzhalter 2"/>
+          <p:cNvSpPr>
+            <a:spLocks noGrp="1"/>
+          </p:cNvSpPr>
+          <p:nvPr>
+            <p:ph idx="1"/>
+          </p:nvPr>
+        </p:nvSpPr>
+        <p:spPr>
+          <a:xfrm>
+            <a:off x="1609328" y="1600200"/>
+            <a:ext cx="5987008" cy="4525963"/>
+          </a:xfrm>
+        </p:spPr>
+        <p:txBody>
+          <a:bodyPr anchor="ctr">
+            <a:normAutofit/>
+          </a:bodyPr>
+          <a:lstStyle/>
+          <a:p>
+            <a:pPr marL="0" indent="0">
+              <a:lnSpc>
+                <a:spcPct val="150000"/>
+              </a:lnSpc>
+              <a:buNone/>
+            </a:pPr>
+            <a:r>
+              <a:rPr lang="de-DE" sz="2400" dirty="0" smtClean="0">
+                <a:solidFill>
+                  <a:schemeClr val="bg1"/>
+                </a:solidFill>
+              </a:rPr>
+              <a:t>Alina </a:t>
+            </a:r>
+            <a:r>
+              <a:rPr lang="de-DE" sz="2400" dirty="0" err="1" smtClean="0">
+                <a:solidFill>
+                  <a:schemeClr val="bg1"/>
+                </a:solidFill>
+              </a:rPr>
+              <a:t>Quentmeier</a:t>
+            </a:r>
+            <a:r>
+              <a:rPr lang="de-DE" sz="2400" dirty="0" smtClean="0">
+                <a:solidFill>
+                  <a:schemeClr val="bg1"/>
+                </a:solidFill>
+              </a:rPr>
+              <a:t> 		Game Design</a:t>
+            </a:r>
+          </a:p>
+          <a:p>
+            <a:pPr marL="0" indent="0">
+              <a:lnSpc>
+                <a:spcPct val="150000"/>
+              </a:lnSpc>
+              <a:buNone/>
+            </a:pPr>
+            <a:r>
+              <a:rPr lang="de-DE" sz="2400" dirty="0" smtClean="0">
+                <a:solidFill>
+                  <a:schemeClr val="bg1"/>
+                </a:solidFill>
+              </a:rPr>
+              <a:t>Jaromir </a:t>
+            </a:r>
+            <a:r>
+              <a:rPr lang="de-DE" sz="2400" dirty="0" err="1" smtClean="0">
+                <a:solidFill>
+                  <a:schemeClr val="bg1"/>
+                </a:solidFill>
+              </a:rPr>
+              <a:t>Paarmann</a:t>
+            </a:r>
+            <a:r>
+              <a:rPr lang="de-DE" sz="2400" dirty="0" smtClean="0">
+                <a:solidFill>
+                  <a:schemeClr val="bg1"/>
+                </a:solidFill>
+              </a:rPr>
+              <a:t> 		Game Design</a:t>
+            </a:r>
+          </a:p>
+          <a:p>
+            <a:pPr marL="0" indent="0">
+              <a:lnSpc>
+                <a:spcPct val="150000"/>
+              </a:lnSpc>
+              <a:buNone/>
+            </a:pPr>
+            <a:r>
+              <a:rPr lang="de-DE" sz="2400" dirty="0" smtClean="0">
+                <a:solidFill>
+                  <a:schemeClr val="bg1"/>
+                </a:solidFill>
+              </a:rPr>
+              <a:t>Andreas </a:t>
+            </a:r>
+            <a:r>
+              <a:rPr lang="de-DE" sz="2400" dirty="0" err="1" smtClean="0">
+                <a:solidFill>
+                  <a:schemeClr val="bg1"/>
+                </a:solidFill>
+              </a:rPr>
+              <a:t>Edmeier</a:t>
+            </a:r>
+            <a:r>
+              <a:rPr lang="de-DE" sz="2400" dirty="0" smtClean="0">
+                <a:solidFill>
+                  <a:schemeClr val="bg1"/>
+                </a:solidFill>
+              </a:rPr>
+              <a:t> 		Programmierung</a:t>
+            </a:r>
+          </a:p>
+          <a:p>
+            <a:pPr marL="0" indent="0">
+              <a:lnSpc>
+                <a:spcPct val="150000"/>
+              </a:lnSpc>
+              <a:buNone/>
+            </a:pPr>
+            <a:r>
+              <a:rPr lang="de-DE" sz="2400" dirty="0" smtClean="0">
+                <a:solidFill>
+                  <a:schemeClr val="bg1"/>
+                </a:solidFill>
+              </a:rPr>
+              <a:t>Harun </a:t>
+            </a:r>
+            <a:r>
+              <a:rPr lang="de-DE" sz="2400" dirty="0" err="1" smtClean="0">
+                <a:solidFill>
+                  <a:schemeClr val="bg1"/>
+                </a:solidFill>
+              </a:rPr>
+              <a:t>Ahmadie</a:t>
+            </a:r>
+            <a:r>
+              <a:rPr lang="de-DE" sz="2400" dirty="0" smtClean="0">
+                <a:solidFill>
+                  <a:schemeClr val="bg1"/>
+                </a:solidFill>
+              </a:rPr>
+              <a:t> 		Art</a:t>
+            </a:r>
           </a:p>
         </p:txBody>
       </p:sp>
@@ -13996,6 +14872,13 @@
   <p:clrMapOvr>
     <a:masterClrMapping/>
   </p:clrMapOvr>
+  <p:timing>
+    <p:tnLst>
+      <p:par>
+        <p:cTn id="1" dur="indefinite" restart="never" nodeType="tmRoot"/>
+      </p:par>
+    </p:tnLst>
+  </p:timing>
 </p:sld>
 </file>
 
@@ -14032,10 +14915,18 @@
           <a:lstStyle/>
           <a:p>
             <a:r>
-              <a:rPr lang="de-DE" dirty="0" smtClean="0"/>
+              <a:rPr lang="de-DE" dirty="0" smtClean="0">
+                <a:solidFill>
+                  <a:schemeClr val="bg1"/>
+                </a:solidFill>
+              </a:rPr>
               <a:t>Vision Statement</a:t>
             </a:r>
-            <a:endParaRPr lang="de-DE" dirty="0"/>
+            <a:endParaRPr lang="de-DE" dirty="0">
+              <a:solidFill>
+                <a:schemeClr val="bg1"/>
+              </a:solidFill>
+            </a:endParaRPr>
           </a:p>
         </p:txBody>
       </p:sp>
@@ -14060,8 +14951,16 @@
               <a:buNone/>
             </a:pPr>
             <a:r>
+              <a:rPr lang="de-DE" sz="2400" b="1" dirty="0">
+                <a:solidFill>
+                  <a:schemeClr val="bg1"/>
+                </a:solidFill>
+              </a:rPr>
+              <a:t>“Hammer Man”</a:t>
+            </a:r>
+            <a:r>
               <a:rPr lang="de-DE" sz="2400" b="1" dirty="0"/>
-              <a:t>“Hammer Man” </a:t>
+              <a:t> </a:t>
             </a:r>
             <a:r>
               <a:rPr lang="de-DE" sz="2400" dirty="0">
@@ -14074,12 +14973,24 @@
               <a:t>ist ein im </a:t>
             </a:r>
             <a:r>
-              <a:rPr lang="de-DE" sz="2400" b="1" dirty="0" err="1"/>
+              <a:rPr lang="de-DE" sz="2400" b="1" dirty="0" err="1">
+                <a:solidFill>
+                  <a:schemeClr val="bg1"/>
+                </a:solidFill>
+              </a:rPr>
               <a:t>Arcade</a:t>
             </a:r>
             <a:r>
               <a:rPr lang="de-DE" sz="2400" b="1" dirty="0"/>
-              <a:t> Stil</a:t>
+              <a:t> </a:t>
+            </a:r>
+            <a:r>
+              <a:rPr lang="de-DE" sz="2400" b="1" dirty="0">
+                <a:solidFill>
+                  <a:schemeClr val="bg1"/>
+                </a:solidFill>
+              </a:rPr>
+              <a:t>Stil</a:t>
             </a:r>
             <a:r>
               <a:rPr lang="de-DE" sz="2400" dirty="0"/>
@@ -14100,11 +15011,19 @@
               <a:t> </a:t>
             </a:r>
             <a:r>
-              <a:rPr lang="de-DE" sz="2400" b="1" dirty="0"/>
+              <a:rPr lang="de-DE" sz="2400" b="1" dirty="0">
+                <a:solidFill>
+                  <a:schemeClr val="bg1"/>
+                </a:solidFill>
+              </a:rPr>
               <a:t>Action </a:t>
             </a:r>
             <a:r>
-              <a:rPr lang="de-DE" sz="2400" b="1" dirty="0" err="1"/>
+              <a:rPr lang="de-DE" sz="2400" b="1" dirty="0" err="1">
+                <a:solidFill>
+                  <a:schemeClr val="bg1"/>
+                </a:solidFill>
+              </a:rPr>
               <a:t>Platformer</a:t>
             </a:r>
             <a:r>
@@ -14122,14 +15041,26 @@
               <a:t>für den </a:t>
             </a:r>
             <a:r>
-              <a:rPr lang="de-DE" sz="2400" b="1" dirty="0"/>
+              <a:rPr lang="de-DE" sz="2400" b="1" dirty="0">
+                <a:solidFill>
+                  <a:schemeClr val="bg1"/>
+                </a:solidFill>
+              </a:rPr>
               <a:t>PC</a:t>
             </a:r>
             <a:r>
-              <a:rPr lang="de-DE" sz="2400" dirty="0"/>
+              <a:rPr lang="de-DE" sz="2400" dirty="0">
+                <a:solidFill>
+                  <a:schemeClr val="bg1"/>
+                </a:solidFill>
+              </a:rPr>
               <a:t>. </a:t>
             </a:r>
-            <a:endParaRPr lang="de-DE" sz="2400" dirty="0" smtClean="0"/>
+            <a:endParaRPr lang="de-DE" sz="2400" dirty="0" smtClean="0">
+              <a:solidFill>
+                <a:schemeClr val="bg1"/>
+              </a:solidFill>
+            </a:endParaRPr>
           </a:p>
           <a:p>
             <a:pPr marL="0" indent="0">
@@ -14152,7 +15083,11 @@
               <a:t>Der </a:t>
             </a:r>
             <a:r>
-              <a:rPr lang="de-DE" sz="2400" b="1" dirty="0"/>
+              <a:rPr lang="de-DE" sz="2400" b="1" dirty="0">
+                <a:solidFill>
+                  <a:schemeClr val="bg1"/>
+                </a:solidFill>
+              </a:rPr>
               <a:t>Spieler</a:t>
             </a:r>
             <a:r>
@@ -14166,8 +15101,24 @@
               <a:t> übernimmt die Rolle von </a:t>
             </a:r>
             <a:r>
+              <a:rPr lang="de-DE" sz="2400" b="1" dirty="0">
+                <a:solidFill>
+                  <a:schemeClr val="bg1"/>
+                </a:solidFill>
+              </a:rPr>
+              <a:t>Hammer</a:t>
+            </a:r>
+            <a:r>
               <a:rPr lang="de-DE" sz="2400" b="1" dirty="0"/>
-              <a:t>Hammer Man</a:t>
+              <a:t> </a:t>
+            </a:r>
+            <a:r>
+              <a:rPr lang="de-DE" sz="2400" b="1" dirty="0">
+                <a:solidFill>
+                  <a:schemeClr val="bg1"/>
+                </a:solidFill>
+              </a:rPr>
+              <a:t>Man</a:t>
             </a:r>
             <a:r>
               <a:rPr lang="de-DE" sz="2400" dirty="0">
@@ -14180,8 +15131,20 @@
               <a:t>, einem Superhelden, der in einer </a:t>
             </a:r>
             <a:r>
-              <a:rPr lang="de-DE" sz="2400" b="1" dirty="0"/>
+              <a:rPr lang="de-DE" sz="2400" b="1" dirty="0">
+                <a:solidFill>
+                  <a:schemeClr val="bg1"/>
+                </a:solidFill>
+              </a:rPr>
               <a:t>amerikanischen Vorstadt der 80er</a:t>
+            </a:r>
+            <a:r>
+              <a:rPr lang="de-DE" sz="2400" dirty="0">
+                <a:solidFill>
+                  <a:schemeClr val="bg1"/>
+                </a:solidFill>
+              </a:rPr>
+              <a:t> </a:t>
             </a:r>
             <a:r>
               <a:rPr lang="de-DE" sz="2400" dirty="0">
@@ -14191,11 +15154,19 @@
                   </a:schemeClr>
                 </a:solidFill>
               </a:rPr>
-              <a:t> mit seinem </a:t>
+              <a:t>mit seinem </a:t>
+            </a:r>
+            <a:r>
+              <a:rPr lang="de-DE" sz="2400" b="1" dirty="0">
+                <a:solidFill>
+                  <a:schemeClr val="bg1"/>
+                </a:solidFill>
+              </a:rPr>
+              <a:t>riesigen Hammer</a:t>
             </a:r>
             <a:r>
               <a:rPr lang="de-DE" sz="2400" b="1" dirty="0"/>
-              <a:t>riesigen Hammer </a:t>
+              <a:t> </a:t>
             </a:r>
             <a:r>
               <a:rPr lang="de-DE" sz="2400" dirty="0">
@@ -14208,7 +15179,11 @@
               <a:t>einer </a:t>
             </a:r>
             <a:r>
-              <a:rPr lang="de-DE" sz="2400" b="1" dirty="0"/>
+              <a:rPr lang="de-DE" sz="2400" b="1" dirty="0">
+                <a:solidFill>
+                  <a:schemeClr val="bg1"/>
+                </a:solidFill>
+              </a:rPr>
               <a:t>Invasion kleiner Roboter </a:t>
             </a:r>
             <a:r>
@@ -14256,7 +15231,11 @@
               <a:t>Man </a:t>
             </a:r>
             <a:r>
-              <a:rPr lang="de-DE" sz="2400" b="1" dirty="0"/>
+              <a:rPr lang="de-DE" sz="2400" b="1" dirty="0">
+                <a:solidFill>
+                  <a:schemeClr val="bg1"/>
+                </a:solidFill>
+              </a:rPr>
               <a:t>bewegt</a:t>
             </a:r>
             <a:r>
@@ -14270,7 +15249,11 @@
               <a:t> Hammer Man mit den </a:t>
             </a:r>
             <a:r>
-              <a:rPr lang="de-DE" sz="2400" b="1" dirty="0"/>
+              <a:rPr lang="de-DE" sz="2400" b="1" dirty="0">
+                <a:solidFill>
+                  <a:schemeClr val="bg1"/>
+                </a:solidFill>
+              </a:rPr>
               <a:t>Pfeiltasten</a:t>
             </a:r>
             <a:r>
@@ -14284,7 +15267,11 @@
               <a:t> über die verschiedenen Etagen eines der Häuser der Vorstadt, das in einer </a:t>
             </a:r>
             <a:r>
-              <a:rPr lang="de-DE" sz="2400" b="1" dirty="0"/>
+              <a:rPr lang="de-DE" sz="2400" b="1" dirty="0">
+                <a:solidFill>
+                  <a:schemeClr val="bg1"/>
+                </a:solidFill>
+              </a:rPr>
               <a:t>2D Seitenansicht </a:t>
             </a:r>
             <a:r>
@@ -14316,6 +15303,13 @@
   <p:clrMapOvr>
     <a:masterClrMapping/>
   </p:clrMapOvr>
+  <p:timing>
+    <p:tnLst>
+      <p:par>
+        <p:cTn id="1" dur="indefinite" restart="never" nodeType="tmRoot"/>
+      </p:par>
+    </p:tnLst>
+  </p:timing>
 </p:sld>
 </file>
 
@@ -14352,10 +15346,18 @@
           <a:lstStyle/>
           <a:p>
             <a:r>
-              <a:rPr lang="de-DE" dirty="0" smtClean="0"/>
+              <a:rPr lang="de-DE" dirty="0" smtClean="0">
+                <a:solidFill>
+                  <a:schemeClr val="bg1"/>
+                </a:solidFill>
+              </a:rPr>
               <a:t>Key Facts</a:t>
             </a:r>
-            <a:endParaRPr lang="de-DE" dirty="0"/>
+            <a:endParaRPr lang="de-DE" dirty="0">
+              <a:solidFill>
+                <a:schemeClr val="bg1"/>
+              </a:solidFill>
+            </a:endParaRPr>
           </a:p>
         </p:txBody>
       </p:sp>
@@ -14377,80 +15379,152 @@
           <a:lstStyle/>
           <a:p>
             <a:r>
-              <a:rPr lang="de-DE" sz="2400" dirty="0"/>
+              <a:rPr lang="de-DE" sz="2400" dirty="0">
+                <a:solidFill>
+                  <a:schemeClr val="bg1"/>
+                </a:solidFill>
+              </a:rPr>
               <a:t>S</a:t>
             </a:r>
             <a:r>
-              <a:rPr lang="de-DE" sz="2400" dirty="0" smtClean="0"/>
+              <a:rPr lang="de-DE" sz="2400" dirty="0" smtClean="0">
+                <a:solidFill>
+                  <a:schemeClr val="bg1"/>
+                </a:solidFill>
+              </a:rPr>
               <a:t>ingle </a:t>
             </a:r>
             <a:r>
-              <a:rPr lang="de-DE" sz="2400" dirty="0" err="1" smtClean="0"/>
+              <a:rPr lang="de-DE" sz="2400" dirty="0" err="1" smtClean="0">
+                <a:solidFill>
+                  <a:schemeClr val="bg1"/>
+                </a:solidFill>
+              </a:rPr>
               <a:t>screen</a:t>
             </a:r>
             <a:r>
-              <a:rPr lang="de-DE" sz="2400" dirty="0" smtClean="0"/>
+              <a:rPr lang="de-DE" sz="2400" dirty="0" smtClean="0">
+                <a:solidFill>
+                  <a:schemeClr val="bg1"/>
+                </a:solidFill>
+              </a:rPr>
               <a:t> </a:t>
             </a:r>
             <a:r>
-              <a:rPr lang="de-DE" sz="2400" dirty="0" err="1" smtClean="0"/>
+              <a:rPr lang="de-DE" sz="2400" dirty="0" err="1" smtClean="0">
+                <a:solidFill>
+                  <a:schemeClr val="bg1"/>
+                </a:solidFill>
+              </a:rPr>
               <a:t>platformer</a:t>
             </a:r>
-            <a:endParaRPr lang="de-DE" sz="2400" dirty="0" smtClean="0"/>
+            <a:endParaRPr lang="de-DE" sz="2400" dirty="0" smtClean="0">
+              <a:solidFill>
+                <a:schemeClr val="bg1"/>
+              </a:solidFill>
+            </a:endParaRPr>
           </a:p>
           <a:p>
             <a:r>
-              <a:rPr lang="de-DE" sz="2400" dirty="0" smtClean="0"/>
+              <a:rPr lang="de-DE" sz="2400" dirty="0" smtClean="0">
+                <a:solidFill>
+                  <a:schemeClr val="bg1"/>
+                </a:solidFill>
+              </a:rPr>
               <a:t>Amerikanischer Vorort der 80er Jahre</a:t>
             </a:r>
           </a:p>
           <a:p>
             <a:r>
-              <a:rPr lang="de-DE" sz="2400" dirty="0" err="1" smtClean="0"/>
+              <a:rPr lang="de-DE" sz="2400" dirty="0" err="1" smtClean="0">
+                <a:solidFill>
+                  <a:schemeClr val="bg1"/>
+                </a:solidFill>
+              </a:rPr>
               <a:t>Pixelart</a:t>
             </a:r>
             <a:r>
-              <a:rPr lang="de-DE" sz="2400" dirty="0" smtClean="0"/>
+              <a:rPr lang="de-DE" sz="2400" dirty="0" smtClean="0">
+                <a:solidFill>
+                  <a:schemeClr val="bg1"/>
+                </a:solidFill>
+              </a:rPr>
               <a:t>, Comic</a:t>
             </a:r>
           </a:p>
           <a:p>
             <a:r>
-              <a:rPr lang="de-DE" sz="2400" dirty="0" smtClean="0"/>
+              <a:rPr lang="de-DE" sz="2400" dirty="0" smtClean="0">
+                <a:solidFill>
+                  <a:schemeClr val="bg1"/>
+                </a:solidFill>
+              </a:rPr>
               <a:t>PC</a:t>
             </a:r>
           </a:p>
           <a:p>
             <a:r>
-              <a:rPr lang="de-DE" sz="2400" dirty="0" err="1" smtClean="0"/>
+              <a:rPr lang="de-DE" sz="2400" dirty="0" err="1" smtClean="0">
+                <a:solidFill>
+                  <a:schemeClr val="bg1"/>
+                </a:solidFill>
+              </a:rPr>
               <a:t>Arcade</a:t>
             </a:r>
             <a:r>
-              <a:rPr lang="de-DE" sz="2400" dirty="0" smtClean="0"/>
+              <a:rPr lang="de-DE" sz="2400" dirty="0" smtClean="0">
+                <a:solidFill>
+                  <a:schemeClr val="bg1"/>
+                </a:solidFill>
+              </a:rPr>
               <a:t>-Liebhaber, Action-Liebhaber</a:t>
             </a:r>
           </a:p>
           <a:p>
             <a:r>
-              <a:rPr lang="de-DE" sz="2400" dirty="0" smtClean="0"/>
+              <a:rPr lang="de-DE" sz="2400" dirty="0" smtClean="0">
+                <a:solidFill>
+                  <a:schemeClr val="bg1"/>
+                </a:solidFill>
+              </a:rPr>
               <a:t>Made </a:t>
             </a:r>
             <a:r>
-              <a:rPr lang="de-DE" sz="2400" dirty="0" err="1" smtClean="0"/>
+              <a:rPr lang="de-DE" sz="2400" dirty="0" err="1" smtClean="0">
+                <a:solidFill>
+                  <a:schemeClr val="bg1"/>
+                </a:solidFill>
+              </a:rPr>
               <a:t>with</a:t>
             </a:r>
             <a:r>
-              <a:rPr lang="de-DE" sz="2400" dirty="0" smtClean="0"/>
+              <a:rPr lang="de-DE" sz="2400" dirty="0" smtClean="0">
+                <a:solidFill>
+                  <a:schemeClr val="bg1"/>
+                </a:solidFill>
+              </a:rPr>
               <a:t> </a:t>
             </a:r>
             <a:r>
-              <a:rPr lang="de-DE" sz="2400" dirty="0" err="1" smtClean="0"/>
+              <a:rPr lang="de-DE" sz="2400" dirty="0" err="1" smtClean="0">
+                <a:solidFill>
+                  <a:schemeClr val="bg1"/>
+                </a:solidFill>
+              </a:rPr>
               <a:t>Unity</a:t>
             </a:r>
-            <a:endParaRPr lang="de-DE" sz="2400" dirty="0" smtClean="0"/>
+            <a:endParaRPr lang="de-DE" sz="2400" dirty="0" smtClean="0">
+              <a:solidFill>
+                <a:schemeClr val="bg1"/>
+              </a:solidFill>
+            </a:endParaRPr>
           </a:p>
           <a:p>
-            <a:endParaRPr lang="de-DE" sz="2400" dirty="0" smtClean="0"/>
+            <a:endParaRPr lang="de-DE" sz="2400" dirty="0" smtClean="0">
+              <a:solidFill>
+                <a:schemeClr val="bg1"/>
+              </a:solidFill>
+            </a:endParaRPr>
           </a:p>
         </p:txBody>
       </p:sp>
@@ -14464,6 +15538,13 @@
   <p:clrMapOvr>
     <a:masterClrMapping/>
   </p:clrMapOvr>
+  <p:timing>
+    <p:tnLst>
+      <p:par>
+        <p:cTn id="1" dur="indefinite" restart="never" nodeType="tmRoot"/>
+      </p:par>
+    </p:tnLst>
+  </p:timing>
 </p:sld>
 </file>
 
@@ -14505,14 +15586,26 @@
           <a:lstStyle/>
           <a:p>
             <a:r>
-              <a:rPr lang="de-DE" dirty="0" smtClean="0"/>
+              <a:rPr lang="de-DE" dirty="0" smtClean="0">
+                <a:solidFill>
+                  <a:schemeClr val="bg1"/>
+                </a:solidFill>
+              </a:rPr>
               <a:t>Referenz </a:t>
             </a:r>
             <a:r>
-              <a:rPr lang="de-DE" dirty="0" err="1" smtClean="0"/>
+              <a:rPr lang="de-DE" dirty="0" err="1" smtClean="0">
+                <a:solidFill>
+                  <a:schemeClr val="bg1"/>
+                </a:solidFill>
+              </a:rPr>
               <a:t>Gameplay</a:t>
             </a:r>
-            <a:endParaRPr lang="de-DE" dirty="0"/>
+            <a:endParaRPr lang="de-DE" dirty="0">
+              <a:solidFill>
+                <a:schemeClr val="bg1"/>
+              </a:solidFill>
+            </a:endParaRPr>
           </a:p>
         </p:txBody>
       </p:sp>
@@ -14556,6 +15649,13 @@
   <p:clrMapOvr>
     <a:masterClrMapping/>
   </p:clrMapOvr>
+  <p:timing>
+    <p:tnLst>
+      <p:par>
+        <p:cTn id="1" dur="indefinite" restart="never" nodeType="tmRoot"/>
+      </p:par>
+    </p:tnLst>
+  </p:timing>
 </p:sld>
 </file>
 
@@ -14592,10 +15692,18 @@
           <a:lstStyle/>
           <a:p>
             <a:r>
-              <a:rPr lang="de-DE" dirty="0" smtClean="0"/>
+              <a:rPr lang="de-DE" dirty="0" smtClean="0">
+                <a:solidFill>
+                  <a:schemeClr val="bg1"/>
+                </a:solidFill>
+              </a:rPr>
               <a:t>Referenzen Art</a:t>
             </a:r>
-            <a:endParaRPr lang="de-DE" dirty="0"/>
+            <a:endParaRPr lang="de-DE" dirty="0">
+              <a:solidFill>
+                <a:schemeClr val="bg1"/>
+              </a:solidFill>
+            </a:endParaRPr>
           </a:p>
         </p:txBody>
       </p:sp>
@@ -14727,6 +15835,13 @@
   <p:clrMapOvr>
     <a:masterClrMapping/>
   </p:clrMapOvr>
+  <p:timing>
+    <p:tnLst>
+      <p:par>
+        <p:cTn id="1" dur="indefinite" restart="never" nodeType="tmRoot"/>
+      </p:par>
+    </p:tnLst>
+  </p:timing>
 </p:sld>
 </file>
 
@@ -14763,20 +15878,32 @@
           <a:lstStyle/>
           <a:p>
             <a:r>
-              <a:rPr lang="de-DE" dirty="0" err="1" smtClean="0"/>
+              <a:rPr lang="de-DE" dirty="0" err="1" smtClean="0">
+                <a:solidFill>
+                  <a:schemeClr val="bg1"/>
+                </a:solidFill>
+              </a:rPr>
               <a:t>Concept</a:t>
             </a:r>
             <a:r>
-              <a:rPr lang="de-DE" dirty="0" smtClean="0"/>
+              <a:rPr lang="de-DE" dirty="0" smtClean="0">
+                <a:solidFill>
+                  <a:schemeClr val="bg1"/>
+                </a:solidFill>
+              </a:rPr>
               <a:t> Art</a:t>
             </a:r>
-            <a:endParaRPr lang="de-DE" dirty="0"/>
+            <a:endParaRPr lang="de-DE" dirty="0">
+              <a:solidFill>
+                <a:schemeClr val="bg1"/>
+              </a:solidFill>
+            </a:endParaRPr>
           </a:p>
         </p:txBody>
       </p:sp>
       <p:sp>
         <p:nvSpPr>
-          <p:cNvPr id="3" name="Inhaltsplatzhalter 2"/>
+          <p:cNvPr id="5" name="Inhaltsplatzhalter 4"/>
           <p:cNvSpPr>
             <a:spLocks noGrp="1"/>
           </p:cNvSpPr>
@@ -14789,10 +15916,7 @@
           <a:bodyPr/>
           <a:lstStyle/>
           <a:p>
-            <a:pPr marL="0" indent="0">
-              <a:buNone/>
-            </a:pPr>
-            <a:endParaRPr lang="de-DE" dirty="0" smtClean="0"/>
+            <a:endParaRPr lang="de-DE"/>
           </a:p>
         </p:txBody>
       </p:sp>
@@ -14806,6 +15930,13 @@
   <p:clrMapOvr>
     <a:masterClrMapping/>
   </p:clrMapOvr>
+  <p:timing>
+    <p:tnLst>
+      <p:par>
+        <p:cTn id="1" dur="indefinite" restart="never" nodeType="tmRoot"/>
+      </p:par>
+    </p:tnLst>
+  </p:timing>
 </p:sld>
 </file>
 
@@ -14847,10 +15978,18 @@
           <a:lstStyle/>
           <a:p>
             <a:r>
-              <a:rPr lang="de-DE" dirty="0" smtClean="0"/>
-              <a:t>Prototyp/3M</a:t>
-            </a:r>
-            <a:endParaRPr lang="de-DE" dirty="0"/>
+              <a:rPr lang="de-DE" dirty="0" smtClean="0">
+                <a:solidFill>
+                  <a:schemeClr val="bg1"/>
+                </a:solidFill>
+              </a:rPr>
+              <a:t>Eine kleine Demonstration</a:t>
+            </a:r>
+            <a:endParaRPr lang="de-DE" dirty="0">
+              <a:solidFill>
+                <a:schemeClr val="bg1"/>
+              </a:solidFill>
+            </a:endParaRPr>
           </a:p>
         </p:txBody>
       </p:sp>
@@ -14907,14 +16046,26 @@
           <a:lstStyle/>
           <a:p>
             <a:r>
-              <a:rPr lang="de-DE" dirty="0" smtClean="0"/>
-              <a:t>Loop/</a:t>
-            </a:r>
-            <a:r>
-              <a:rPr lang="de-DE" dirty="0" err="1" smtClean="0"/>
-              <a:t>Phases</a:t>
-            </a:r>
-            <a:endParaRPr lang="de-DE" dirty="0"/>
+              <a:rPr lang="de-DE" dirty="0" err="1" smtClean="0">
+                <a:solidFill>
+                  <a:schemeClr val="bg1"/>
+                </a:solidFill>
+              </a:rPr>
+              <a:t>Gameloop</a:t>
+            </a:r>
+            <a:r>
+              <a:rPr lang="de-DE" dirty="0" smtClean="0">
+                <a:solidFill>
+                  <a:schemeClr val="bg1"/>
+                </a:solidFill>
+              </a:rPr>
+              <a:t>: Welle</a:t>
+            </a:r>
+            <a:endParaRPr lang="de-DE" dirty="0">
+              <a:solidFill>
+                <a:schemeClr val="bg1"/>
+              </a:solidFill>
+            </a:endParaRPr>
           </a:p>
         </p:txBody>
       </p:sp>
@@ -14950,6 +16101,13 @@
   <p:clrMapOvr>
     <a:masterClrMapping/>
   </p:clrMapOvr>
+  <p:timing>
+    <p:tnLst>
+      <p:par>
+        <p:cTn id="1" dur="indefinite" restart="never" nodeType="tmRoot"/>
+      </p:par>
+    </p:tnLst>
+  </p:timing>
 </p:sld>
 </file>
 
@@ -14986,14 +16144,18 @@
           <a:lstStyle/>
           <a:p>
             <a:r>
-              <a:rPr lang="de-DE" dirty="0" smtClean="0"/>
-              <a:t>Loop/</a:t>
-            </a:r>
-            <a:r>
-              <a:rPr lang="de-DE" dirty="0" err="1" smtClean="0"/>
-              <a:t>Phases</a:t>
-            </a:r>
-            <a:endParaRPr lang="de-DE" dirty="0"/>
+              <a:rPr lang="de-DE" dirty="0" err="1" smtClean="0">
+                <a:solidFill>
+                  <a:schemeClr val="bg1"/>
+                </a:solidFill>
+              </a:rPr>
+              <a:t>Gameloop</a:t>
+            </a:r>
+            <a:endParaRPr lang="de-DE" dirty="0">
+              <a:solidFill>
+                <a:schemeClr val="bg1"/>
+              </a:solidFill>
+            </a:endParaRPr>
           </a:p>
         </p:txBody>
       </p:sp>
@@ -15007,13 +16169,13 @@
             <p:ph idx="1"/>
             <p:extLst>
               <p:ext uri="{D42A27DB-BD31-4B8C-83A1-F6EECF244321}">
-                <p14:modId xmlns:p14="http://schemas.microsoft.com/office/powerpoint/2010/main" val="3832576068"/>
+                <p14:modId xmlns:p14="http://schemas.microsoft.com/office/powerpoint/2010/main" val="3005141590"/>
               </p:ext>
             </p:extLst>
           </p:nvPr>
         </p:nvGraphicFramePr>
         <p:xfrm>
-          <a:off x="27891" y="1124744"/>
+          <a:off x="323528" y="1556792"/>
           <a:ext cx="8589640" cy="5102027"/>
         </p:xfrm>
         <a:graphic>
@@ -15029,13 +16191,13 @@
           <p:nvPr>
             <p:extLst>
               <p:ext uri="{D42A27DB-BD31-4B8C-83A1-F6EECF244321}">
-                <p14:modId xmlns:p14="http://schemas.microsoft.com/office/powerpoint/2010/main" val="3352362786"/>
+                <p14:modId xmlns:p14="http://schemas.microsoft.com/office/powerpoint/2010/main" val="1658822366"/>
               </p:ext>
             </p:extLst>
           </p:nvPr>
         </p:nvGraphicFramePr>
         <p:xfrm>
-          <a:off x="4355976" y="3789040"/>
+          <a:off x="4651613" y="4221088"/>
           <a:ext cx="3408040" cy="2233828"/>
         </p:xfrm>
         <a:graphic>
@@ -15051,13 +16213,13 @@
           <p:nvPr>
             <p:extLst>
               <p:ext uri="{D42A27DB-BD31-4B8C-83A1-F6EECF244321}">
-                <p14:modId xmlns:p14="http://schemas.microsoft.com/office/powerpoint/2010/main" val="2964529143"/>
+                <p14:modId xmlns:p14="http://schemas.microsoft.com/office/powerpoint/2010/main" val="2772460368"/>
               </p:ext>
             </p:extLst>
           </p:nvPr>
         </p:nvGraphicFramePr>
         <p:xfrm>
-          <a:off x="2483768" y="1196752"/>
+          <a:off x="2779405" y="1628800"/>
           <a:ext cx="3408040" cy="2233828"/>
         </p:xfrm>
         <a:graphic>
@@ -15076,6 +16238,13 @@
   <p:clrMapOvr>
     <a:masterClrMapping/>
   </p:clrMapOvr>
+  <p:timing>
+    <p:tnLst>
+      <p:par>
+        <p:cTn id="1" dur="indefinite" restart="never" nodeType="tmRoot"/>
+      </p:par>
+    </p:tnLst>
+  </p:timing>
 </p:sld>
 </file>
 

</xml_diff>

<commit_message>
Changed Fonts in PPP
</commit_message>
<xml_diff>
--- a/Documentation/Hammer Man.pptx
+++ b/Documentation/Hammer Man.pptx
@@ -13776,23 +13776,32 @@
             <p:ph type="ctrTitle"/>
           </p:nvPr>
         </p:nvSpPr>
-        <p:spPr/>
+        <p:spPr>
+          <a:xfrm>
+            <a:off x="683568" y="1772816"/>
+            <a:ext cx="7772400" cy="1470025"/>
+          </a:xfrm>
+        </p:spPr>
         <p:txBody>
-          <a:bodyPr/>
+          <a:bodyPr>
+            <a:normAutofit/>
+          </a:bodyPr>
           <a:lstStyle/>
           <a:p>
             <a:r>
-              <a:rPr lang="de-DE" dirty="0" smtClean="0">
+              <a:rPr lang="de-DE" sz="8800" dirty="0" smtClean="0">
                 <a:solidFill>
                   <a:schemeClr val="bg1"/>
                 </a:solidFill>
+                <a:latin typeface="Showcard Gothic" panose="04020904020102020604" pitchFamily="82" charset="0"/>
               </a:rPr>
               <a:t>Hammer Man</a:t>
             </a:r>
-            <a:endParaRPr lang="de-DE" dirty="0">
+            <a:endParaRPr lang="de-DE" sz="8800" dirty="0">
               <a:solidFill>
                 <a:schemeClr val="bg1"/>
               </a:solidFill>
+              <a:latin typeface="Showcard Gothic" panose="04020904020102020604" pitchFamily="82" charset="0"/>
             </a:endParaRPr>
           </a:p>
         </p:txBody>
@@ -13807,7 +13816,12 @@
             <p:ph type="subTitle" idx="1"/>
           </p:nvPr>
         </p:nvSpPr>
-        <p:spPr/>
+        <p:spPr>
+          <a:xfrm>
+            <a:off x="1403648" y="3717032"/>
+            <a:ext cx="6400800" cy="1752600"/>
+          </a:xfrm>
+        </p:spPr>
         <p:txBody>
           <a:bodyPr/>
           <a:lstStyle/>
@@ -13817,6 +13831,8 @@
                 <a:solidFill>
                   <a:schemeClr val="bg1"/>
                 </a:solidFill>
+                <a:latin typeface="TeXGyreAdventor" pitchFamily="50" charset="0"/>
+                <a:cs typeface="Times New Roman" panose="02020603050405020304" pitchFamily="18" charset="0"/>
               </a:rPr>
               <a:t>It‘s</a:t>
             </a:r>
@@ -13825,13 +13841,27 @@
                 <a:solidFill>
                   <a:schemeClr val="bg1"/>
                 </a:solidFill>
+                <a:latin typeface="TeXGyreAdventor" pitchFamily="50" charset="0"/>
+                <a:cs typeface="Times New Roman" panose="02020603050405020304" pitchFamily="18" charset="0"/>
               </a:rPr>
-              <a:t> Hammer Time!</a:t>
+              <a:t> </a:t>
+            </a:r>
+            <a:r>
+              <a:rPr lang="de-DE" dirty="0" smtClean="0">
+                <a:solidFill>
+                  <a:schemeClr val="bg1"/>
+                </a:solidFill>
+                <a:latin typeface="TeXGyreAdventor" pitchFamily="50" charset="0"/>
+                <a:cs typeface="Times New Roman" panose="02020603050405020304" pitchFamily="18" charset="0"/>
+              </a:rPr>
+              <a:t>Hammer Time!</a:t>
             </a:r>
             <a:endParaRPr lang="de-DE" dirty="0">
               <a:solidFill>
                 <a:schemeClr val="bg1"/>
               </a:solidFill>
+              <a:latin typeface="TeXGyreAdventor" pitchFamily="50" charset="0"/>
+              <a:cs typeface="Times New Roman" panose="02020603050405020304" pitchFamily="18" charset="0"/>
             </a:endParaRPr>
           </a:p>
         </p:txBody>
@@ -13893,11 +13923,14 @@
                 <a:solidFill>
                   <a:schemeClr val="bg1"/>
                 </a:solidFill>
+                <a:latin typeface="TeXGyreAdventor" pitchFamily="50" charset="0"/>
               </a:rPr>
               <a:t>Design</a:t>
             </a:r>
             <a:r>
-              <a:rPr lang="de-DE" dirty="0" smtClean="0"/>
+              <a:rPr lang="de-DE" dirty="0" smtClean="0">
+                <a:latin typeface="TeXGyreAdventor" pitchFamily="50" charset="0"/>
+              </a:rPr>
               <a:t> </a:t>
             </a:r>
             <a:r>
@@ -13905,6 +13938,7 @@
                 <a:solidFill>
                   <a:schemeClr val="bg1"/>
                 </a:solidFill>
+                <a:latin typeface="TeXGyreAdventor" pitchFamily="50" charset="0"/>
               </a:rPr>
               <a:t>Prinzipien</a:t>
             </a:r>
@@ -13912,6 +13946,7 @@
               <a:solidFill>
                 <a:schemeClr val="bg1"/>
               </a:solidFill>
+              <a:latin typeface="TeXGyreAdventor" pitchFamily="50" charset="0"/>
             </a:endParaRPr>
           </a:p>
         </p:txBody>
@@ -13928,13 +13963,13 @@
         </p:nvSpPr>
         <p:spPr>
           <a:xfrm>
-            <a:off x="1619672" y="1600200"/>
-            <a:ext cx="5915000" cy="4525963"/>
+            <a:off x="1547664" y="1600200"/>
+            <a:ext cx="6048672" cy="4525963"/>
           </a:xfrm>
         </p:spPr>
         <p:txBody>
           <a:bodyPr>
-            <a:normAutofit fontScale="92500" lnSpcReduction="20000"/>
+            <a:normAutofit fontScale="85000" lnSpcReduction="10000"/>
           </a:bodyPr>
           <a:lstStyle/>
           <a:p>
@@ -13944,6 +13979,7 @@
                 <a:solidFill>
                   <a:schemeClr val="bg1"/>
                 </a:solidFill>
+                <a:latin typeface="TeXGyreAdventor" pitchFamily="50" charset="0"/>
               </a:rPr>
               <a:t>Roboter zertrümmern </a:t>
             </a:r>
@@ -13952,6 +13988,7 @@
                 <a:solidFill>
                   <a:schemeClr val="bg1"/>
                 </a:solidFill>
+                <a:latin typeface="TeXGyreAdventor" pitchFamily="50" charset="0"/>
               </a:rPr>
               <a:t>fetzt richtig!</a:t>
             </a:r>
@@ -13959,6 +13996,7 @@
               <a:solidFill>
                 <a:schemeClr val="bg1"/>
               </a:solidFill>
+              <a:latin typeface="TeXGyreAdventor" pitchFamily="50" charset="0"/>
             </a:endParaRPr>
           </a:p>
           <a:p>
@@ -13968,6 +14006,7 @@
                 <a:solidFill>
                   <a:schemeClr val="bg1"/>
                 </a:solidFill>
+                <a:latin typeface="TeXGyreAdventor" pitchFamily="50" charset="0"/>
               </a:rPr>
               <a:t>Angriff ist beste </a:t>
             </a:r>
@@ -13976,6 +14015,7 @@
                 <a:solidFill>
                   <a:schemeClr val="bg1"/>
                 </a:solidFill>
+                <a:latin typeface="TeXGyreAdventor" pitchFamily="50" charset="0"/>
               </a:rPr>
               <a:t>Verteidigung!</a:t>
             </a:r>
@@ -13987,6 +14027,7 @@
                 <a:solidFill>
                   <a:schemeClr val="bg1"/>
                 </a:solidFill>
+                <a:latin typeface="TeXGyreAdventor" pitchFamily="50" charset="0"/>
               </a:rPr>
               <a:t>Der </a:t>
             </a:r>
@@ -13995,6 +14036,7 @@
                 <a:solidFill>
                   <a:schemeClr val="bg1"/>
                 </a:solidFill>
+                <a:latin typeface="TeXGyreAdventor" pitchFamily="50" charset="0"/>
               </a:rPr>
               <a:t>Hammer schlägt den </a:t>
             </a:r>
@@ -14003,6 +14045,7 @@
                 <a:solidFill>
                   <a:schemeClr val="bg1"/>
                 </a:solidFill>
+                <a:latin typeface="TeXGyreAdventor" pitchFamily="50" charset="0"/>
               </a:rPr>
               <a:t>Takt!</a:t>
             </a:r>
@@ -14010,6 +14053,7 @@
               <a:solidFill>
                 <a:schemeClr val="bg1"/>
               </a:solidFill>
+              <a:latin typeface="TeXGyreAdventor" pitchFamily="50" charset="0"/>
             </a:endParaRPr>
           </a:p>
           <a:p>
@@ -14019,6 +14063,7 @@
                 <a:solidFill>
                   <a:schemeClr val="bg1"/>
                 </a:solidFill>
+                <a:latin typeface="TeXGyreAdventor" pitchFamily="50" charset="0"/>
               </a:rPr>
               <a:t>Immer in </a:t>
             </a:r>
@@ -14027,6 +14072,7 @@
                 <a:solidFill>
                   <a:schemeClr val="bg1"/>
                 </a:solidFill>
+                <a:latin typeface="TeXGyreAdventor" pitchFamily="50" charset="0"/>
               </a:rPr>
               <a:t>Bewegung!</a:t>
             </a:r>
@@ -14034,6 +14080,7 @@
               <a:solidFill>
                 <a:schemeClr val="bg1"/>
               </a:solidFill>
+              <a:latin typeface="TeXGyreAdventor" pitchFamily="50" charset="0"/>
             </a:endParaRPr>
           </a:p>
           <a:p>
@@ -14043,6 +14090,7 @@
                 <a:solidFill>
                   <a:schemeClr val="bg1"/>
                 </a:solidFill>
+                <a:latin typeface="TeXGyreAdventor" pitchFamily="50" charset="0"/>
               </a:rPr>
               <a:t>Hammer Man – der wahre Held!</a:t>
             </a:r>
@@ -14054,6 +14102,7 @@
                 <a:solidFill>
                   <a:schemeClr val="bg1"/>
                 </a:solidFill>
+                <a:latin typeface="TeXGyreAdventor" pitchFamily="50" charset="0"/>
               </a:rPr>
               <a:t>Roboter – etwas trottelig!</a:t>
             </a:r>
@@ -14065,6 +14114,7 @@
                 <a:solidFill>
                   <a:schemeClr val="bg1"/>
                 </a:solidFill>
+                <a:latin typeface="TeXGyreAdventor" pitchFamily="50" charset="0"/>
               </a:rPr>
               <a:t>Warum so ernst?</a:t>
             </a:r>
@@ -14072,6 +14122,7 @@
               <a:solidFill>
                 <a:schemeClr val="bg1"/>
               </a:solidFill>
+              <a:latin typeface="TeXGyreAdventor" pitchFamily="50" charset="0"/>
             </a:endParaRPr>
           </a:p>
           <a:p>
@@ -14081,6 +14132,7 @@
                 <a:solidFill>
                   <a:schemeClr val="bg1"/>
                 </a:solidFill>
+                <a:latin typeface="TeXGyreAdventor" pitchFamily="50" charset="0"/>
               </a:rPr>
               <a:t>Einfach zu </a:t>
             </a:r>
@@ -14089,6 +14141,7 @@
                 <a:solidFill>
                   <a:schemeClr val="bg1"/>
                 </a:solidFill>
+                <a:latin typeface="TeXGyreAdventor" pitchFamily="50" charset="0"/>
               </a:rPr>
               <a:t>verstehen!</a:t>
             </a:r>
@@ -14100,6 +14153,7 @@
                 <a:solidFill>
                   <a:schemeClr val="bg1"/>
                 </a:solidFill>
+                <a:latin typeface="TeXGyreAdventor" pitchFamily="50" charset="0"/>
               </a:rPr>
               <a:t>Bewegung </a:t>
             </a:r>
@@ -14108,6 +14162,7 @@
                 <a:solidFill>
                   <a:schemeClr val="bg1"/>
                 </a:solidFill>
+                <a:latin typeface="TeXGyreAdventor" pitchFamily="50" charset="0"/>
               </a:rPr>
               <a:t>macht </a:t>
             </a:r>
@@ -14116,6 +14171,7 @@
                 <a:solidFill>
                   <a:schemeClr val="bg1"/>
                 </a:solidFill>
+                <a:latin typeface="TeXGyreAdventor" pitchFamily="50" charset="0"/>
               </a:rPr>
               <a:t>Spaß!</a:t>
             </a:r>
@@ -14123,6 +14179,7 @@
               <a:solidFill>
                 <a:schemeClr val="bg1"/>
               </a:solidFill>
+              <a:latin typeface="TeXGyreAdventor" pitchFamily="50" charset="0"/>
             </a:endParaRPr>
           </a:p>
         </p:txBody>
@@ -14184,6 +14241,7 @@
                 <a:solidFill>
                   <a:schemeClr val="bg1"/>
                 </a:solidFill>
+                <a:latin typeface="TeXGyreAdventor" pitchFamily="50" charset="0"/>
               </a:rPr>
               <a:t>Wo liegt der Spaß?</a:t>
             </a:r>
@@ -14191,6 +14249,7 @@
               <a:solidFill>
                 <a:schemeClr val="bg1"/>
               </a:solidFill>
+              <a:latin typeface="TeXGyreAdventor" pitchFamily="50" charset="0"/>
             </a:endParaRPr>
           </a:p>
         </p:txBody>
@@ -14342,6 +14401,7 @@
                 <a:solidFill>
                   <a:schemeClr val="bg1"/>
                 </a:solidFill>
+                <a:latin typeface="TeXGyreAdventor" pitchFamily="50" charset="0"/>
               </a:rPr>
               <a:t>Vision</a:t>
             </a:r>
@@ -14349,6 +14409,7 @@
               <a:solidFill>
                 <a:schemeClr val="bg1"/>
               </a:solidFill>
+              <a:latin typeface="TeXGyreAdventor" pitchFamily="50" charset="0"/>
             </a:endParaRPr>
           </a:p>
         </p:txBody>
@@ -14365,13 +14426,13 @@
         </p:nvSpPr>
         <p:spPr>
           <a:xfrm>
-            <a:off x="1547664" y="1628800"/>
-            <a:ext cx="6048672" cy="4525963"/>
+            <a:off x="1259632" y="1628800"/>
+            <a:ext cx="6624736" cy="4525963"/>
           </a:xfrm>
         </p:spPr>
         <p:txBody>
           <a:bodyPr>
-            <a:normAutofit/>
+            <a:normAutofit fontScale="92500"/>
           </a:bodyPr>
           <a:lstStyle/>
           <a:p>
@@ -14381,6 +14442,7 @@
                 <a:solidFill>
                   <a:schemeClr val="bg1"/>
                 </a:solidFill>
+                <a:latin typeface="TeXGyreAdventor" pitchFamily="50" charset="0"/>
               </a:rPr>
               <a:t>Items/Power </a:t>
             </a:r>
@@ -14389,6 +14451,7 @@
                 <a:solidFill>
                   <a:schemeClr val="bg1"/>
                 </a:solidFill>
+                <a:latin typeface="TeXGyreAdventor" pitchFamily="50" charset="0"/>
               </a:rPr>
               <a:t>Ups</a:t>
             </a:r>
@@ -14396,6 +14459,7 @@
               <a:solidFill>
                 <a:schemeClr val="bg1"/>
               </a:solidFill>
+              <a:latin typeface="TeXGyreAdventor" pitchFamily="50" charset="0"/>
             </a:endParaRPr>
           </a:p>
           <a:p>
@@ -14405,6 +14469,7 @@
                 <a:solidFill>
                   <a:schemeClr val="bg1"/>
                 </a:solidFill>
+                <a:latin typeface="TeXGyreAdventor" pitchFamily="50" charset="0"/>
               </a:rPr>
               <a:t>Shop/Upgrades</a:t>
             </a:r>
@@ -14412,6 +14477,7 @@
               <a:solidFill>
                 <a:schemeClr val="bg1"/>
               </a:solidFill>
+              <a:latin typeface="TeXGyreAdventor" pitchFamily="50" charset="0"/>
             </a:endParaRPr>
           </a:p>
           <a:p>
@@ -14421,6 +14487,7 @@
                 <a:solidFill>
                   <a:schemeClr val="bg1"/>
                 </a:solidFill>
+                <a:latin typeface="TeXGyreAdventor" pitchFamily="50" charset="0"/>
               </a:rPr>
               <a:t>Zerstörbare Wände/Hindernisse</a:t>
             </a:r>
@@ -14432,6 +14499,7 @@
                 <a:solidFill>
                   <a:schemeClr val="bg1"/>
                 </a:solidFill>
+                <a:latin typeface="TeXGyreAdventor" pitchFamily="50" charset="0"/>
               </a:rPr>
               <a:t>Boss Gegner</a:t>
             </a:r>
@@ -14443,6 +14511,7 @@
                 <a:solidFill>
                   <a:schemeClr val="bg1"/>
                 </a:solidFill>
+                <a:latin typeface="TeXGyreAdventor" pitchFamily="50" charset="0"/>
               </a:rPr>
               <a:t>Gegner </a:t>
             </a:r>
@@ -14451,6 +14520,7 @@
                 <a:solidFill>
                   <a:schemeClr val="bg1"/>
                 </a:solidFill>
+                <a:latin typeface="TeXGyreAdventor" pitchFamily="50" charset="0"/>
               </a:rPr>
               <a:t>fliehen vor Hammer Man</a:t>
             </a:r>
@@ -14458,6 +14528,7 @@
               <a:solidFill>
                 <a:schemeClr val="bg1"/>
               </a:solidFill>
+              <a:latin typeface="TeXGyreAdventor" pitchFamily="50" charset="0"/>
             </a:endParaRPr>
           </a:p>
           <a:p>
@@ -14467,6 +14538,7 @@
                 <a:solidFill>
                   <a:schemeClr val="bg1"/>
                 </a:solidFill>
+                <a:latin typeface="TeXGyreAdventor" pitchFamily="50" charset="0"/>
               </a:rPr>
               <a:t>Ebenen bewegen sich</a:t>
             </a:r>
@@ -14474,6 +14546,7 @@
               <a:solidFill>
                 <a:schemeClr val="bg1"/>
               </a:solidFill>
+              <a:latin typeface="TeXGyreAdventor" pitchFamily="50" charset="0"/>
             </a:endParaRPr>
           </a:p>
           <a:p>
@@ -14483,6 +14556,7 @@
                 <a:solidFill>
                   <a:schemeClr val="bg1"/>
                 </a:solidFill>
+                <a:latin typeface="TeXGyreAdventor" pitchFamily="50" charset="0"/>
               </a:rPr>
               <a:t>Spawner</a:t>
             </a:r>
@@ -14491,6 +14565,7 @@
                 <a:solidFill>
                   <a:schemeClr val="bg1"/>
                 </a:solidFill>
+                <a:latin typeface="TeXGyreAdventor" pitchFamily="50" charset="0"/>
               </a:rPr>
               <a:t> bewegen sich</a:t>
             </a:r>
@@ -14700,6 +14775,7 @@
                 <a:solidFill>
                   <a:schemeClr val="bg1"/>
                 </a:solidFill>
+                <a:latin typeface="TeXGyreAdventor" pitchFamily="50" charset="0"/>
               </a:rPr>
               <a:t>Das Team</a:t>
             </a:r>
@@ -14707,6 +14783,7 @@
               <a:solidFill>
                 <a:schemeClr val="bg1"/>
               </a:solidFill>
+              <a:latin typeface="TeXGyreAdventor" pitchFamily="50" charset="0"/>
             </a:endParaRPr>
           </a:p>
         </p:txBody>
@@ -14723,8 +14800,8 @@
         </p:nvSpPr>
         <p:spPr>
           <a:xfrm>
-            <a:off x="1609328" y="1600200"/>
-            <a:ext cx="5987008" cy="4525963"/>
+            <a:off x="971600" y="1628800"/>
+            <a:ext cx="7272808" cy="4525963"/>
           </a:xfrm>
         </p:spPr>
         <p:txBody>
@@ -14744,6 +14821,7 @@
                 <a:solidFill>
                   <a:schemeClr val="bg1"/>
                 </a:solidFill>
+                <a:latin typeface="TeXGyreAdventor" pitchFamily="50" charset="0"/>
               </a:rPr>
               <a:t>Alina </a:t>
             </a:r>
@@ -14752,6 +14830,7 @@
                 <a:solidFill>
                   <a:schemeClr val="bg1"/>
                 </a:solidFill>
+                <a:latin typeface="TeXGyreAdventor" pitchFamily="50" charset="0"/>
               </a:rPr>
               <a:t>Quentmeier</a:t>
             </a:r>
@@ -14760,6 +14839,7 @@
                 <a:solidFill>
                   <a:schemeClr val="bg1"/>
                 </a:solidFill>
+                <a:latin typeface="TeXGyreAdventor" pitchFamily="50" charset="0"/>
               </a:rPr>
               <a:t> 		Game Design</a:t>
             </a:r>
@@ -14776,6 +14856,7 @@
                 <a:solidFill>
                   <a:schemeClr val="bg1"/>
                 </a:solidFill>
+                <a:latin typeface="TeXGyreAdventor" pitchFamily="50" charset="0"/>
               </a:rPr>
               <a:t>Jaromir </a:t>
             </a:r>
@@ -14784,6 +14865,7 @@
                 <a:solidFill>
                   <a:schemeClr val="bg1"/>
                 </a:solidFill>
+                <a:latin typeface="TeXGyreAdventor" pitchFamily="50" charset="0"/>
               </a:rPr>
               <a:t>Paarmann</a:t>
             </a:r>
@@ -14792,8 +14874,27 @@
                 <a:solidFill>
                   <a:schemeClr val="bg1"/>
                 </a:solidFill>
+                <a:latin typeface="TeXGyreAdventor" pitchFamily="50" charset="0"/>
               </a:rPr>
-              <a:t> 		Game Design</a:t>
+              <a:t> 	</a:t>
+            </a:r>
+            <a:r>
+              <a:rPr lang="de-DE" sz="2400" dirty="0" smtClean="0">
+                <a:solidFill>
+                  <a:schemeClr val="bg1"/>
+                </a:solidFill>
+                <a:latin typeface="TeXGyreAdventor" pitchFamily="50" charset="0"/>
+              </a:rPr>
+              <a:t>Game </a:t>
+            </a:r>
+            <a:r>
+              <a:rPr lang="de-DE" sz="2400" dirty="0" smtClean="0">
+                <a:solidFill>
+                  <a:schemeClr val="bg1"/>
+                </a:solidFill>
+                <a:latin typeface="TeXGyreAdventor" pitchFamily="50" charset="0"/>
+              </a:rPr>
+              <a:t>Design</a:t>
             </a:r>
           </a:p>
           <a:p>
@@ -14808,6 +14909,7 @@
                 <a:solidFill>
                   <a:schemeClr val="bg1"/>
                 </a:solidFill>
+                <a:latin typeface="TeXGyreAdventor" pitchFamily="50" charset="0"/>
               </a:rPr>
               <a:t>Andreas </a:t>
             </a:r>
@@ -14816,6 +14918,7 @@
                 <a:solidFill>
                   <a:schemeClr val="bg1"/>
                 </a:solidFill>
+                <a:latin typeface="TeXGyreAdventor" pitchFamily="50" charset="0"/>
               </a:rPr>
               <a:t>Edmeier</a:t>
             </a:r>
@@ -14824,6 +14927,7 @@
                 <a:solidFill>
                   <a:schemeClr val="bg1"/>
                 </a:solidFill>
+                <a:latin typeface="TeXGyreAdventor" pitchFamily="50" charset="0"/>
               </a:rPr>
               <a:t> 		Programmierung</a:t>
             </a:r>
@@ -14840,6 +14944,7 @@
                 <a:solidFill>
                   <a:schemeClr val="bg1"/>
                 </a:solidFill>
+                <a:latin typeface="TeXGyreAdventor" pitchFamily="50" charset="0"/>
               </a:rPr>
               <a:t>Harun </a:t>
             </a:r>
@@ -14848,6 +14953,7 @@
                 <a:solidFill>
                   <a:schemeClr val="bg1"/>
                 </a:solidFill>
+                <a:latin typeface="TeXGyreAdventor" pitchFamily="50" charset="0"/>
               </a:rPr>
               <a:t>Ahmadie</a:t>
             </a:r>
@@ -14856,6 +14962,7 @@
                 <a:solidFill>
                   <a:schemeClr val="bg1"/>
                 </a:solidFill>
+                <a:latin typeface="TeXGyreAdventor" pitchFamily="50" charset="0"/>
               </a:rPr>
               <a:t> 		Art</a:t>
             </a:r>
@@ -14919,6 +15026,7 @@
                 <a:solidFill>
                   <a:schemeClr val="bg1"/>
                 </a:solidFill>
+                <a:latin typeface="TeXGyreAdventor" pitchFamily="50" charset="0"/>
               </a:rPr>
               <a:t>Vision Statement</a:t>
             </a:r>
@@ -14926,6 +15034,7 @@
               <a:solidFill>
                 <a:schemeClr val="bg1"/>
               </a:solidFill>
+              <a:latin typeface="TeXGyreAdventor" pitchFamily="50" charset="0"/>
             </a:endParaRPr>
           </a:p>
         </p:txBody>
@@ -14943,7 +15052,7 @@
         <p:spPr/>
         <p:txBody>
           <a:bodyPr>
-            <a:normAutofit/>
+            <a:normAutofit lnSpcReduction="10000"/>
           </a:bodyPr>
           <a:lstStyle/>
           <a:p>
@@ -14955,11 +15064,14 @@
                 <a:solidFill>
                   <a:schemeClr val="bg1"/>
                 </a:solidFill>
+                <a:latin typeface="TeXGyreAdventor" pitchFamily="50" charset="0"/>
               </a:rPr>
               <a:t>“Hammer Man”</a:t>
             </a:r>
             <a:r>
-              <a:rPr lang="de-DE" sz="2400" b="1" dirty="0"/>
+              <a:rPr lang="de-DE" sz="2400" b="1" dirty="0">
+                <a:latin typeface="TeXGyreAdventor" pitchFamily="50" charset="0"/>
+              </a:rPr>
               <a:t> </a:t>
             </a:r>
             <a:r>
@@ -14969,6 +15081,7 @@
                     <a:lumMod val="50000"/>
                   </a:schemeClr>
                 </a:solidFill>
+                <a:latin typeface="TeXGyreAdventor" pitchFamily="50" charset="0"/>
               </a:rPr>
               <a:t>ist ein im </a:t>
             </a:r>
@@ -14977,11 +15090,14 @@
                 <a:solidFill>
                   <a:schemeClr val="bg1"/>
                 </a:solidFill>
+                <a:latin typeface="TeXGyreAdventor" pitchFamily="50" charset="0"/>
               </a:rPr>
               <a:t>Arcade</a:t>
             </a:r>
             <a:r>
-              <a:rPr lang="de-DE" sz="2400" b="1" dirty="0"/>
+              <a:rPr lang="de-DE" sz="2400" b="1" dirty="0">
+                <a:latin typeface="TeXGyreAdventor" pitchFamily="50" charset="0"/>
+              </a:rPr>
               <a:t> </a:t>
             </a:r>
             <a:r>
@@ -14989,11 +15105,14 @@
                 <a:solidFill>
                   <a:schemeClr val="bg1"/>
                 </a:solidFill>
+                <a:latin typeface="TeXGyreAdventor" pitchFamily="50" charset="0"/>
               </a:rPr>
               <a:t>Stil</a:t>
             </a:r>
             <a:r>
-              <a:rPr lang="de-DE" sz="2400" dirty="0"/>
+              <a:rPr lang="de-DE" sz="2400" dirty="0">
+                <a:latin typeface="TeXGyreAdventor" pitchFamily="50" charset="0"/>
+              </a:rPr>
               <a:t> </a:t>
             </a:r>
             <a:r>
@@ -15003,11 +15122,14 @@
                     <a:lumMod val="50000"/>
                   </a:schemeClr>
                 </a:solidFill>
+                <a:latin typeface="TeXGyreAdventor" pitchFamily="50" charset="0"/>
               </a:rPr>
               <a:t>gehaltener</a:t>
             </a:r>
             <a:r>
-              <a:rPr lang="de-DE" sz="2400" dirty="0" smtClean="0"/>
+              <a:rPr lang="de-DE" sz="2400" dirty="0" smtClean="0">
+                <a:latin typeface="TeXGyreAdventor" pitchFamily="50" charset="0"/>
+              </a:rPr>
               <a:t> </a:t>
             </a:r>
             <a:r>
@@ -15015,6 +15137,7 @@
                 <a:solidFill>
                   <a:schemeClr val="bg1"/>
                 </a:solidFill>
+                <a:latin typeface="TeXGyreAdventor" pitchFamily="50" charset="0"/>
               </a:rPr>
               <a:t>Action </a:t>
             </a:r>
@@ -15023,11 +15146,14 @@
                 <a:solidFill>
                   <a:schemeClr val="bg1"/>
                 </a:solidFill>
+                <a:latin typeface="TeXGyreAdventor" pitchFamily="50" charset="0"/>
               </a:rPr>
               <a:t>Platformer</a:t>
             </a:r>
             <a:r>
-              <a:rPr lang="de-DE" sz="2400" dirty="0"/>
+              <a:rPr lang="de-DE" sz="2400" dirty="0">
+                <a:latin typeface="TeXGyreAdventor" pitchFamily="50" charset="0"/>
+              </a:rPr>
               <a:t> </a:t>
             </a:r>
             <a:r>
@@ -15037,6 +15163,7 @@
                     <a:lumMod val="50000"/>
                   </a:schemeClr>
                 </a:solidFill>
+                <a:latin typeface="TeXGyreAdventor" pitchFamily="50" charset="0"/>
               </a:rPr>
               <a:t>für den </a:t>
             </a:r>
@@ -15045,6 +15172,7 @@
                 <a:solidFill>
                   <a:schemeClr val="bg1"/>
                 </a:solidFill>
+                <a:latin typeface="TeXGyreAdventor" pitchFamily="50" charset="0"/>
               </a:rPr>
               <a:t>PC</a:t>
             </a:r>
@@ -15053,6 +15181,7 @@
                 <a:solidFill>
                   <a:schemeClr val="bg1"/>
                 </a:solidFill>
+                <a:latin typeface="TeXGyreAdventor" pitchFamily="50" charset="0"/>
               </a:rPr>
               <a:t>. </a:t>
             </a:r>
@@ -15060,13 +15189,16 @@
               <a:solidFill>
                 <a:schemeClr val="bg1"/>
               </a:solidFill>
+              <a:latin typeface="TeXGyreAdventor" pitchFamily="50" charset="0"/>
             </a:endParaRPr>
           </a:p>
           <a:p>
             <a:pPr marL="0" indent="0">
               <a:buNone/>
             </a:pPr>
-            <a:endParaRPr lang="de-DE" sz="2400" dirty="0"/>
+            <a:endParaRPr lang="de-DE" sz="2400" dirty="0">
+              <a:latin typeface="TeXGyreAdventor" pitchFamily="50" charset="0"/>
+            </a:endParaRPr>
           </a:p>
           <a:p>
             <a:pPr marL="0" indent="0">
@@ -15079,6 +15211,7 @@
                     <a:lumMod val="50000"/>
                   </a:schemeClr>
                 </a:solidFill>
+                <a:latin typeface="TeXGyreAdventor" pitchFamily="50" charset="0"/>
               </a:rPr>
               <a:t>Der </a:t>
             </a:r>
@@ -15087,6 +15220,7 @@
                 <a:solidFill>
                   <a:schemeClr val="bg1"/>
                 </a:solidFill>
+                <a:latin typeface="TeXGyreAdventor" pitchFamily="50" charset="0"/>
               </a:rPr>
               <a:t>Spieler</a:t>
             </a:r>
@@ -15097,6 +15231,7 @@
                     <a:lumMod val="50000"/>
                   </a:schemeClr>
                 </a:solidFill>
+                <a:latin typeface="TeXGyreAdventor" pitchFamily="50" charset="0"/>
               </a:rPr>
               <a:t> übernimmt die Rolle von </a:t>
             </a:r>
@@ -15105,11 +15240,14 @@
                 <a:solidFill>
                   <a:schemeClr val="bg1"/>
                 </a:solidFill>
+                <a:latin typeface="TeXGyreAdventor" pitchFamily="50" charset="0"/>
               </a:rPr>
               <a:t>Hammer</a:t>
             </a:r>
             <a:r>
-              <a:rPr lang="de-DE" sz="2400" b="1" dirty="0"/>
+              <a:rPr lang="de-DE" sz="2400" b="1" dirty="0">
+                <a:latin typeface="TeXGyreAdventor" pitchFamily="50" charset="0"/>
+              </a:rPr>
               <a:t> </a:t>
             </a:r>
             <a:r>
@@ -15117,6 +15255,7 @@
                 <a:solidFill>
                   <a:schemeClr val="bg1"/>
                 </a:solidFill>
+                <a:latin typeface="TeXGyreAdventor" pitchFamily="50" charset="0"/>
               </a:rPr>
               <a:t>Man</a:t>
             </a:r>
@@ -15127,6 +15266,7 @@
                     <a:lumMod val="50000"/>
                   </a:schemeClr>
                 </a:solidFill>
+                <a:latin typeface="TeXGyreAdventor" pitchFamily="50" charset="0"/>
               </a:rPr>
               <a:t>, einem Superhelden, der in einer </a:t>
             </a:r>
@@ -15135,6 +15275,7 @@
                 <a:solidFill>
                   <a:schemeClr val="bg1"/>
                 </a:solidFill>
+                <a:latin typeface="TeXGyreAdventor" pitchFamily="50" charset="0"/>
               </a:rPr>
               <a:t>amerikanischen Vorstadt der 80er</a:t>
             </a:r>
@@ -15143,6 +15284,7 @@
                 <a:solidFill>
                   <a:schemeClr val="bg1"/>
                 </a:solidFill>
+                <a:latin typeface="TeXGyreAdventor" pitchFamily="50" charset="0"/>
               </a:rPr>
               <a:t> </a:t>
             </a:r>
@@ -15153,6 +15295,7 @@
                     <a:lumMod val="50000"/>
                   </a:schemeClr>
                 </a:solidFill>
+                <a:latin typeface="TeXGyreAdventor" pitchFamily="50" charset="0"/>
               </a:rPr>
               <a:t>mit seinem </a:t>
             </a:r>
@@ -15161,11 +15304,14 @@
                 <a:solidFill>
                   <a:schemeClr val="bg1"/>
                 </a:solidFill>
+                <a:latin typeface="TeXGyreAdventor" pitchFamily="50" charset="0"/>
               </a:rPr>
               <a:t>riesigen Hammer</a:t>
             </a:r>
             <a:r>
-              <a:rPr lang="de-DE" sz="2400" b="1" dirty="0"/>
+              <a:rPr lang="de-DE" sz="2400" b="1" dirty="0">
+                <a:latin typeface="TeXGyreAdventor" pitchFamily="50" charset="0"/>
+              </a:rPr>
               <a:t> </a:t>
             </a:r>
             <a:r>
@@ -15175,6 +15321,7 @@
                     <a:lumMod val="50000"/>
                   </a:schemeClr>
                 </a:solidFill>
+                <a:latin typeface="TeXGyreAdventor" pitchFamily="50" charset="0"/>
               </a:rPr>
               <a:t>einer </a:t>
             </a:r>
@@ -15183,6 +15330,7 @@
                 <a:solidFill>
                   <a:schemeClr val="bg1"/>
                 </a:solidFill>
+                <a:latin typeface="TeXGyreAdventor" pitchFamily="50" charset="0"/>
               </a:rPr>
               <a:t>Invasion kleiner Roboter </a:t>
             </a:r>
@@ -15193,6 +15341,7 @@
                     <a:lumMod val="50000"/>
                   </a:schemeClr>
                 </a:solidFill>
+                <a:latin typeface="TeXGyreAdventor" pitchFamily="50" charset="0"/>
               </a:rPr>
               <a:t>mit wuchtigen Schlägen Einhalt gebietet. </a:t>
             </a:r>
@@ -15202,6 +15351,7 @@
                   <a:lumMod val="50000"/>
                 </a:schemeClr>
               </a:solidFill>
+              <a:latin typeface="TeXGyreAdventor" pitchFamily="50" charset="0"/>
             </a:endParaRPr>
           </a:p>
           <a:p>
@@ -15214,6 +15364,7 @@
                   <a:lumMod val="50000"/>
                 </a:schemeClr>
               </a:solidFill>
+              <a:latin typeface="TeXGyreAdventor" pitchFamily="50" charset="0"/>
             </a:endParaRPr>
           </a:p>
           <a:p>
@@ -15227,6 +15378,7 @@
                     <a:lumMod val="50000"/>
                   </a:schemeClr>
                 </a:solidFill>
+                <a:latin typeface="TeXGyreAdventor" pitchFamily="50" charset="0"/>
               </a:rPr>
               <a:t>Man </a:t>
             </a:r>
@@ -15235,6 +15387,7 @@
                 <a:solidFill>
                   <a:schemeClr val="bg1"/>
                 </a:solidFill>
+                <a:latin typeface="TeXGyreAdventor" pitchFamily="50" charset="0"/>
               </a:rPr>
               <a:t>bewegt</a:t>
             </a:r>
@@ -15245,6 +15398,7 @@
                     <a:lumMod val="50000"/>
                   </a:schemeClr>
                 </a:solidFill>
+                <a:latin typeface="TeXGyreAdventor" pitchFamily="50" charset="0"/>
               </a:rPr>
               <a:t> Hammer Man mit den </a:t>
             </a:r>
@@ -15253,6 +15407,7 @@
                 <a:solidFill>
                   <a:schemeClr val="bg1"/>
                 </a:solidFill>
+                <a:latin typeface="TeXGyreAdventor" pitchFamily="50" charset="0"/>
               </a:rPr>
               <a:t>Pfeiltasten</a:t>
             </a:r>
@@ -15263,6 +15418,7 @@
                     <a:lumMod val="50000"/>
                   </a:schemeClr>
                 </a:solidFill>
+                <a:latin typeface="TeXGyreAdventor" pitchFamily="50" charset="0"/>
               </a:rPr>
               <a:t> über die verschiedenen Etagen eines der Häuser der Vorstadt, das in einer </a:t>
             </a:r>
@@ -15271,6 +15427,7 @@
                 <a:solidFill>
                   <a:schemeClr val="bg1"/>
                 </a:solidFill>
+                <a:latin typeface="TeXGyreAdventor" pitchFamily="50" charset="0"/>
               </a:rPr>
               <a:t>2D Seitenansicht </a:t>
             </a:r>
@@ -15281,6 +15438,7 @@
                     <a:lumMod val="50000"/>
                   </a:schemeClr>
                 </a:solidFill>
+                <a:latin typeface="TeXGyreAdventor" pitchFamily="50" charset="0"/>
               </a:rPr>
               <a:t>dargestellt wird.</a:t>
             </a:r>
@@ -15350,6 +15508,7 @@
                 <a:solidFill>
                   <a:schemeClr val="bg1"/>
                 </a:solidFill>
+                <a:latin typeface="TeXGyreAdventor" pitchFamily="50" charset="0"/>
               </a:rPr>
               <a:t>Key Facts</a:t>
             </a:r>
@@ -15357,6 +15516,7 @@
               <a:solidFill>
                 <a:schemeClr val="bg1"/>
               </a:solidFill>
+              <a:latin typeface="TeXGyreAdventor" pitchFamily="50" charset="0"/>
             </a:endParaRPr>
           </a:p>
         </p:txBody>
@@ -15371,7 +15531,12 @@
             <p:ph idx="1"/>
           </p:nvPr>
         </p:nvSpPr>
-        <p:spPr/>
+        <p:spPr>
+          <a:xfrm>
+            <a:off x="1979712" y="1600200"/>
+            <a:ext cx="5194920" cy="4525963"/>
+          </a:xfrm>
+        </p:spPr>
         <p:txBody>
           <a:bodyPr anchor="ctr">
             <a:normAutofit/>
@@ -15383,6 +15548,7 @@
                 <a:solidFill>
                   <a:schemeClr val="bg1"/>
                 </a:solidFill>
+                <a:latin typeface="TeXGyreAdventor" pitchFamily="50" charset="0"/>
               </a:rPr>
               <a:t>S</a:t>
             </a:r>
@@ -15391,6 +15557,7 @@
                 <a:solidFill>
                   <a:schemeClr val="bg1"/>
                 </a:solidFill>
+                <a:latin typeface="TeXGyreAdventor" pitchFamily="50" charset="0"/>
               </a:rPr>
               <a:t>ingle </a:t>
             </a:r>
@@ -15399,6 +15566,7 @@
                 <a:solidFill>
                   <a:schemeClr val="bg1"/>
                 </a:solidFill>
+                <a:latin typeface="TeXGyreAdventor" pitchFamily="50" charset="0"/>
               </a:rPr>
               <a:t>screen</a:t>
             </a:r>
@@ -15407,6 +15575,7 @@
                 <a:solidFill>
                   <a:schemeClr val="bg1"/>
                 </a:solidFill>
+                <a:latin typeface="TeXGyreAdventor" pitchFamily="50" charset="0"/>
               </a:rPr>
               <a:t> </a:t>
             </a:r>
@@ -15415,6 +15584,7 @@
                 <a:solidFill>
                   <a:schemeClr val="bg1"/>
                 </a:solidFill>
+                <a:latin typeface="TeXGyreAdventor" pitchFamily="50" charset="0"/>
               </a:rPr>
               <a:t>platformer</a:t>
             </a:r>
@@ -15422,6 +15592,7 @@
               <a:solidFill>
                 <a:schemeClr val="bg1"/>
               </a:solidFill>
+              <a:latin typeface="TeXGyreAdventor" pitchFamily="50" charset="0"/>
             </a:endParaRPr>
           </a:p>
           <a:p>
@@ -15430,6 +15601,7 @@
                 <a:solidFill>
                   <a:schemeClr val="bg1"/>
                 </a:solidFill>
+                <a:latin typeface="TeXGyreAdventor" pitchFamily="50" charset="0"/>
               </a:rPr>
               <a:t>Amerikanischer Vorort der 80er Jahre</a:t>
             </a:r>
@@ -15440,6 +15612,7 @@
                 <a:solidFill>
                   <a:schemeClr val="bg1"/>
                 </a:solidFill>
+                <a:latin typeface="TeXGyreAdventor" pitchFamily="50" charset="0"/>
               </a:rPr>
               <a:t>Pixelart</a:t>
             </a:r>
@@ -15448,6 +15621,7 @@
                 <a:solidFill>
                   <a:schemeClr val="bg1"/>
                 </a:solidFill>
+                <a:latin typeface="TeXGyreAdventor" pitchFamily="50" charset="0"/>
               </a:rPr>
               <a:t>, Comic</a:t>
             </a:r>
@@ -15458,6 +15632,7 @@
                 <a:solidFill>
                   <a:schemeClr val="bg1"/>
                 </a:solidFill>
+                <a:latin typeface="TeXGyreAdventor" pitchFamily="50" charset="0"/>
               </a:rPr>
               <a:t>PC</a:t>
             </a:r>
@@ -15468,6 +15643,7 @@
                 <a:solidFill>
                   <a:schemeClr val="bg1"/>
                 </a:solidFill>
+                <a:latin typeface="TeXGyreAdventor" pitchFamily="50" charset="0"/>
               </a:rPr>
               <a:t>Arcade</a:t>
             </a:r>
@@ -15476,6 +15652,7 @@
                 <a:solidFill>
                   <a:schemeClr val="bg1"/>
                 </a:solidFill>
+                <a:latin typeface="TeXGyreAdventor" pitchFamily="50" charset="0"/>
               </a:rPr>
               <a:t>-Liebhaber, Action-Liebhaber</a:t>
             </a:r>
@@ -15486,6 +15663,7 @@
                 <a:solidFill>
                   <a:schemeClr val="bg1"/>
                 </a:solidFill>
+                <a:latin typeface="TeXGyreAdventor" pitchFamily="50" charset="0"/>
               </a:rPr>
               <a:t>Made </a:t>
             </a:r>
@@ -15494,6 +15672,7 @@
                 <a:solidFill>
                   <a:schemeClr val="bg1"/>
                 </a:solidFill>
+                <a:latin typeface="TeXGyreAdventor" pitchFamily="50" charset="0"/>
               </a:rPr>
               <a:t>with</a:t>
             </a:r>
@@ -15502,6 +15681,7 @@
                 <a:solidFill>
                   <a:schemeClr val="bg1"/>
                 </a:solidFill>
+                <a:latin typeface="TeXGyreAdventor" pitchFamily="50" charset="0"/>
               </a:rPr>
               <a:t> </a:t>
             </a:r>
@@ -15510,6 +15690,7 @@
                 <a:solidFill>
                   <a:schemeClr val="bg1"/>
                 </a:solidFill>
+                <a:latin typeface="TeXGyreAdventor" pitchFamily="50" charset="0"/>
               </a:rPr>
               <a:t>Unity</a:t>
             </a:r>
@@ -15517,6 +15698,7 @@
               <a:solidFill>
                 <a:schemeClr val="bg1"/>
               </a:solidFill>
+              <a:latin typeface="TeXGyreAdventor" pitchFamily="50" charset="0"/>
             </a:endParaRPr>
           </a:p>
           <a:p>
@@ -15590,6 +15772,7 @@
                 <a:solidFill>
                   <a:schemeClr val="bg1"/>
                 </a:solidFill>
+                <a:latin typeface="TeXGyreAdventor" pitchFamily="50" charset="0"/>
               </a:rPr>
               <a:t>Referenz </a:t>
             </a:r>
@@ -15598,6 +15781,7 @@
                 <a:solidFill>
                   <a:schemeClr val="bg1"/>
                 </a:solidFill>
+                <a:latin typeface="TeXGyreAdventor" pitchFamily="50" charset="0"/>
               </a:rPr>
               <a:t>Gameplay</a:t>
             </a:r>
@@ -15605,6 +15789,7 @@
               <a:solidFill>
                 <a:schemeClr val="bg1"/>
               </a:solidFill>
+              <a:latin typeface="TeXGyreAdventor" pitchFamily="50" charset="0"/>
             </a:endParaRPr>
           </a:p>
         </p:txBody>
@@ -15696,6 +15881,7 @@
                 <a:solidFill>
                   <a:schemeClr val="bg1"/>
                 </a:solidFill>
+                <a:latin typeface="TeXGyreAdventor" pitchFamily="50" charset="0"/>
               </a:rPr>
               <a:t>Referenzen Art</a:t>
             </a:r>
@@ -15703,6 +15889,7 @@
               <a:solidFill>
                 <a:schemeClr val="bg1"/>
               </a:solidFill>
+              <a:latin typeface="TeXGyreAdventor" pitchFamily="50" charset="0"/>
             </a:endParaRPr>
           </a:p>
         </p:txBody>
@@ -15862,6 +16049,47 @@
           <a:chExt cx="0" cy="0"/>
         </a:xfrm>
       </p:grpSpPr>
+      <p:pic>
+        <p:nvPicPr>
+          <p:cNvPr id="1026" name="Picture 2" descr="E:\Projekte\HammerMan\Art\Hammer Man - Front Sprite - HM.png"/>
+          <p:cNvPicPr>
+            <a:picLocks noChangeAspect="1" noChangeArrowheads="1"/>
+          </p:cNvPicPr>
+          <p:nvPr/>
+        </p:nvPicPr>
+        <p:blipFill>
+          <a:blip r:embed="rId2" cstate="print">
+            <a:extLst>
+              <a:ext uri="{28A0092B-C50C-407E-A947-70E740481C1C}">
+                <a14:useLocalDpi xmlns:a14="http://schemas.microsoft.com/office/drawing/2010/main" val="0"/>
+              </a:ext>
+            </a:extLst>
+          </a:blip>
+          <a:srcRect/>
+          <a:stretch>
+            <a:fillRect/>
+          </a:stretch>
+        </p:blipFill>
+        <p:spPr bwMode="auto">
+          <a:xfrm>
+            <a:off x="1259632" y="1629200"/>
+            <a:ext cx="1800000" cy="3600000"/>
+          </a:xfrm>
+          <a:prstGeom prst="rect">
+            <a:avLst/>
+          </a:prstGeom>
+          <a:noFill/>
+          <a:extLst>
+            <a:ext uri="{909E8E84-426E-40DD-AFC4-6F175D3DCCD1}">
+              <a14:hiddenFill xmlns:a14="http://schemas.microsoft.com/office/drawing/2010/main">
+                <a:solidFill>
+                  <a:srgbClr val="FFFFFF"/>
+                </a:solidFill>
+              </a14:hiddenFill>
+            </a:ext>
+          </a:extLst>
+        </p:spPr>
+      </p:pic>
       <p:sp>
         <p:nvSpPr>
           <p:cNvPr id="2" name="Titel 1"/>
@@ -15882,6 +16110,7 @@
                 <a:solidFill>
                   <a:schemeClr val="bg1"/>
                 </a:solidFill>
+                <a:latin typeface="TeXGyreAdventor" pitchFamily="50" charset="0"/>
               </a:rPr>
               <a:t>Concept</a:t>
             </a:r>
@@ -15890,6 +16119,7 @@
                 <a:solidFill>
                   <a:schemeClr val="bg1"/>
                 </a:solidFill>
+                <a:latin typeface="TeXGyreAdventor" pitchFamily="50" charset="0"/>
               </a:rPr>
               <a:t> Art</a:t>
             </a:r>
@@ -15897,29 +16127,626 @@
               <a:solidFill>
                 <a:schemeClr val="bg1"/>
               </a:solidFill>
+              <a:latin typeface="TeXGyreAdventor" pitchFamily="50" charset="0"/>
             </a:endParaRPr>
           </a:p>
         </p:txBody>
       </p:sp>
-      <p:sp>
-        <p:nvSpPr>
-          <p:cNvPr id="5" name="Inhaltsplatzhalter 4"/>
-          <p:cNvSpPr>
-            <a:spLocks noGrp="1"/>
-          </p:cNvSpPr>
-          <p:nvPr>
-            <p:ph idx="1"/>
-          </p:nvPr>
-        </p:nvSpPr>
-        <p:spPr/>
-        <p:txBody>
-          <a:bodyPr/>
-          <a:lstStyle/>
-          <a:p>
-            <a:endParaRPr lang="de-DE"/>
-          </a:p>
-        </p:txBody>
-      </p:sp>
+      <p:pic>
+        <p:nvPicPr>
+          <p:cNvPr id="1027" name="Picture 3" descr="E:\Projekte\HammerMan\Art\Hammer Sprite - Hammer Man.png"/>
+          <p:cNvPicPr>
+            <a:picLocks noChangeAspect="1" noChangeArrowheads="1"/>
+          </p:cNvPicPr>
+          <p:nvPr/>
+        </p:nvPicPr>
+        <p:blipFill>
+          <a:blip r:embed="rId3" cstate="print">
+            <a:extLst>
+              <a:ext uri="{28A0092B-C50C-407E-A947-70E740481C1C}">
+                <a14:useLocalDpi xmlns:a14="http://schemas.microsoft.com/office/drawing/2010/main" val="0"/>
+              </a:ext>
+            </a:extLst>
+          </a:blip>
+          <a:srcRect/>
+          <a:stretch>
+            <a:fillRect/>
+          </a:stretch>
+        </p:blipFill>
+        <p:spPr bwMode="auto">
+          <a:xfrm rot="2596121">
+            <a:off x="3089691" y="1043134"/>
+            <a:ext cx="1800000" cy="3600000"/>
+          </a:xfrm>
+          <a:prstGeom prst="rect">
+            <a:avLst/>
+          </a:prstGeom>
+          <a:noFill/>
+          <a:extLst>
+            <a:ext uri="{909E8E84-426E-40DD-AFC4-6F175D3DCCD1}">
+              <a14:hiddenFill xmlns:a14="http://schemas.microsoft.com/office/drawing/2010/main">
+                <a:solidFill>
+                  <a:srgbClr val="FFFFFF"/>
+                </a:solidFill>
+              </a14:hiddenFill>
+            </a:ext>
+          </a:extLst>
+        </p:spPr>
+      </p:pic>
+      <p:pic>
+        <p:nvPicPr>
+          <p:cNvPr id="1028" name="Picture 4" descr="E:\Projekte\HammerMan\Art\Roboter Sprite - HammerMan.png"/>
+          <p:cNvPicPr>
+            <a:picLocks noChangeAspect="1" noChangeArrowheads="1"/>
+          </p:cNvPicPr>
+          <p:nvPr/>
+        </p:nvPicPr>
+        <p:blipFill>
+          <a:blip r:embed="rId4" cstate="print">
+            <a:extLst>
+              <a:ext uri="{28A0092B-C50C-407E-A947-70E740481C1C}">
+                <a14:useLocalDpi xmlns:a14="http://schemas.microsoft.com/office/drawing/2010/main" val="0"/>
+              </a:ext>
+            </a:extLst>
+          </a:blip>
+          <a:srcRect/>
+          <a:stretch>
+            <a:fillRect/>
+          </a:stretch>
+        </p:blipFill>
+        <p:spPr bwMode="auto">
+          <a:xfrm>
+            <a:off x="5407132" y="3429200"/>
+            <a:ext cx="1800000" cy="1800000"/>
+          </a:xfrm>
+          <a:prstGeom prst="rect">
+            <a:avLst/>
+          </a:prstGeom>
+          <a:noFill/>
+          <a:extLst>
+            <a:ext uri="{909E8E84-426E-40DD-AFC4-6F175D3DCCD1}">
+              <a14:hiddenFill xmlns:a14="http://schemas.microsoft.com/office/drawing/2010/main">
+                <a:solidFill>
+                  <a:srgbClr val="FFFFFF"/>
+                </a:solidFill>
+              </a14:hiddenFill>
+            </a:ext>
+          </a:extLst>
+        </p:spPr>
+      </p:pic>
+      <p:pic>
+        <p:nvPicPr>
+          <p:cNvPr id="1029" name="Picture 5" descr="E:\Projekte\HammerMan\Art\Holz - Textur - HammerMan.png"/>
+          <p:cNvPicPr>
+            <a:picLocks noChangeAspect="1" noChangeArrowheads="1"/>
+          </p:cNvPicPr>
+          <p:nvPr/>
+        </p:nvPicPr>
+        <p:blipFill>
+          <a:blip r:embed="rId5" cstate="print">
+            <a:extLst>
+              <a:ext uri="{28A0092B-C50C-407E-A947-70E740481C1C}">
+                <a14:useLocalDpi xmlns:a14="http://schemas.microsoft.com/office/drawing/2010/main" val="0"/>
+              </a:ext>
+            </a:extLst>
+          </a:blip>
+          <a:srcRect/>
+          <a:stretch>
+            <a:fillRect/>
+          </a:stretch>
+        </p:blipFill>
+        <p:spPr bwMode="auto">
+          <a:xfrm>
+            <a:off x="6986250" y="5949200"/>
+            <a:ext cx="720000" cy="720000"/>
+          </a:xfrm>
+          <a:prstGeom prst="rect">
+            <a:avLst/>
+          </a:prstGeom>
+          <a:noFill/>
+          <a:extLst>
+            <a:ext uri="{909E8E84-426E-40DD-AFC4-6F175D3DCCD1}">
+              <a14:hiddenFill xmlns:a14="http://schemas.microsoft.com/office/drawing/2010/main">
+                <a:solidFill>
+                  <a:srgbClr val="FFFFFF"/>
+                </a:solidFill>
+              </a14:hiddenFill>
+            </a:ext>
+          </a:extLst>
+        </p:spPr>
+      </p:pic>
+      <p:pic>
+        <p:nvPicPr>
+          <p:cNvPr id="1030" name="Picture 6" descr="E:\Projekte\HammerMan\Art\Boden Textur - HammerMan.png"/>
+          <p:cNvPicPr>
+            <a:picLocks noChangeAspect="1" noChangeArrowheads="1"/>
+          </p:cNvPicPr>
+          <p:nvPr/>
+        </p:nvPicPr>
+        <p:blipFill>
+          <a:blip r:embed="rId6" cstate="print">
+            <a:extLst>
+              <a:ext uri="{28A0092B-C50C-407E-A947-70E740481C1C}">
+                <a14:useLocalDpi xmlns:a14="http://schemas.microsoft.com/office/drawing/2010/main" val="0"/>
+              </a:ext>
+            </a:extLst>
+          </a:blip>
+          <a:srcRect/>
+          <a:stretch>
+            <a:fillRect/>
+          </a:stretch>
+        </p:blipFill>
+        <p:spPr bwMode="auto">
+          <a:xfrm>
+            <a:off x="1259632" y="5229200"/>
+            <a:ext cx="720000" cy="720000"/>
+          </a:xfrm>
+          <a:prstGeom prst="rect">
+            <a:avLst/>
+          </a:prstGeom>
+          <a:noFill/>
+          <a:extLst>
+            <a:ext uri="{909E8E84-426E-40DD-AFC4-6F175D3DCCD1}">
+              <a14:hiddenFill xmlns:a14="http://schemas.microsoft.com/office/drawing/2010/main">
+                <a:solidFill>
+                  <a:srgbClr val="FFFFFF"/>
+                </a:solidFill>
+              </a14:hiddenFill>
+            </a:ext>
+          </a:extLst>
+        </p:spPr>
+      </p:pic>
+      <p:pic>
+        <p:nvPicPr>
+          <p:cNvPr id="14" name="Picture 6" descr="E:\Projekte\HammerMan\Art\Boden Textur - HammerMan.png"/>
+          <p:cNvPicPr>
+            <a:picLocks noChangeAspect="1" noChangeArrowheads="1"/>
+          </p:cNvPicPr>
+          <p:nvPr/>
+        </p:nvPicPr>
+        <p:blipFill>
+          <a:blip r:embed="rId6" cstate="print">
+            <a:extLst>
+              <a:ext uri="{28A0092B-C50C-407E-A947-70E740481C1C}">
+                <a14:useLocalDpi xmlns:a14="http://schemas.microsoft.com/office/drawing/2010/main" val="0"/>
+              </a:ext>
+            </a:extLst>
+          </a:blip>
+          <a:srcRect/>
+          <a:stretch>
+            <a:fillRect/>
+          </a:stretch>
+        </p:blipFill>
+        <p:spPr bwMode="auto">
+          <a:xfrm>
+            <a:off x="1979632" y="5229200"/>
+            <a:ext cx="720000" cy="720000"/>
+          </a:xfrm>
+          <a:prstGeom prst="rect">
+            <a:avLst/>
+          </a:prstGeom>
+          <a:noFill/>
+          <a:extLst>
+            <a:ext uri="{909E8E84-426E-40DD-AFC4-6F175D3DCCD1}">
+              <a14:hiddenFill xmlns:a14="http://schemas.microsoft.com/office/drawing/2010/main">
+                <a:solidFill>
+                  <a:srgbClr val="FFFFFF"/>
+                </a:solidFill>
+              </a14:hiddenFill>
+            </a:ext>
+          </a:extLst>
+        </p:spPr>
+      </p:pic>
+      <p:pic>
+        <p:nvPicPr>
+          <p:cNvPr id="15" name="Picture 6" descr="E:\Projekte\HammerMan\Art\Boden Textur - HammerMan.png"/>
+          <p:cNvPicPr>
+            <a:picLocks noChangeAspect="1" noChangeArrowheads="1"/>
+          </p:cNvPicPr>
+          <p:nvPr/>
+        </p:nvPicPr>
+        <p:blipFill>
+          <a:blip r:embed="rId6" cstate="print">
+            <a:extLst>
+              <a:ext uri="{28A0092B-C50C-407E-A947-70E740481C1C}">
+                <a14:useLocalDpi xmlns:a14="http://schemas.microsoft.com/office/drawing/2010/main" val="0"/>
+              </a:ext>
+            </a:extLst>
+          </a:blip>
+          <a:srcRect/>
+          <a:stretch>
+            <a:fillRect/>
+          </a:stretch>
+        </p:blipFill>
+        <p:spPr bwMode="auto">
+          <a:xfrm>
+            <a:off x="2699632" y="5229199"/>
+            <a:ext cx="720000" cy="720000"/>
+          </a:xfrm>
+          <a:prstGeom prst="rect">
+            <a:avLst/>
+          </a:prstGeom>
+          <a:noFill/>
+          <a:extLst>
+            <a:ext uri="{909E8E84-426E-40DD-AFC4-6F175D3DCCD1}">
+              <a14:hiddenFill xmlns:a14="http://schemas.microsoft.com/office/drawing/2010/main">
+                <a:solidFill>
+                  <a:srgbClr val="FFFFFF"/>
+                </a:solidFill>
+              </a14:hiddenFill>
+            </a:ext>
+          </a:extLst>
+        </p:spPr>
+      </p:pic>
+      <p:pic>
+        <p:nvPicPr>
+          <p:cNvPr id="16" name="Picture 6" descr="E:\Projekte\HammerMan\Art\Boden Textur - HammerMan.png"/>
+          <p:cNvPicPr>
+            <a:picLocks noChangeAspect="1" noChangeArrowheads="1"/>
+          </p:cNvPicPr>
+          <p:nvPr/>
+        </p:nvPicPr>
+        <p:blipFill>
+          <a:blip r:embed="rId6" cstate="print">
+            <a:extLst>
+              <a:ext uri="{28A0092B-C50C-407E-A947-70E740481C1C}">
+                <a14:useLocalDpi xmlns:a14="http://schemas.microsoft.com/office/drawing/2010/main" val="0"/>
+              </a:ext>
+            </a:extLst>
+          </a:blip>
+          <a:srcRect/>
+          <a:stretch>
+            <a:fillRect/>
+          </a:stretch>
+        </p:blipFill>
+        <p:spPr bwMode="auto">
+          <a:xfrm>
+            <a:off x="3419872" y="5229200"/>
+            <a:ext cx="720000" cy="720000"/>
+          </a:xfrm>
+          <a:prstGeom prst="rect">
+            <a:avLst/>
+          </a:prstGeom>
+          <a:noFill/>
+          <a:extLst>
+            <a:ext uri="{909E8E84-426E-40DD-AFC4-6F175D3DCCD1}">
+              <a14:hiddenFill xmlns:a14="http://schemas.microsoft.com/office/drawing/2010/main">
+                <a:solidFill>
+                  <a:srgbClr val="FFFFFF"/>
+                </a:solidFill>
+              </a14:hiddenFill>
+            </a:ext>
+          </a:extLst>
+        </p:spPr>
+      </p:pic>
+      <p:pic>
+        <p:nvPicPr>
+          <p:cNvPr id="17" name="Picture 6" descr="E:\Projekte\HammerMan\Art\Boden Textur - HammerMan.png"/>
+          <p:cNvPicPr>
+            <a:picLocks noChangeAspect="1" noChangeArrowheads="1"/>
+          </p:cNvPicPr>
+          <p:nvPr/>
+        </p:nvPicPr>
+        <p:blipFill>
+          <a:blip r:embed="rId6" cstate="print">
+            <a:extLst>
+              <a:ext uri="{28A0092B-C50C-407E-A947-70E740481C1C}">
+                <a14:useLocalDpi xmlns:a14="http://schemas.microsoft.com/office/drawing/2010/main" val="0"/>
+              </a:ext>
+            </a:extLst>
+          </a:blip>
+          <a:srcRect/>
+          <a:stretch>
+            <a:fillRect/>
+          </a:stretch>
+        </p:blipFill>
+        <p:spPr bwMode="auto">
+          <a:xfrm>
+            <a:off x="4139952" y="5229200"/>
+            <a:ext cx="720000" cy="720000"/>
+          </a:xfrm>
+          <a:prstGeom prst="rect">
+            <a:avLst/>
+          </a:prstGeom>
+          <a:noFill/>
+          <a:extLst>
+            <a:ext uri="{909E8E84-426E-40DD-AFC4-6F175D3DCCD1}">
+              <a14:hiddenFill xmlns:a14="http://schemas.microsoft.com/office/drawing/2010/main">
+                <a:solidFill>
+                  <a:srgbClr val="FFFFFF"/>
+                </a:solidFill>
+              </a14:hiddenFill>
+            </a:ext>
+          </a:extLst>
+        </p:spPr>
+      </p:pic>
+      <p:pic>
+        <p:nvPicPr>
+          <p:cNvPr id="18" name="Picture 6" descr="E:\Projekte\HammerMan\Art\Boden Textur - HammerMan.png"/>
+          <p:cNvPicPr>
+            <a:picLocks noChangeAspect="1" noChangeArrowheads="1"/>
+          </p:cNvPicPr>
+          <p:nvPr/>
+        </p:nvPicPr>
+        <p:blipFill>
+          <a:blip r:embed="rId6" cstate="print">
+            <a:extLst>
+              <a:ext uri="{28A0092B-C50C-407E-A947-70E740481C1C}">
+                <a14:useLocalDpi xmlns:a14="http://schemas.microsoft.com/office/drawing/2010/main" val="0"/>
+              </a:ext>
+            </a:extLst>
+          </a:blip>
+          <a:srcRect/>
+          <a:stretch>
+            <a:fillRect/>
+          </a:stretch>
+        </p:blipFill>
+        <p:spPr bwMode="auto">
+          <a:xfrm>
+            <a:off x="4859952" y="5229200"/>
+            <a:ext cx="720000" cy="720000"/>
+          </a:xfrm>
+          <a:prstGeom prst="rect">
+            <a:avLst/>
+          </a:prstGeom>
+          <a:noFill/>
+          <a:extLst>
+            <a:ext uri="{909E8E84-426E-40DD-AFC4-6F175D3DCCD1}">
+              <a14:hiddenFill xmlns:a14="http://schemas.microsoft.com/office/drawing/2010/main">
+                <a:solidFill>
+                  <a:srgbClr val="FFFFFF"/>
+                </a:solidFill>
+              </a14:hiddenFill>
+            </a:ext>
+          </a:extLst>
+        </p:spPr>
+      </p:pic>
+      <p:pic>
+        <p:nvPicPr>
+          <p:cNvPr id="19" name="Picture 6" descr="E:\Projekte\HammerMan\Art\Boden Textur - HammerMan.png"/>
+          <p:cNvPicPr>
+            <a:picLocks noChangeAspect="1" noChangeArrowheads="1"/>
+          </p:cNvPicPr>
+          <p:nvPr/>
+        </p:nvPicPr>
+        <p:blipFill>
+          <a:blip r:embed="rId6" cstate="print">
+            <a:extLst>
+              <a:ext uri="{28A0092B-C50C-407E-A947-70E740481C1C}">
+                <a14:useLocalDpi xmlns:a14="http://schemas.microsoft.com/office/drawing/2010/main" val="0"/>
+              </a:ext>
+            </a:extLst>
+          </a:blip>
+          <a:srcRect/>
+          <a:stretch>
+            <a:fillRect/>
+          </a:stretch>
+        </p:blipFill>
+        <p:spPr bwMode="auto">
+          <a:xfrm>
+            <a:off x="5562253" y="5229199"/>
+            <a:ext cx="720000" cy="720000"/>
+          </a:xfrm>
+          <a:prstGeom prst="rect">
+            <a:avLst/>
+          </a:prstGeom>
+          <a:noFill/>
+          <a:extLst>
+            <a:ext uri="{909E8E84-426E-40DD-AFC4-6F175D3DCCD1}">
+              <a14:hiddenFill xmlns:a14="http://schemas.microsoft.com/office/drawing/2010/main">
+                <a:solidFill>
+                  <a:srgbClr val="FFFFFF"/>
+                </a:solidFill>
+              </a14:hiddenFill>
+            </a:ext>
+          </a:extLst>
+        </p:spPr>
+      </p:pic>
+      <p:pic>
+        <p:nvPicPr>
+          <p:cNvPr id="20" name="Picture 6" descr="E:\Projekte\HammerMan\Art\Boden Textur - HammerMan.png"/>
+          <p:cNvPicPr>
+            <a:picLocks noChangeAspect="1" noChangeArrowheads="1"/>
+          </p:cNvPicPr>
+          <p:nvPr/>
+        </p:nvPicPr>
+        <p:blipFill>
+          <a:blip r:embed="rId6" cstate="print">
+            <a:extLst>
+              <a:ext uri="{28A0092B-C50C-407E-A947-70E740481C1C}">
+                <a14:useLocalDpi xmlns:a14="http://schemas.microsoft.com/office/drawing/2010/main" val="0"/>
+              </a:ext>
+            </a:extLst>
+          </a:blip>
+          <a:srcRect/>
+          <a:stretch>
+            <a:fillRect/>
+          </a:stretch>
+        </p:blipFill>
+        <p:spPr bwMode="auto">
+          <a:xfrm>
+            <a:off x="6274340" y="5229199"/>
+            <a:ext cx="720000" cy="720000"/>
+          </a:xfrm>
+          <a:prstGeom prst="rect">
+            <a:avLst/>
+          </a:prstGeom>
+          <a:noFill/>
+          <a:extLst>
+            <a:ext uri="{909E8E84-426E-40DD-AFC4-6F175D3DCCD1}">
+              <a14:hiddenFill xmlns:a14="http://schemas.microsoft.com/office/drawing/2010/main">
+                <a:solidFill>
+                  <a:srgbClr val="FFFFFF"/>
+                </a:solidFill>
+              </a14:hiddenFill>
+            </a:ext>
+          </a:extLst>
+        </p:spPr>
+      </p:pic>
+      <p:pic>
+        <p:nvPicPr>
+          <p:cNvPr id="21" name="Picture 6" descr="E:\Projekte\HammerMan\Art\Boden Textur - HammerMan.png"/>
+          <p:cNvPicPr>
+            <a:picLocks noChangeAspect="1" noChangeArrowheads="1"/>
+          </p:cNvPicPr>
+          <p:nvPr/>
+        </p:nvPicPr>
+        <p:blipFill>
+          <a:blip r:embed="rId6" cstate="print">
+            <a:extLst>
+              <a:ext uri="{28A0092B-C50C-407E-A947-70E740481C1C}">
+                <a14:useLocalDpi xmlns:a14="http://schemas.microsoft.com/office/drawing/2010/main" val="0"/>
+              </a:ext>
+            </a:extLst>
+          </a:blip>
+          <a:srcRect/>
+          <a:stretch>
+            <a:fillRect/>
+          </a:stretch>
+        </p:blipFill>
+        <p:spPr bwMode="auto">
+          <a:xfrm>
+            <a:off x="6994340" y="5229200"/>
+            <a:ext cx="720000" cy="720000"/>
+          </a:xfrm>
+          <a:prstGeom prst="rect">
+            <a:avLst/>
+          </a:prstGeom>
+          <a:noFill/>
+          <a:extLst>
+            <a:ext uri="{909E8E84-426E-40DD-AFC4-6F175D3DCCD1}">
+              <a14:hiddenFill xmlns:a14="http://schemas.microsoft.com/office/drawing/2010/main">
+                <a:solidFill>
+                  <a:srgbClr val="FFFFFF"/>
+                </a:solidFill>
+              </a14:hiddenFill>
+            </a:ext>
+          </a:extLst>
+        </p:spPr>
+      </p:pic>
+      <p:pic>
+        <p:nvPicPr>
+          <p:cNvPr id="22" name="Picture 6" descr="E:\Projekte\HammerMan\Art\Boden Textur - HammerMan.png"/>
+          <p:cNvPicPr>
+            <a:picLocks noChangeAspect="1" noChangeArrowheads="1"/>
+          </p:cNvPicPr>
+          <p:nvPr/>
+        </p:nvPicPr>
+        <p:blipFill>
+          <a:blip r:embed="rId6" cstate="print">
+            <a:extLst>
+              <a:ext uri="{28A0092B-C50C-407E-A947-70E740481C1C}">
+                <a14:useLocalDpi xmlns:a14="http://schemas.microsoft.com/office/drawing/2010/main" val="0"/>
+              </a:ext>
+            </a:extLst>
+          </a:blip>
+          <a:srcRect/>
+          <a:stretch>
+            <a:fillRect/>
+          </a:stretch>
+        </p:blipFill>
+        <p:spPr bwMode="auto">
+          <a:xfrm>
+            <a:off x="539632" y="5229199"/>
+            <a:ext cx="720000" cy="720000"/>
+          </a:xfrm>
+          <a:prstGeom prst="rect">
+            <a:avLst/>
+          </a:prstGeom>
+          <a:noFill/>
+          <a:extLst>
+            <a:ext uri="{909E8E84-426E-40DD-AFC4-6F175D3DCCD1}">
+              <a14:hiddenFill xmlns:a14="http://schemas.microsoft.com/office/drawing/2010/main">
+                <a:solidFill>
+                  <a:srgbClr val="FFFFFF"/>
+                </a:solidFill>
+              </a14:hiddenFill>
+            </a:ext>
+          </a:extLst>
+        </p:spPr>
+      </p:pic>
+      <p:pic>
+        <p:nvPicPr>
+          <p:cNvPr id="23" name="Picture 6" descr="E:\Projekte\HammerMan\Art\Boden Textur - HammerMan.png"/>
+          <p:cNvPicPr>
+            <a:picLocks noChangeAspect="1" noChangeArrowheads="1"/>
+          </p:cNvPicPr>
+          <p:nvPr/>
+        </p:nvPicPr>
+        <p:blipFill>
+          <a:blip r:embed="rId6" cstate="print">
+            <a:extLst>
+              <a:ext uri="{28A0092B-C50C-407E-A947-70E740481C1C}">
+                <a14:useLocalDpi xmlns:a14="http://schemas.microsoft.com/office/drawing/2010/main" val="0"/>
+              </a:ext>
+            </a:extLst>
+          </a:blip>
+          <a:srcRect/>
+          <a:stretch>
+            <a:fillRect/>
+          </a:stretch>
+        </p:blipFill>
+        <p:spPr bwMode="auto">
+          <a:xfrm>
+            <a:off x="7706250" y="5229199"/>
+            <a:ext cx="720000" cy="720000"/>
+          </a:xfrm>
+          <a:prstGeom prst="rect">
+            <a:avLst/>
+          </a:prstGeom>
+          <a:noFill/>
+          <a:extLst>
+            <a:ext uri="{909E8E84-426E-40DD-AFC4-6F175D3DCCD1}">
+              <a14:hiddenFill xmlns:a14="http://schemas.microsoft.com/office/drawing/2010/main">
+                <a:solidFill>
+                  <a:srgbClr val="FFFFFF"/>
+                </a:solidFill>
+              </a14:hiddenFill>
+            </a:ext>
+          </a:extLst>
+        </p:spPr>
+      </p:pic>
+      <p:pic>
+        <p:nvPicPr>
+          <p:cNvPr id="24" name="Picture 5" descr="E:\Projekte\HammerMan\Art\Holz - Textur - HammerMan.png"/>
+          <p:cNvPicPr>
+            <a:picLocks noChangeAspect="1" noChangeArrowheads="1"/>
+          </p:cNvPicPr>
+          <p:nvPr/>
+        </p:nvPicPr>
+        <p:blipFill>
+          <a:blip r:embed="rId5" cstate="print">
+            <a:extLst>
+              <a:ext uri="{28A0092B-C50C-407E-A947-70E740481C1C}">
+                <a14:useLocalDpi xmlns:a14="http://schemas.microsoft.com/office/drawing/2010/main" val="0"/>
+              </a:ext>
+            </a:extLst>
+          </a:blip>
+          <a:srcRect/>
+          <a:stretch>
+            <a:fillRect/>
+          </a:stretch>
+        </p:blipFill>
+        <p:spPr bwMode="auto">
+          <a:xfrm>
+            <a:off x="1259632" y="5949200"/>
+            <a:ext cx="720000" cy="720000"/>
+          </a:xfrm>
+          <a:prstGeom prst="rect">
+            <a:avLst/>
+          </a:prstGeom>
+          <a:noFill/>
+          <a:extLst>
+            <a:ext uri="{909E8E84-426E-40DD-AFC4-6F175D3DCCD1}">
+              <a14:hiddenFill xmlns:a14="http://schemas.microsoft.com/office/drawing/2010/main">
+                <a:solidFill>
+                  <a:srgbClr val="FFFFFF"/>
+                </a:solidFill>
+              </a14:hiddenFill>
+            </a:ext>
+          </a:extLst>
+        </p:spPr>
+      </p:pic>
     </p:spTree>
     <p:extLst>
       <p:ext uri="{BB962C8B-B14F-4D97-AF65-F5344CB8AC3E}">
@@ -15982,6 +16809,7 @@
                 <a:solidFill>
                   <a:schemeClr val="bg1"/>
                 </a:solidFill>
+                <a:latin typeface="TeXGyreAdventor" pitchFamily="50" charset="0"/>
               </a:rPr>
               <a:t>Eine kleine Demonstration</a:t>
             </a:r>
@@ -15989,6 +16817,7 @@
               <a:solidFill>
                 <a:schemeClr val="bg1"/>
               </a:solidFill>
+              <a:latin typeface="TeXGyreAdventor" pitchFamily="50" charset="0"/>
             </a:endParaRPr>
           </a:p>
         </p:txBody>
@@ -16050,6 +16879,7 @@
                 <a:solidFill>
                   <a:schemeClr val="bg1"/>
                 </a:solidFill>
+                <a:latin typeface="TeXGyreAdventor" pitchFamily="50" charset="0"/>
               </a:rPr>
               <a:t>Gameloop</a:t>
             </a:r>
@@ -16058,6 +16888,7 @@
                 <a:solidFill>
                   <a:schemeClr val="bg1"/>
                 </a:solidFill>
+                <a:latin typeface="TeXGyreAdventor" pitchFamily="50" charset="0"/>
               </a:rPr>
               <a:t>: Welle</a:t>
             </a:r>
@@ -16065,6 +16896,7 @@
               <a:solidFill>
                 <a:schemeClr val="bg1"/>
               </a:solidFill>
+              <a:latin typeface="TeXGyreAdventor" pitchFamily="50" charset="0"/>
             </a:endParaRPr>
           </a:p>
         </p:txBody>

</xml_diff>

<commit_message>
Made Screenshot, Created GeneralGameDocument
</commit_message>
<xml_diff>
--- a/Documentation/Hammer Man.pptx
+++ b/Documentation/Hammer Man.pptx
@@ -3436,19 +3436,19 @@
     </dgm:pt>
   </dgm:ptLst>
   <dgm:cxnLst>
+    <dgm:cxn modelId="{C07DA67C-38EE-4EF0-8FE8-F5FD5E6E46AB}" srcId="{5342101B-1734-4053-B4AD-4B96492968E1}" destId="{95B844A8-6B7C-4F29-A398-72201D964135}" srcOrd="2" destOrd="0" parTransId="{A5AAAB0C-44E3-4DF0-B5E6-03213BF2D0CC}" sibTransId="{8B8A93D2-170F-40A9-946C-02EB0BEE0B33}"/>
+    <dgm:cxn modelId="{279D605E-E99C-42E3-9A71-B3CE3AAB6FEB}" srcId="{5342101B-1734-4053-B4AD-4B96492968E1}" destId="{57E6587E-A19D-4B62-88D4-67000147672C}" srcOrd="1" destOrd="0" parTransId="{2D3F9B4C-0A77-4FA6-8A41-CD0FC6190857}" sibTransId="{89476B55-F10A-4780-8D37-2A0B55258904}"/>
+    <dgm:cxn modelId="{58FD8AE5-BF07-41C6-A155-422819A51FFA}" type="presOf" srcId="{95B844A8-6B7C-4F29-A398-72201D964135}" destId="{572ADCD4-3005-40F1-BC9E-A1BF3103D95E}" srcOrd="0" destOrd="0" presId="urn:microsoft.com/office/officeart/2005/8/layout/cycle5"/>
     <dgm:cxn modelId="{B6D57B28-2558-4D66-B7E8-05FB072148F5}" srcId="{5342101B-1734-4053-B4AD-4B96492968E1}" destId="{740EF86F-B076-4C59-AE42-D4D80FC39A80}" srcOrd="0" destOrd="0" parTransId="{842EBE08-0204-45A8-B8FD-D75CD0B7FAA3}" sibTransId="{C1CAF616-E0AF-4AA9-A052-1D325D32B2DB}"/>
+    <dgm:cxn modelId="{1F367310-765F-4BFA-9B9C-ABF7B2599F9E}" type="presOf" srcId="{89476B55-F10A-4780-8D37-2A0B55258904}" destId="{D92A7E3E-0AF7-4958-A3AE-A24DD2F922A8}" srcOrd="0" destOrd="0" presId="urn:microsoft.com/office/officeart/2005/8/layout/cycle5"/>
+    <dgm:cxn modelId="{597FD176-2096-447D-914A-813740991E53}" type="presOf" srcId="{C1CAF616-E0AF-4AA9-A052-1D325D32B2DB}" destId="{C717F32B-C9D9-4405-87E8-96F537F320D8}" srcOrd="0" destOrd="0" presId="urn:microsoft.com/office/officeart/2005/8/layout/cycle5"/>
+    <dgm:cxn modelId="{58146B81-AE4E-4CF6-907C-7207ED5E41B4}" type="presOf" srcId="{8B8A93D2-170F-40A9-946C-02EB0BEE0B33}" destId="{C03B017B-D526-4168-B33C-86F58F8D2514}" srcOrd="0" destOrd="0" presId="urn:microsoft.com/office/officeart/2005/8/layout/cycle5"/>
     <dgm:cxn modelId="{150BAB3F-D8BB-46FD-903F-3774C67F2416}" srcId="{5342101B-1734-4053-B4AD-4B96492968E1}" destId="{B99B043F-3603-441A-B4C1-FC506887984D}" srcOrd="3" destOrd="0" parTransId="{1C85A6BC-8A1F-4B25-BA7F-B6DEF42FEEA9}" sibTransId="{B7041E5D-CA35-4B1A-92A7-0EE6AD8C5E73}"/>
-    <dgm:cxn modelId="{58FD8AE5-BF07-41C6-A155-422819A51FFA}" type="presOf" srcId="{95B844A8-6B7C-4F29-A398-72201D964135}" destId="{572ADCD4-3005-40F1-BC9E-A1BF3103D95E}" srcOrd="0" destOrd="0" presId="urn:microsoft.com/office/officeart/2005/8/layout/cycle5"/>
-    <dgm:cxn modelId="{C07DA67C-38EE-4EF0-8FE8-F5FD5E6E46AB}" srcId="{5342101B-1734-4053-B4AD-4B96492968E1}" destId="{95B844A8-6B7C-4F29-A398-72201D964135}" srcOrd="2" destOrd="0" parTransId="{A5AAAB0C-44E3-4DF0-B5E6-03213BF2D0CC}" sibTransId="{8B8A93D2-170F-40A9-946C-02EB0BEE0B33}"/>
+    <dgm:cxn modelId="{92B58ABD-91BE-42C6-B04B-86560DB2122F}" type="presOf" srcId="{5342101B-1734-4053-B4AD-4B96492968E1}" destId="{AF51655B-2A03-4078-8076-316868FC4F7D}" srcOrd="0" destOrd="0" presId="urn:microsoft.com/office/officeart/2005/8/layout/cycle5"/>
+    <dgm:cxn modelId="{4381C918-24A7-44C8-91CC-E47ED2FFEE6B}" type="presOf" srcId="{740EF86F-B076-4C59-AE42-D4D80FC39A80}" destId="{354449BB-0B46-4C11-9134-8DB5FB2F99C6}" srcOrd="0" destOrd="0" presId="urn:microsoft.com/office/officeart/2005/8/layout/cycle5"/>
+    <dgm:cxn modelId="{583BFD99-31F2-4DF6-AEC2-09C0292F659D}" type="presOf" srcId="{B7041E5D-CA35-4B1A-92A7-0EE6AD8C5E73}" destId="{196B2D47-6A45-49C7-ACE2-92767BBA24F0}" srcOrd="0" destOrd="0" presId="urn:microsoft.com/office/officeart/2005/8/layout/cycle5"/>
     <dgm:cxn modelId="{F6C055A3-6687-420E-ABE1-08EAFB24DBEE}" type="presOf" srcId="{57E6587E-A19D-4B62-88D4-67000147672C}" destId="{4529D1E9-320E-48D5-BC65-8DB29EBF18BF}" srcOrd="0" destOrd="0" presId="urn:microsoft.com/office/officeart/2005/8/layout/cycle5"/>
-    <dgm:cxn modelId="{58146B81-AE4E-4CF6-907C-7207ED5E41B4}" type="presOf" srcId="{8B8A93D2-170F-40A9-946C-02EB0BEE0B33}" destId="{C03B017B-D526-4168-B33C-86F58F8D2514}" srcOrd="0" destOrd="0" presId="urn:microsoft.com/office/officeart/2005/8/layout/cycle5"/>
     <dgm:cxn modelId="{A4E8BE9F-A21B-4030-A26A-102FA5F1143D}" type="presOf" srcId="{B99B043F-3603-441A-B4C1-FC506887984D}" destId="{91AD1392-DB8C-4A60-8978-66EE58493DC6}" srcOrd="0" destOrd="0" presId="urn:microsoft.com/office/officeart/2005/8/layout/cycle5"/>
-    <dgm:cxn modelId="{92B58ABD-91BE-42C6-B04B-86560DB2122F}" type="presOf" srcId="{5342101B-1734-4053-B4AD-4B96492968E1}" destId="{AF51655B-2A03-4078-8076-316868FC4F7D}" srcOrd="0" destOrd="0" presId="urn:microsoft.com/office/officeart/2005/8/layout/cycle5"/>
-    <dgm:cxn modelId="{597FD176-2096-447D-914A-813740991E53}" type="presOf" srcId="{C1CAF616-E0AF-4AA9-A052-1D325D32B2DB}" destId="{C717F32B-C9D9-4405-87E8-96F537F320D8}" srcOrd="0" destOrd="0" presId="urn:microsoft.com/office/officeart/2005/8/layout/cycle5"/>
-    <dgm:cxn modelId="{583BFD99-31F2-4DF6-AEC2-09C0292F659D}" type="presOf" srcId="{B7041E5D-CA35-4B1A-92A7-0EE6AD8C5E73}" destId="{196B2D47-6A45-49C7-ACE2-92767BBA24F0}" srcOrd="0" destOrd="0" presId="urn:microsoft.com/office/officeart/2005/8/layout/cycle5"/>
-    <dgm:cxn modelId="{4381C918-24A7-44C8-91CC-E47ED2FFEE6B}" type="presOf" srcId="{740EF86F-B076-4C59-AE42-D4D80FC39A80}" destId="{354449BB-0B46-4C11-9134-8DB5FB2F99C6}" srcOrd="0" destOrd="0" presId="urn:microsoft.com/office/officeart/2005/8/layout/cycle5"/>
-    <dgm:cxn modelId="{1F367310-765F-4BFA-9B9C-ABF7B2599F9E}" type="presOf" srcId="{89476B55-F10A-4780-8D37-2A0B55258904}" destId="{D92A7E3E-0AF7-4958-A3AE-A24DD2F922A8}" srcOrd="0" destOrd="0" presId="urn:microsoft.com/office/officeart/2005/8/layout/cycle5"/>
-    <dgm:cxn modelId="{279D605E-E99C-42E3-9A71-B3CE3AAB6FEB}" srcId="{5342101B-1734-4053-B4AD-4B96492968E1}" destId="{57E6587E-A19D-4B62-88D4-67000147672C}" srcOrd="1" destOrd="0" parTransId="{2D3F9B4C-0A77-4FA6-8A41-CD0FC6190857}" sibTransId="{89476B55-F10A-4780-8D37-2A0B55258904}"/>
     <dgm:cxn modelId="{40242DA9-A7DA-4491-9C63-D5AB35FF195D}" type="presParOf" srcId="{AF51655B-2A03-4078-8076-316868FC4F7D}" destId="{354449BB-0B46-4C11-9134-8DB5FB2F99C6}" srcOrd="0" destOrd="0" presId="urn:microsoft.com/office/officeart/2005/8/layout/cycle5"/>
     <dgm:cxn modelId="{CCE55A20-6365-4AFA-99D7-E88E88B746BE}" type="presParOf" srcId="{AF51655B-2A03-4078-8076-316868FC4F7D}" destId="{494CCD5B-D3DD-4D37-B19B-CC9742BD6FFC}" srcOrd="1" destOrd="0" presId="urn:microsoft.com/office/officeart/2005/8/layout/cycle5"/>
     <dgm:cxn modelId="{A073D98A-5A97-47BD-A615-C2296A5C5C6C}" type="presParOf" srcId="{AF51655B-2A03-4078-8076-316868FC4F7D}" destId="{C717F32B-C9D9-4405-87E8-96F537F320D8}" srcOrd="2" destOrd="0" presId="urn:microsoft.com/office/officeart/2005/8/layout/cycle5"/>
@@ -5172,508 +5172,6 @@
       <dsp:cNvGrpSpPr/>
     </dsp:nvGrpSpPr>
     <dsp:grpSpPr/>
-    <dsp:sp modelId="{E9F05097-1B9E-4B8E-AF59-3EEC4B3947A4}">
-      <dsp:nvSpPr>
-        <dsp:cNvPr id="0" name=""/>
-        <dsp:cNvSpPr/>
-      </dsp:nvSpPr>
-      <dsp:spPr>
-        <a:xfrm>
-          <a:off x="2959939" y="360048"/>
-          <a:ext cx="2340341" cy="1521221"/>
-        </a:xfrm>
-        <a:prstGeom prst="roundRect">
-          <a:avLst/>
-        </a:prstGeom>
-        <a:gradFill rotWithShape="0">
-          <a:gsLst>
-            <a:gs pos="0">
-              <a:schemeClr val="accent1">
-                <a:hueOff val="0"/>
-                <a:satOff val="0"/>
-                <a:lumOff val="0"/>
-                <a:alphaOff val="0"/>
-                <a:shade val="51000"/>
-                <a:satMod val="130000"/>
-              </a:schemeClr>
-            </a:gs>
-            <a:gs pos="80000">
-              <a:schemeClr val="accent1">
-                <a:hueOff val="0"/>
-                <a:satOff val="0"/>
-                <a:lumOff val="0"/>
-                <a:alphaOff val="0"/>
-                <a:shade val="93000"/>
-                <a:satMod val="130000"/>
-              </a:schemeClr>
-            </a:gs>
-            <a:gs pos="100000">
-              <a:schemeClr val="accent1">
-                <a:hueOff val="0"/>
-                <a:satOff val="0"/>
-                <a:lumOff val="0"/>
-                <a:alphaOff val="0"/>
-                <a:shade val="94000"/>
-                <a:satMod val="135000"/>
-              </a:schemeClr>
-            </a:gs>
-          </a:gsLst>
-          <a:lin ang="16200000" scaled="0"/>
-        </a:gradFill>
-        <a:ln>
-          <a:noFill/>
-        </a:ln>
-        <a:effectLst>
-          <a:outerShdw blurRad="40000" dist="23000" dir="5400000" rotWithShape="0">
-            <a:srgbClr val="000000">
-              <a:alpha val="35000"/>
-            </a:srgbClr>
-          </a:outerShdw>
-        </a:effectLst>
-        <a:scene3d>
-          <a:camera prst="orthographicFront">
-            <a:rot lat="0" lon="0" rev="0"/>
-          </a:camera>
-          <a:lightRig rig="threePt" dir="t">
-            <a:rot lat="0" lon="0" rev="1200000"/>
-          </a:lightRig>
-        </a:scene3d>
-        <a:sp3d>
-          <a:bevelT w="63500" h="25400"/>
-        </a:sp3d>
-      </dsp:spPr>
-      <dsp:style>
-        <a:lnRef idx="0">
-          <a:scrgbClr r="0" g="0" b="0"/>
-        </a:lnRef>
-        <a:fillRef idx="3">
-          <a:scrgbClr r="0" g="0" b="0"/>
-        </a:fillRef>
-        <a:effectRef idx="3">
-          <a:scrgbClr r="0" g="0" b="0"/>
-        </a:effectRef>
-        <a:fontRef idx="minor">
-          <a:schemeClr val="lt1"/>
-        </a:fontRef>
-      </dsp:style>
-      <dsp:txBody>
-        <a:bodyPr spcFirstLastPara="0" vert="horz" wrap="square" lIns="144780" tIns="144780" rIns="144780" bIns="144780" numCol="1" spcCol="1270" anchor="ctr" anchorCtr="0">
-          <a:noAutofit/>
-        </a:bodyPr>
-        <a:lstStyle/>
-        <a:p>
-          <a:pPr lvl="0" algn="ctr" defTabSz="1689100">
-            <a:lnSpc>
-              <a:spcPct val="90000"/>
-            </a:lnSpc>
-            <a:spcBef>
-              <a:spcPct val="0"/>
-            </a:spcBef>
-            <a:spcAft>
-              <a:spcPct val="35000"/>
-            </a:spcAft>
-          </a:pPr>
-          <a:r>
-            <a:rPr lang="de-DE" sz="3800" kern="1200" dirty="0" smtClean="0"/>
-            <a:t>Welle</a:t>
-          </a:r>
-          <a:endParaRPr lang="de-DE" sz="3800" kern="1200" dirty="0"/>
-        </a:p>
-      </dsp:txBody>
-      <dsp:txXfrm>
-        <a:off x="3034199" y="434308"/>
-        <a:ext cx="2191821" cy="1372701"/>
-      </dsp:txXfrm>
-    </dsp:sp>
-    <dsp:sp modelId="{9DC02F61-6382-491B-A9CC-411B82EC0C16}">
-      <dsp:nvSpPr>
-        <dsp:cNvPr id="0" name=""/>
-        <dsp:cNvSpPr/>
-      </dsp:nvSpPr>
-      <dsp:spPr>
-        <a:xfrm>
-          <a:off x="2256718" y="1174761"/>
-          <a:ext cx="4056805" cy="4056805"/>
-        </a:xfrm>
-        <a:custGeom>
-          <a:avLst/>
-          <a:gdLst/>
-          <a:ahLst/>
-          <a:cxnLst/>
-          <a:rect l="0" t="0" r="0" b="0"/>
-          <a:pathLst>
-            <a:path>
-              <a:moveTo>
-                <a:pt x="3351098" y="490581"/>
-              </a:moveTo>
-              <a:arcTo wR="2028402" hR="2028402" stAng="18641950" swAng="2048775"/>
-            </a:path>
-          </a:pathLst>
-        </a:custGeom>
-        <a:noFill/>
-        <a:ln w="9525" cap="flat" cmpd="sng" algn="ctr">
-          <a:solidFill>
-            <a:schemeClr val="accent1">
-              <a:hueOff val="0"/>
-              <a:satOff val="0"/>
-              <a:lumOff val="0"/>
-              <a:alphaOff val="0"/>
-            </a:schemeClr>
-          </a:solidFill>
-          <a:prstDash val="solid"/>
-          <a:tailEnd type="arrow"/>
-        </a:ln>
-        <a:effectLst/>
-      </dsp:spPr>
-      <dsp:style>
-        <a:lnRef idx="1">
-          <a:scrgbClr r="0" g="0" b="0"/>
-        </a:lnRef>
-        <a:fillRef idx="0">
-          <a:scrgbClr r="0" g="0" b="0"/>
-        </a:fillRef>
-        <a:effectRef idx="0">
-          <a:scrgbClr r="0" g="0" b="0"/>
-        </a:effectRef>
-        <a:fontRef idx="minor"/>
-      </dsp:style>
-    </dsp:sp>
-    <dsp:sp modelId="{5928E8AF-DB95-435B-B7F9-41BAA85F8D37}">
-      <dsp:nvSpPr>
-        <dsp:cNvPr id="0" name=""/>
-        <dsp:cNvSpPr/>
-      </dsp:nvSpPr>
-      <dsp:spPr>
-        <a:xfrm>
-          <a:off x="4881297" y="3044488"/>
-          <a:ext cx="2340341" cy="1521221"/>
-        </a:xfrm>
-        <a:prstGeom prst="roundRect">
-          <a:avLst/>
-        </a:prstGeom>
-        <a:gradFill rotWithShape="0">
-          <a:gsLst>
-            <a:gs pos="0">
-              <a:schemeClr val="accent1">
-                <a:hueOff val="0"/>
-                <a:satOff val="0"/>
-                <a:lumOff val="0"/>
-                <a:alphaOff val="0"/>
-                <a:shade val="51000"/>
-                <a:satMod val="130000"/>
-              </a:schemeClr>
-            </a:gs>
-            <a:gs pos="80000">
-              <a:schemeClr val="accent1">
-                <a:hueOff val="0"/>
-                <a:satOff val="0"/>
-                <a:lumOff val="0"/>
-                <a:alphaOff val="0"/>
-                <a:shade val="93000"/>
-                <a:satMod val="130000"/>
-              </a:schemeClr>
-            </a:gs>
-            <a:gs pos="100000">
-              <a:schemeClr val="accent1">
-                <a:hueOff val="0"/>
-                <a:satOff val="0"/>
-                <a:lumOff val="0"/>
-                <a:alphaOff val="0"/>
-                <a:shade val="94000"/>
-                <a:satMod val="135000"/>
-              </a:schemeClr>
-            </a:gs>
-          </a:gsLst>
-          <a:lin ang="16200000" scaled="0"/>
-        </a:gradFill>
-        <a:ln>
-          <a:noFill/>
-        </a:ln>
-        <a:effectLst>
-          <a:outerShdw blurRad="40000" dist="23000" dir="5400000" rotWithShape="0">
-            <a:srgbClr val="000000">
-              <a:alpha val="35000"/>
-            </a:srgbClr>
-          </a:outerShdw>
-        </a:effectLst>
-        <a:scene3d>
-          <a:camera prst="orthographicFront">
-            <a:rot lat="0" lon="0" rev="0"/>
-          </a:camera>
-          <a:lightRig rig="threePt" dir="t">
-            <a:rot lat="0" lon="0" rev="1200000"/>
-          </a:lightRig>
-        </a:scene3d>
-        <a:sp3d>
-          <a:bevelT w="63500" h="25400"/>
-        </a:sp3d>
-      </dsp:spPr>
-      <dsp:style>
-        <a:lnRef idx="0">
-          <a:scrgbClr r="0" g="0" b="0"/>
-        </a:lnRef>
-        <a:fillRef idx="3">
-          <a:scrgbClr r="0" g="0" b="0"/>
-        </a:fillRef>
-        <a:effectRef idx="3">
-          <a:scrgbClr r="0" g="0" b="0"/>
-        </a:effectRef>
-        <a:fontRef idx="minor">
-          <a:schemeClr val="lt1"/>
-        </a:fontRef>
-      </dsp:style>
-      <dsp:txBody>
-        <a:bodyPr spcFirstLastPara="0" vert="horz" wrap="square" lIns="144780" tIns="144780" rIns="144780" bIns="144780" numCol="1" spcCol="1270" anchor="ctr" anchorCtr="0">
-          <a:noAutofit/>
-        </a:bodyPr>
-        <a:lstStyle/>
-        <a:p>
-          <a:pPr lvl="0" algn="ctr" defTabSz="1689100">
-            <a:lnSpc>
-              <a:spcPct val="90000"/>
-            </a:lnSpc>
-            <a:spcBef>
-              <a:spcPct val="0"/>
-            </a:spcBef>
-            <a:spcAft>
-              <a:spcPct val="35000"/>
-            </a:spcAft>
-          </a:pPr>
-          <a:r>
-            <a:rPr lang="de-DE" sz="3800" kern="1200" dirty="0" smtClean="0"/>
-            <a:t>Welle</a:t>
-          </a:r>
-          <a:endParaRPr lang="de-DE" sz="3800" kern="1200" dirty="0"/>
-        </a:p>
-      </dsp:txBody>
-      <dsp:txXfrm>
-        <a:off x="4955557" y="3118748"/>
-        <a:ext cx="2191821" cy="1372701"/>
-      </dsp:txXfrm>
-    </dsp:sp>
-    <dsp:sp modelId="{27248C72-71CC-4066-997C-1CBA8A51950D}">
-      <dsp:nvSpPr>
-        <dsp:cNvPr id="0" name=""/>
-        <dsp:cNvSpPr/>
-      </dsp:nvSpPr>
-      <dsp:spPr>
-        <a:xfrm>
-          <a:off x="2002574" y="936644"/>
-          <a:ext cx="4056805" cy="4056805"/>
-        </a:xfrm>
-        <a:custGeom>
-          <a:avLst/>
-          <a:gdLst/>
-          <a:ahLst/>
-          <a:cxnLst/>
-          <a:rect l="0" t="0" r="0" b="0"/>
-          <a:pathLst>
-            <a:path>
-              <a:moveTo>
-                <a:pt x="2842892" y="3886095"/>
-              </a:moveTo>
-              <a:arcTo wR="2028402" hR="2028402" stAng="3979521" swAng="2896010"/>
-            </a:path>
-          </a:pathLst>
-        </a:custGeom>
-        <a:noFill/>
-        <a:ln w="9525" cap="flat" cmpd="sng" algn="ctr">
-          <a:solidFill>
-            <a:schemeClr val="accent1">
-              <a:hueOff val="0"/>
-              <a:satOff val="0"/>
-              <a:lumOff val="0"/>
-              <a:alphaOff val="0"/>
-            </a:schemeClr>
-          </a:solidFill>
-          <a:prstDash val="solid"/>
-          <a:tailEnd type="arrow"/>
-        </a:ln>
-        <a:effectLst/>
-      </dsp:spPr>
-      <dsp:style>
-        <a:lnRef idx="1">
-          <a:scrgbClr r="0" g="0" b="0"/>
-        </a:lnRef>
-        <a:fillRef idx="0">
-          <a:scrgbClr r="0" g="0" b="0"/>
-        </a:fillRef>
-        <a:effectRef idx="0">
-          <a:scrgbClr r="0" g="0" b="0"/>
-        </a:effectRef>
-        <a:fontRef idx="minor"/>
-      </dsp:style>
-    </dsp:sp>
-    <dsp:sp modelId="{7698C44A-1705-4A41-9F8F-9426CBF08A80}">
-      <dsp:nvSpPr>
-        <dsp:cNvPr id="0" name=""/>
-        <dsp:cNvSpPr/>
-      </dsp:nvSpPr>
-      <dsp:spPr>
-        <a:xfrm>
-          <a:off x="1015713" y="3024332"/>
-          <a:ext cx="2340341" cy="1521221"/>
-        </a:xfrm>
-        <a:prstGeom prst="roundRect">
-          <a:avLst/>
-        </a:prstGeom>
-        <a:gradFill rotWithShape="0">
-          <a:gsLst>
-            <a:gs pos="0">
-              <a:schemeClr val="accent1">
-                <a:hueOff val="0"/>
-                <a:satOff val="0"/>
-                <a:lumOff val="0"/>
-                <a:alphaOff val="0"/>
-                <a:shade val="51000"/>
-                <a:satMod val="130000"/>
-              </a:schemeClr>
-            </a:gs>
-            <a:gs pos="80000">
-              <a:schemeClr val="accent1">
-                <a:hueOff val="0"/>
-                <a:satOff val="0"/>
-                <a:lumOff val="0"/>
-                <a:alphaOff val="0"/>
-                <a:shade val="93000"/>
-                <a:satMod val="130000"/>
-              </a:schemeClr>
-            </a:gs>
-            <a:gs pos="100000">
-              <a:schemeClr val="accent1">
-                <a:hueOff val="0"/>
-                <a:satOff val="0"/>
-                <a:lumOff val="0"/>
-                <a:alphaOff val="0"/>
-                <a:shade val="94000"/>
-                <a:satMod val="135000"/>
-              </a:schemeClr>
-            </a:gs>
-          </a:gsLst>
-          <a:lin ang="16200000" scaled="0"/>
-        </a:gradFill>
-        <a:ln>
-          <a:noFill/>
-        </a:ln>
-        <a:effectLst>
-          <a:outerShdw blurRad="40000" dist="23000" dir="5400000" rotWithShape="0">
-            <a:srgbClr val="000000">
-              <a:alpha val="35000"/>
-            </a:srgbClr>
-          </a:outerShdw>
-        </a:effectLst>
-        <a:scene3d>
-          <a:camera prst="orthographicFront">
-            <a:rot lat="0" lon="0" rev="0"/>
-          </a:camera>
-          <a:lightRig rig="threePt" dir="t">
-            <a:rot lat="0" lon="0" rev="1200000"/>
-          </a:lightRig>
-        </a:scene3d>
-        <a:sp3d>
-          <a:bevelT w="63500" h="25400"/>
-        </a:sp3d>
-      </dsp:spPr>
-      <dsp:style>
-        <a:lnRef idx="0">
-          <a:scrgbClr r="0" g="0" b="0"/>
-        </a:lnRef>
-        <a:fillRef idx="3">
-          <a:scrgbClr r="0" g="0" b="0"/>
-        </a:fillRef>
-        <a:effectRef idx="3">
-          <a:scrgbClr r="0" g="0" b="0"/>
-        </a:effectRef>
-        <a:fontRef idx="minor">
-          <a:schemeClr val="lt1"/>
-        </a:fontRef>
-      </dsp:style>
-      <dsp:txBody>
-        <a:bodyPr spcFirstLastPara="0" vert="horz" wrap="square" lIns="144780" tIns="144780" rIns="144780" bIns="144780" numCol="1" spcCol="1270" anchor="ctr" anchorCtr="0">
-          <a:noAutofit/>
-        </a:bodyPr>
-        <a:lstStyle/>
-        <a:p>
-          <a:pPr lvl="0" algn="ctr" defTabSz="1689100">
-            <a:lnSpc>
-              <a:spcPct val="90000"/>
-            </a:lnSpc>
-            <a:spcBef>
-              <a:spcPct val="0"/>
-            </a:spcBef>
-            <a:spcAft>
-              <a:spcPct val="35000"/>
-            </a:spcAft>
-          </a:pPr>
-          <a:r>
-            <a:rPr lang="de-DE" sz="3800" kern="1200" dirty="0" err="1" smtClean="0"/>
-            <a:t>Spawner</a:t>
-          </a:r>
-          <a:r>
-            <a:rPr lang="de-DE" sz="3800" kern="1200" dirty="0" smtClean="0"/>
-            <a:t> angreifen</a:t>
-          </a:r>
-          <a:endParaRPr lang="de-DE" sz="3800" kern="1200" dirty="0"/>
-        </a:p>
-      </dsp:txBody>
-      <dsp:txXfrm>
-        <a:off x="1089973" y="3098592"/>
-        <a:ext cx="2191821" cy="1372701"/>
-      </dsp:txXfrm>
-    </dsp:sp>
-    <dsp:sp modelId="{A12364B4-E76E-4847-BD61-628D76E7F5F9}">
-      <dsp:nvSpPr>
-        <dsp:cNvPr id="0" name=""/>
-        <dsp:cNvSpPr/>
-      </dsp:nvSpPr>
-      <dsp:spPr>
-        <a:xfrm>
-          <a:off x="1904914" y="1524778"/>
-          <a:ext cx="4056805" cy="4056805"/>
-        </a:xfrm>
-        <a:custGeom>
-          <a:avLst/>
-          <a:gdLst/>
-          <a:ahLst/>
-          <a:cxnLst/>
-          <a:rect l="0" t="0" r="0" b="0"/>
-          <a:pathLst>
-            <a:path>
-              <a:moveTo>
-                <a:pt x="176900" y="1199936"/>
-              </a:moveTo>
-              <a:arcTo wR="2028402" hR="2028402" stAng="12246385" swAng="1693371"/>
-            </a:path>
-          </a:pathLst>
-        </a:custGeom>
-        <a:noFill/>
-        <a:ln w="9525" cap="flat" cmpd="sng" algn="ctr">
-          <a:solidFill>
-            <a:schemeClr val="accent1">
-              <a:hueOff val="0"/>
-              <a:satOff val="0"/>
-              <a:lumOff val="0"/>
-              <a:alphaOff val="0"/>
-            </a:schemeClr>
-          </a:solidFill>
-          <a:prstDash val="solid"/>
-          <a:tailEnd type="arrow"/>
-        </a:ln>
-        <a:effectLst/>
-      </dsp:spPr>
-      <dsp:style>
-        <a:lnRef idx="1">
-          <a:scrgbClr r="0" g="0" b="0"/>
-        </a:lnRef>
-        <a:fillRef idx="0">
-          <a:scrgbClr r="0" g="0" b="0"/>
-        </a:fillRef>
-        <a:effectRef idx="0">
-          <a:scrgbClr r="0" g="0" b="0"/>
-        </a:effectRef>
-        <a:fontRef idx="minor"/>
-      </dsp:style>
-    </dsp:sp>
   </dsp:spTree>
 </dsp:drawing>
 </file>
@@ -5686,670 +5184,6 @@
       <dsp:cNvGrpSpPr/>
     </dsp:nvGrpSpPr>
     <dsp:grpSpPr/>
-    <dsp:sp modelId="{354449BB-0B46-4C11-9134-8DB5FB2F99C6}">
-      <dsp:nvSpPr>
-        <dsp:cNvPr id="0" name=""/>
-        <dsp:cNvSpPr/>
-      </dsp:nvSpPr>
-      <dsp:spPr>
-        <a:xfrm>
-          <a:off x="1433125" y="0"/>
-          <a:ext cx="875784" cy="569259"/>
-        </a:xfrm>
-        <a:prstGeom prst="roundRect">
-          <a:avLst/>
-        </a:prstGeom>
-        <a:gradFill rotWithShape="0">
-          <a:gsLst>
-            <a:gs pos="0">
-              <a:schemeClr val="accent2">
-                <a:hueOff val="0"/>
-                <a:satOff val="0"/>
-                <a:lumOff val="0"/>
-                <a:alphaOff val="0"/>
-                <a:shade val="51000"/>
-                <a:satMod val="130000"/>
-              </a:schemeClr>
-            </a:gs>
-            <a:gs pos="80000">
-              <a:schemeClr val="accent2">
-                <a:hueOff val="0"/>
-                <a:satOff val="0"/>
-                <a:lumOff val="0"/>
-                <a:alphaOff val="0"/>
-                <a:shade val="93000"/>
-                <a:satMod val="130000"/>
-              </a:schemeClr>
-            </a:gs>
-            <a:gs pos="100000">
-              <a:schemeClr val="accent2">
-                <a:hueOff val="0"/>
-                <a:satOff val="0"/>
-                <a:lumOff val="0"/>
-                <a:alphaOff val="0"/>
-                <a:shade val="94000"/>
-                <a:satMod val="135000"/>
-              </a:schemeClr>
-            </a:gs>
-          </a:gsLst>
-          <a:lin ang="16200000" scaled="0"/>
-        </a:gradFill>
-        <a:ln>
-          <a:noFill/>
-        </a:ln>
-        <a:effectLst>
-          <a:outerShdw blurRad="40000" dist="23000" dir="5400000" rotWithShape="0">
-            <a:srgbClr val="000000">
-              <a:alpha val="35000"/>
-            </a:srgbClr>
-          </a:outerShdw>
-        </a:effectLst>
-        <a:scene3d>
-          <a:camera prst="orthographicFront">
-            <a:rot lat="0" lon="0" rev="0"/>
-          </a:camera>
-          <a:lightRig rig="threePt" dir="t">
-            <a:rot lat="0" lon="0" rev="1200000"/>
-          </a:lightRig>
-        </a:scene3d>
-        <a:sp3d>
-          <a:bevelT w="63500" h="25400"/>
-        </a:sp3d>
-      </dsp:spPr>
-      <dsp:style>
-        <a:lnRef idx="0">
-          <a:scrgbClr r="0" g="0" b="0"/>
-        </a:lnRef>
-        <a:fillRef idx="3">
-          <a:scrgbClr r="0" g="0" b="0"/>
-        </a:fillRef>
-        <a:effectRef idx="3">
-          <a:scrgbClr r="0" g="0" b="0"/>
-        </a:effectRef>
-        <a:fontRef idx="minor">
-          <a:schemeClr val="lt1"/>
-        </a:fontRef>
-      </dsp:style>
-      <dsp:txBody>
-        <a:bodyPr spcFirstLastPara="0" vert="horz" wrap="square" lIns="49530" tIns="49530" rIns="49530" bIns="49530" numCol="1" spcCol="1270" anchor="ctr" anchorCtr="0">
-          <a:noAutofit/>
-        </a:bodyPr>
-        <a:lstStyle/>
-        <a:p>
-          <a:pPr lvl="0" algn="ctr" defTabSz="577850">
-            <a:lnSpc>
-              <a:spcPct val="90000"/>
-            </a:lnSpc>
-            <a:spcBef>
-              <a:spcPct val="0"/>
-            </a:spcBef>
-            <a:spcAft>
-              <a:spcPct val="35000"/>
-            </a:spcAft>
-          </a:pPr>
-          <a:r>
-            <a:rPr lang="de-DE" sz="1300" kern="1200" dirty="0" smtClean="0"/>
-            <a:t>Zum Gegner</a:t>
-          </a:r>
-          <a:endParaRPr lang="de-DE" sz="1300" kern="1200" dirty="0"/>
-        </a:p>
-      </dsp:txBody>
-      <dsp:txXfrm>
-        <a:off x="1460914" y="27789"/>
-        <a:ext cx="820206" cy="513681"/>
-      </dsp:txXfrm>
-    </dsp:sp>
-    <dsp:sp modelId="{C717F32B-C9D9-4405-87E8-96F537F320D8}">
-      <dsp:nvSpPr>
-        <dsp:cNvPr id="0" name=""/>
-        <dsp:cNvSpPr/>
-      </dsp:nvSpPr>
-      <dsp:spPr>
-        <a:xfrm>
-          <a:off x="1458157" y="381766"/>
-          <a:ext cx="1879515" cy="1879515"/>
-        </a:xfrm>
-        <a:custGeom>
-          <a:avLst/>
-          <a:gdLst/>
-          <a:ahLst/>
-          <a:cxnLst/>
-          <a:rect l="0" t="0" r="0" b="0"/>
-          <a:pathLst>
-            <a:path>
-              <a:moveTo>
-                <a:pt x="1071127" y="9227"/>
-              </a:moveTo>
-              <a:arcTo wR="939757" hR="939757" stAng="16682148" swAng="2703334"/>
-            </a:path>
-          </a:pathLst>
-        </a:custGeom>
-        <a:noFill/>
-        <a:ln w="9525" cap="flat" cmpd="sng" algn="ctr">
-          <a:solidFill>
-            <a:schemeClr val="accent2">
-              <a:hueOff val="0"/>
-              <a:satOff val="0"/>
-              <a:lumOff val="0"/>
-              <a:alphaOff val="0"/>
-            </a:schemeClr>
-          </a:solidFill>
-          <a:prstDash val="solid"/>
-          <a:tailEnd type="arrow"/>
-        </a:ln>
-        <a:effectLst/>
-      </dsp:spPr>
-      <dsp:style>
-        <a:lnRef idx="1">
-          <a:scrgbClr r="0" g="0" b="0"/>
-        </a:lnRef>
-        <a:fillRef idx="0">
-          <a:scrgbClr r="0" g="0" b="0"/>
-        </a:fillRef>
-        <a:effectRef idx="0">
-          <a:scrgbClr r="0" g="0" b="0"/>
-        </a:effectRef>
-        <a:fontRef idx="minor"/>
-      </dsp:style>
-    </dsp:sp>
-    <dsp:sp modelId="{4529D1E9-320E-48D5-BC65-8DB29EBF18BF}">
-      <dsp:nvSpPr>
-        <dsp:cNvPr id="0" name=""/>
-        <dsp:cNvSpPr/>
-      </dsp:nvSpPr>
-      <dsp:spPr>
-        <a:xfrm>
-          <a:off x="2849862" y="947726"/>
-          <a:ext cx="875784" cy="569259"/>
-        </a:xfrm>
-        <a:prstGeom prst="roundRect">
-          <a:avLst/>
-        </a:prstGeom>
-        <a:gradFill rotWithShape="0">
-          <a:gsLst>
-            <a:gs pos="0">
-              <a:schemeClr val="accent2">
-                <a:hueOff val="0"/>
-                <a:satOff val="0"/>
-                <a:lumOff val="0"/>
-                <a:alphaOff val="0"/>
-                <a:shade val="51000"/>
-                <a:satMod val="130000"/>
-              </a:schemeClr>
-            </a:gs>
-            <a:gs pos="80000">
-              <a:schemeClr val="accent2">
-                <a:hueOff val="0"/>
-                <a:satOff val="0"/>
-                <a:lumOff val="0"/>
-                <a:alphaOff val="0"/>
-                <a:shade val="93000"/>
-                <a:satMod val="130000"/>
-              </a:schemeClr>
-            </a:gs>
-            <a:gs pos="100000">
-              <a:schemeClr val="accent2">
-                <a:hueOff val="0"/>
-                <a:satOff val="0"/>
-                <a:lumOff val="0"/>
-                <a:alphaOff val="0"/>
-                <a:shade val="94000"/>
-                <a:satMod val="135000"/>
-              </a:schemeClr>
-            </a:gs>
-          </a:gsLst>
-          <a:lin ang="16200000" scaled="0"/>
-        </a:gradFill>
-        <a:ln>
-          <a:noFill/>
-        </a:ln>
-        <a:effectLst>
-          <a:outerShdw blurRad="40000" dist="23000" dir="5400000" rotWithShape="0">
-            <a:srgbClr val="000000">
-              <a:alpha val="35000"/>
-            </a:srgbClr>
-          </a:outerShdw>
-        </a:effectLst>
-        <a:scene3d>
-          <a:camera prst="orthographicFront">
-            <a:rot lat="0" lon="0" rev="0"/>
-          </a:camera>
-          <a:lightRig rig="threePt" dir="t">
-            <a:rot lat="0" lon="0" rev="1200000"/>
-          </a:lightRig>
-        </a:scene3d>
-        <a:sp3d>
-          <a:bevelT w="63500" h="25400"/>
-        </a:sp3d>
-      </dsp:spPr>
-      <dsp:style>
-        <a:lnRef idx="0">
-          <a:scrgbClr r="0" g="0" b="0"/>
-        </a:lnRef>
-        <a:fillRef idx="3">
-          <a:scrgbClr r="0" g="0" b="0"/>
-        </a:fillRef>
-        <a:effectRef idx="3">
-          <a:scrgbClr r="0" g="0" b="0"/>
-        </a:effectRef>
-        <a:fontRef idx="minor">
-          <a:schemeClr val="lt1"/>
-        </a:fontRef>
-      </dsp:style>
-      <dsp:txBody>
-        <a:bodyPr spcFirstLastPara="0" vert="horz" wrap="square" lIns="49530" tIns="49530" rIns="49530" bIns="49530" numCol="1" spcCol="1270" anchor="ctr" anchorCtr="0">
-          <a:noAutofit/>
-        </a:bodyPr>
-        <a:lstStyle/>
-        <a:p>
-          <a:pPr lvl="0" algn="ctr" defTabSz="577850">
-            <a:lnSpc>
-              <a:spcPct val="90000"/>
-            </a:lnSpc>
-            <a:spcBef>
-              <a:spcPct val="0"/>
-            </a:spcBef>
-            <a:spcAft>
-              <a:spcPct val="35000"/>
-            </a:spcAft>
-          </a:pPr>
-          <a:r>
-            <a:rPr lang="de-DE" sz="1300" kern="1200" dirty="0" smtClean="0"/>
-            <a:t>Gegner zerstören</a:t>
-          </a:r>
-          <a:endParaRPr lang="de-DE" sz="1300" kern="1200" dirty="0"/>
-        </a:p>
-      </dsp:txBody>
-      <dsp:txXfrm>
-        <a:off x="2877651" y="975515"/>
-        <a:ext cx="820206" cy="513681"/>
-      </dsp:txXfrm>
-    </dsp:sp>
-    <dsp:sp modelId="{D92A7E3E-0AF7-4958-A3AE-A24DD2F922A8}">
-      <dsp:nvSpPr>
-        <dsp:cNvPr id="0" name=""/>
-        <dsp:cNvSpPr/>
-      </dsp:nvSpPr>
-      <dsp:spPr>
-        <a:xfrm>
-          <a:off x="1460281" y="191654"/>
-          <a:ext cx="1879515" cy="1879515"/>
-        </a:xfrm>
-        <a:custGeom>
-          <a:avLst/>
-          <a:gdLst/>
-          <a:ahLst/>
-          <a:cxnLst/>
-          <a:rect l="0" t="0" r="0" b="0"/>
-          <a:pathLst>
-            <a:path>
-              <a:moveTo>
-                <a:pt x="1683981" y="1513582"/>
-              </a:moveTo>
-              <a:arcTo wR="939757" hR="939757" stAng="2258013" swAng="2688294"/>
-            </a:path>
-          </a:pathLst>
-        </a:custGeom>
-        <a:noFill/>
-        <a:ln w="9525" cap="flat" cmpd="sng" algn="ctr">
-          <a:solidFill>
-            <a:schemeClr val="accent2">
-              <a:hueOff val="0"/>
-              <a:satOff val="0"/>
-              <a:lumOff val="0"/>
-              <a:alphaOff val="0"/>
-            </a:schemeClr>
-          </a:solidFill>
-          <a:prstDash val="solid"/>
-          <a:tailEnd type="arrow"/>
-        </a:ln>
-        <a:effectLst/>
-      </dsp:spPr>
-      <dsp:style>
-        <a:lnRef idx="1">
-          <a:scrgbClr r="0" g="0" b="0"/>
-        </a:lnRef>
-        <a:fillRef idx="0">
-          <a:scrgbClr r="0" g="0" b="0"/>
-        </a:fillRef>
-        <a:effectRef idx="0">
-          <a:scrgbClr r="0" g="0" b="0"/>
-        </a:effectRef>
-        <a:fontRef idx="minor"/>
-      </dsp:style>
-    </dsp:sp>
-    <dsp:sp modelId="{572ADCD4-3005-40F1-BC9E-A1BF3103D95E}">
-      <dsp:nvSpPr>
-        <dsp:cNvPr id="0" name=""/>
-        <dsp:cNvSpPr/>
-      </dsp:nvSpPr>
-      <dsp:spPr>
-        <a:xfrm>
-          <a:off x="1428489" y="1880592"/>
-          <a:ext cx="875784" cy="569259"/>
-        </a:xfrm>
-        <a:prstGeom prst="roundRect">
-          <a:avLst/>
-        </a:prstGeom>
-        <a:gradFill rotWithShape="0">
-          <a:gsLst>
-            <a:gs pos="0">
-              <a:schemeClr val="accent2">
-                <a:hueOff val="0"/>
-                <a:satOff val="0"/>
-                <a:lumOff val="0"/>
-                <a:alphaOff val="0"/>
-                <a:shade val="51000"/>
-                <a:satMod val="130000"/>
-              </a:schemeClr>
-            </a:gs>
-            <a:gs pos="80000">
-              <a:schemeClr val="accent2">
-                <a:hueOff val="0"/>
-                <a:satOff val="0"/>
-                <a:lumOff val="0"/>
-                <a:alphaOff val="0"/>
-                <a:shade val="93000"/>
-                <a:satMod val="130000"/>
-              </a:schemeClr>
-            </a:gs>
-            <a:gs pos="100000">
-              <a:schemeClr val="accent2">
-                <a:hueOff val="0"/>
-                <a:satOff val="0"/>
-                <a:lumOff val="0"/>
-                <a:alphaOff val="0"/>
-                <a:shade val="94000"/>
-                <a:satMod val="135000"/>
-              </a:schemeClr>
-            </a:gs>
-          </a:gsLst>
-          <a:lin ang="16200000" scaled="0"/>
-        </a:gradFill>
-        <a:ln>
-          <a:noFill/>
-        </a:ln>
-        <a:effectLst>
-          <a:outerShdw blurRad="40000" dist="23000" dir="5400000" rotWithShape="0">
-            <a:srgbClr val="000000">
-              <a:alpha val="35000"/>
-            </a:srgbClr>
-          </a:outerShdw>
-        </a:effectLst>
-        <a:scene3d>
-          <a:camera prst="orthographicFront">
-            <a:rot lat="0" lon="0" rev="0"/>
-          </a:camera>
-          <a:lightRig rig="threePt" dir="t">
-            <a:rot lat="0" lon="0" rev="1200000"/>
-          </a:lightRig>
-        </a:scene3d>
-        <a:sp3d>
-          <a:bevelT w="63500" h="25400"/>
-        </a:sp3d>
-      </dsp:spPr>
-      <dsp:style>
-        <a:lnRef idx="0">
-          <a:scrgbClr r="0" g="0" b="0"/>
-        </a:lnRef>
-        <a:fillRef idx="3">
-          <a:scrgbClr r="0" g="0" b="0"/>
-        </a:fillRef>
-        <a:effectRef idx="3">
-          <a:scrgbClr r="0" g="0" b="0"/>
-        </a:effectRef>
-        <a:fontRef idx="minor">
-          <a:schemeClr val="lt1"/>
-        </a:fontRef>
-      </dsp:style>
-      <dsp:txBody>
-        <a:bodyPr spcFirstLastPara="0" vert="horz" wrap="square" lIns="49530" tIns="49530" rIns="49530" bIns="49530" numCol="1" spcCol="1270" anchor="ctr" anchorCtr="0">
-          <a:noAutofit/>
-        </a:bodyPr>
-        <a:lstStyle/>
-        <a:p>
-          <a:pPr lvl="0" algn="ctr" defTabSz="577850">
-            <a:lnSpc>
-              <a:spcPct val="90000"/>
-            </a:lnSpc>
-            <a:spcBef>
-              <a:spcPct val="0"/>
-            </a:spcBef>
-            <a:spcAft>
-              <a:spcPct val="35000"/>
-            </a:spcAft>
-          </a:pPr>
-          <a:r>
-            <a:rPr lang="de-DE" sz="1300" kern="1200" dirty="0" smtClean="0"/>
-            <a:t>Verfolgen</a:t>
-          </a:r>
-          <a:endParaRPr lang="de-DE" sz="1300" kern="1200" dirty="0"/>
-        </a:p>
-      </dsp:txBody>
-      <dsp:txXfrm>
-        <a:off x="1456278" y="1908381"/>
-        <a:ext cx="820206" cy="513681"/>
-      </dsp:txXfrm>
-    </dsp:sp>
-    <dsp:sp modelId="{C03B017B-D526-4168-B33C-86F58F8D2514}">
-      <dsp:nvSpPr>
-        <dsp:cNvPr id="0" name=""/>
-        <dsp:cNvSpPr/>
-      </dsp:nvSpPr>
-      <dsp:spPr>
-        <a:xfrm>
-          <a:off x="377156" y="174822"/>
-          <a:ext cx="1879515" cy="1879515"/>
-        </a:xfrm>
-        <a:custGeom>
-          <a:avLst/>
-          <a:gdLst/>
-          <a:ahLst/>
-          <a:cxnLst/>
-          <a:rect l="0" t="0" r="0" b="0"/>
-          <a:pathLst>
-            <a:path>
-              <a:moveTo>
-                <a:pt x="832303" y="1873351"/>
-              </a:moveTo>
-              <a:arcTo wR="939757" hR="939757" stAng="5793941" swAng="2681783"/>
-            </a:path>
-          </a:pathLst>
-        </a:custGeom>
-        <a:noFill/>
-        <a:ln w="9525" cap="flat" cmpd="sng" algn="ctr">
-          <a:solidFill>
-            <a:schemeClr val="accent2">
-              <a:hueOff val="0"/>
-              <a:satOff val="0"/>
-              <a:lumOff val="0"/>
-              <a:alphaOff val="0"/>
-            </a:schemeClr>
-          </a:solidFill>
-          <a:prstDash val="solid"/>
-          <a:tailEnd type="arrow"/>
-        </a:ln>
-        <a:effectLst/>
-      </dsp:spPr>
-      <dsp:style>
-        <a:lnRef idx="1">
-          <a:scrgbClr r="0" g="0" b="0"/>
-        </a:lnRef>
-        <a:fillRef idx="0">
-          <a:scrgbClr r="0" g="0" b="0"/>
-        </a:fillRef>
-        <a:effectRef idx="0">
-          <a:scrgbClr r="0" g="0" b="0"/>
-        </a:effectRef>
-        <a:fontRef idx="minor"/>
-      </dsp:style>
-    </dsp:sp>
-    <dsp:sp modelId="{24BA29C2-1A84-4723-A7B6-2207A218A271}">
-      <dsp:nvSpPr>
-        <dsp:cNvPr id="0" name=""/>
-        <dsp:cNvSpPr/>
-      </dsp:nvSpPr>
-      <dsp:spPr>
-        <a:xfrm>
-          <a:off x="0" y="947727"/>
-          <a:ext cx="875784" cy="569259"/>
-        </a:xfrm>
-        <a:prstGeom prst="roundRect">
-          <a:avLst/>
-        </a:prstGeom>
-        <a:gradFill rotWithShape="0">
-          <a:gsLst>
-            <a:gs pos="0">
-              <a:schemeClr val="accent2">
-                <a:hueOff val="0"/>
-                <a:satOff val="0"/>
-                <a:lumOff val="0"/>
-                <a:alphaOff val="0"/>
-                <a:shade val="51000"/>
-                <a:satMod val="130000"/>
-              </a:schemeClr>
-            </a:gs>
-            <a:gs pos="80000">
-              <a:schemeClr val="accent2">
-                <a:hueOff val="0"/>
-                <a:satOff val="0"/>
-                <a:lumOff val="0"/>
-                <a:alphaOff val="0"/>
-                <a:shade val="93000"/>
-                <a:satMod val="130000"/>
-              </a:schemeClr>
-            </a:gs>
-            <a:gs pos="100000">
-              <a:schemeClr val="accent2">
-                <a:hueOff val="0"/>
-                <a:satOff val="0"/>
-                <a:lumOff val="0"/>
-                <a:alphaOff val="0"/>
-                <a:shade val="94000"/>
-                <a:satMod val="135000"/>
-              </a:schemeClr>
-            </a:gs>
-          </a:gsLst>
-          <a:lin ang="16200000" scaled="0"/>
-        </a:gradFill>
-        <a:ln>
-          <a:noFill/>
-        </a:ln>
-        <a:effectLst>
-          <a:outerShdw blurRad="40000" dist="23000" dir="5400000" rotWithShape="0">
-            <a:srgbClr val="000000">
-              <a:alpha val="35000"/>
-            </a:srgbClr>
-          </a:outerShdw>
-        </a:effectLst>
-        <a:scene3d>
-          <a:camera prst="orthographicFront">
-            <a:rot lat="0" lon="0" rev="0"/>
-          </a:camera>
-          <a:lightRig rig="threePt" dir="t">
-            <a:rot lat="0" lon="0" rev="1200000"/>
-          </a:lightRig>
-        </a:scene3d>
-        <a:sp3d>
-          <a:bevelT w="63500" h="25400"/>
-        </a:sp3d>
-      </dsp:spPr>
-      <dsp:style>
-        <a:lnRef idx="0">
-          <a:scrgbClr r="0" g="0" b="0"/>
-        </a:lnRef>
-        <a:fillRef idx="3">
-          <a:scrgbClr r="0" g="0" b="0"/>
-        </a:fillRef>
-        <a:effectRef idx="3">
-          <a:scrgbClr r="0" g="0" b="0"/>
-        </a:effectRef>
-        <a:fontRef idx="minor">
-          <a:schemeClr val="lt1"/>
-        </a:fontRef>
-      </dsp:style>
-      <dsp:txBody>
-        <a:bodyPr spcFirstLastPara="0" vert="horz" wrap="square" lIns="49530" tIns="49530" rIns="49530" bIns="49530" numCol="1" spcCol="1270" anchor="ctr" anchorCtr="0">
-          <a:noAutofit/>
-        </a:bodyPr>
-        <a:lstStyle/>
-        <a:p>
-          <a:pPr lvl="0" algn="ctr" defTabSz="577850">
-            <a:lnSpc>
-              <a:spcPct val="90000"/>
-            </a:lnSpc>
-            <a:spcBef>
-              <a:spcPct val="0"/>
-            </a:spcBef>
-            <a:spcAft>
-              <a:spcPct val="35000"/>
-            </a:spcAft>
-          </a:pPr>
-          <a:r>
-            <a:rPr lang="de-DE" sz="1300" kern="1200" dirty="0" smtClean="0"/>
-            <a:t>Vorrücken</a:t>
-          </a:r>
-          <a:endParaRPr lang="de-DE" sz="1300" kern="1200" dirty="0"/>
-        </a:p>
-      </dsp:txBody>
-      <dsp:txXfrm>
-        <a:off x="27789" y="975516"/>
-        <a:ext cx="820206" cy="513681"/>
-      </dsp:txXfrm>
-    </dsp:sp>
-    <dsp:sp modelId="{F643DEB2-262E-45F6-88E0-83A1AB099C26}">
-      <dsp:nvSpPr>
-        <dsp:cNvPr id="0" name=""/>
-        <dsp:cNvSpPr/>
-      </dsp:nvSpPr>
-      <dsp:spPr>
-        <a:xfrm>
-          <a:off x="382149" y="393093"/>
-          <a:ext cx="1879515" cy="1879515"/>
-        </a:xfrm>
-        <a:custGeom>
-          <a:avLst/>
-          <a:gdLst/>
-          <a:ahLst/>
-          <a:cxnLst/>
-          <a:rect l="0" t="0" r="0" b="0"/>
-          <a:pathLst>
-            <a:path>
-              <a:moveTo>
-                <a:pt x="196816" y="364272"/>
-              </a:moveTo>
-              <a:arcTo wR="939757" hR="939757" stAng="13065691" swAng="2728001"/>
-            </a:path>
-          </a:pathLst>
-        </a:custGeom>
-        <a:noFill/>
-        <a:ln w="9525" cap="flat" cmpd="sng" algn="ctr">
-          <a:solidFill>
-            <a:schemeClr val="accent2">
-              <a:hueOff val="0"/>
-              <a:satOff val="0"/>
-              <a:lumOff val="0"/>
-              <a:alphaOff val="0"/>
-            </a:schemeClr>
-          </a:solidFill>
-          <a:prstDash val="solid"/>
-          <a:tailEnd type="arrow"/>
-        </a:ln>
-        <a:effectLst/>
-      </dsp:spPr>
-      <dsp:style>
-        <a:lnRef idx="1">
-          <a:scrgbClr r="0" g="0" b="0"/>
-        </a:lnRef>
-        <a:fillRef idx="0">
-          <a:scrgbClr r="0" g="0" b="0"/>
-        </a:fillRef>
-        <a:effectRef idx="0">
-          <a:scrgbClr r="0" g="0" b="0"/>
-        </a:effectRef>
-        <a:fontRef idx="minor"/>
-      </dsp:style>
-    </dsp:sp>
   </dsp:spTree>
 </dsp:drawing>
 </file>
@@ -6362,670 +5196,6 @@
       <dsp:cNvGrpSpPr/>
     </dsp:nvGrpSpPr>
     <dsp:grpSpPr/>
-    <dsp:sp modelId="{354449BB-0B46-4C11-9134-8DB5FB2F99C6}">
-      <dsp:nvSpPr>
-        <dsp:cNvPr id="0" name=""/>
-        <dsp:cNvSpPr/>
-      </dsp:nvSpPr>
-      <dsp:spPr>
-        <a:xfrm>
-          <a:off x="1433125" y="0"/>
-          <a:ext cx="875784" cy="569259"/>
-        </a:xfrm>
-        <a:prstGeom prst="roundRect">
-          <a:avLst/>
-        </a:prstGeom>
-        <a:gradFill rotWithShape="0">
-          <a:gsLst>
-            <a:gs pos="0">
-              <a:schemeClr val="accent2">
-                <a:hueOff val="0"/>
-                <a:satOff val="0"/>
-                <a:lumOff val="0"/>
-                <a:alphaOff val="0"/>
-                <a:shade val="51000"/>
-                <a:satMod val="130000"/>
-              </a:schemeClr>
-            </a:gs>
-            <a:gs pos="80000">
-              <a:schemeClr val="accent2">
-                <a:hueOff val="0"/>
-                <a:satOff val="0"/>
-                <a:lumOff val="0"/>
-                <a:alphaOff val="0"/>
-                <a:shade val="93000"/>
-                <a:satMod val="130000"/>
-              </a:schemeClr>
-            </a:gs>
-            <a:gs pos="100000">
-              <a:schemeClr val="accent2">
-                <a:hueOff val="0"/>
-                <a:satOff val="0"/>
-                <a:lumOff val="0"/>
-                <a:alphaOff val="0"/>
-                <a:shade val="94000"/>
-                <a:satMod val="135000"/>
-              </a:schemeClr>
-            </a:gs>
-          </a:gsLst>
-          <a:lin ang="16200000" scaled="0"/>
-        </a:gradFill>
-        <a:ln>
-          <a:noFill/>
-        </a:ln>
-        <a:effectLst>
-          <a:outerShdw blurRad="40000" dist="23000" dir="5400000" rotWithShape="0">
-            <a:srgbClr val="000000">
-              <a:alpha val="35000"/>
-            </a:srgbClr>
-          </a:outerShdw>
-        </a:effectLst>
-        <a:scene3d>
-          <a:camera prst="orthographicFront">
-            <a:rot lat="0" lon="0" rev="0"/>
-          </a:camera>
-          <a:lightRig rig="threePt" dir="t">
-            <a:rot lat="0" lon="0" rev="1200000"/>
-          </a:lightRig>
-        </a:scene3d>
-        <a:sp3d>
-          <a:bevelT w="63500" h="25400"/>
-        </a:sp3d>
-      </dsp:spPr>
-      <dsp:style>
-        <a:lnRef idx="0">
-          <a:scrgbClr r="0" g="0" b="0"/>
-        </a:lnRef>
-        <a:fillRef idx="3">
-          <a:scrgbClr r="0" g="0" b="0"/>
-        </a:fillRef>
-        <a:effectRef idx="3">
-          <a:scrgbClr r="0" g="0" b="0"/>
-        </a:effectRef>
-        <a:fontRef idx="minor">
-          <a:schemeClr val="lt1"/>
-        </a:fontRef>
-      </dsp:style>
-      <dsp:txBody>
-        <a:bodyPr spcFirstLastPara="0" vert="horz" wrap="square" lIns="49530" tIns="49530" rIns="49530" bIns="49530" numCol="1" spcCol="1270" anchor="ctr" anchorCtr="0">
-          <a:noAutofit/>
-        </a:bodyPr>
-        <a:lstStyle/>
-        <a:p>
-          <a:pPr lvl="0" algn="ctr" defTabSz="577850">
-            <a:lnSpc>
-              <a:spcPct val="90000"/>
-            </a:lnSpc>
-            <a:spcBef>
-              <a:spcPct val="0"/>
-            </a:spcBef>
-            <a:spcAft>
-              <a:spcPct val="35000"/>
-            </a:spcAft>
-          </a:pPr>
-          <a:r>
-            <a:rPr lang="de-DE" sz="1300" kern="1200" dirty="0" smtClean="0"/>
-            <a:t>Zum Gegner</a:t>
-          </a:r>
-          <a:endParaRPr lang="de-DE" sz="1300" kern="1200" dirty="0"/>
-        </a:p>
-      </dsp:txBody>
-      <dsp:txXfrm>
-        <a:off x="1460914" y="27789"/>
-        <a:ext cx="820206" cy="513681"/>
-      </dsp:txXfrm>
-    </dsp:sp>
-    <dsp:sp modelId="{C717F32B-C9D9-4405-87E8-96F537F320D8}">
-      <dsp:nvSpPr>
-        <dsp:cNvPr id="0" name=""/>
-        <dsp:cNvSpPr/>
-      </dsp:nvSpPr>
-      <dsp:spPr>
-        <a:xfrm>
-          <a:off x="1458157" y="381766"/>
-          <a:ext cx="1879515" cy="1879515"/>
-        </a:xfrm>
-        <a:custGeom>
-          <a:avLst/>
-          <a:gdLst/>
-          <a:ahLst/>
-          <a:cxnLst/>
-          <a:rect l="0" t="0" r="0" b="0"/>
-          <a:pathLst>
-            <a:path>
-              <a:moveTo>
-                <a:pt x="1071127" y="9227"/>
-              </a:moveTo>
-              <a:arcTo wR="939757" hR="939757" stAng="16682148" swAng="2703334"/>
-            </a:path>
-          </a:pathLst>
-        </a:custGeom>
-        <a:noFill/>
-        <a:ln w="9525" cap="flat" cmpd="sng" algn="ctr">
-          <a:solidFill>
-            <a:schemeClr val="accent2">
-              <a:hueOff val="0"/>
-              <a:satOff val="0"/>
-              <a:lumOff val="0"/>
-              <a:alphaOff val="0"/>
-            </a:schemeClr>
-          </a:solidFill>
-          <a:prstDash val="solid"/>
-          <a:tailEnd type="arrow"/>
-        </a:ln>
-        <a:effectLst/>
-      </dsp:spPr>
-      <dsp:style>
-        <a:lnRef idx="1">
-          <a:scrgbClr r="0" g="0" b="0"/>
-        </a:lnRef>
-        <a:fillRef idx="0">
-          <a:scrgbClr r="0" g="0" b="0"/>
-        </a:fillRef>
-        <a:effectRef idx="0">
-          <a:scrgbClr r="0" g="0" b="0"/>
-        </a:effectRef>
-        <a:fontRef idx="minor"/>
-      </dsp:style>
-    </dsp:sp>
-    <dsp:sp modelId="{4529D1E9-320E-48D5-BC65-8DB29EBF18BF}">
-      <dsp:nvSpPr>
-        <dsp:cNvPr id="0" name=""/>
-        <dsp:cNvSpPr/>
-      </dsp:nvSpPr>
-      <dsp:spPr>
-        <a:xfrm>
-          <a:off x="2849862" y="947726"/>
-          <a:ext cx="875784" cy="569259"/>
-        </a:xfrm>
-        <a:prstGeom prst="roundRect">
-          <a:avLst/>
-        </a:prstGeom>
-        <a:gradFill rotWithShape="0">
-          <a:gsLst>
-            <a:gs pos="0">
-              <a:schemeClr val="accent2">
-                <a:hueOff val="0"/>
-                <a:satOff val="0"/>
-                <a:lumOff val="0"/>
-                <a:alphaOff val="0"/>
-                <a:shade val="51000"/>
-                <a:satMod val="130000"/>
-              </a:schemeClr>
-            </a:gs>
-            <a:gs pos="80000">
-              <a:schemeClr val="accent2">
-                <a:hueOff val="0"/>
-                <a:satOff val="0"/>
-                <a:lumOff val="0"/>
-                <a:alphaOff val="0"/>
-                <a:shade val="93000"/>
-                <a:satMod val="130000"/>
-              </a:schemeClr>
-            </a:gs>
-            <a:gs pos="100000">
-              <a:schemeClr val="accent2">
-                <a:hueOff val="0"/>
-                <a:satOff val="0"/>
-                <a:lumOff val="0"/>
-                <a:alphaOff val="0"/>
-                <a:shade val="94000"/>
-                <a:satMod val="135000"/>
-              </a:schemeClr>
-            </a:gs>
-          </a:gsLst>
-          <a:lin ang="16200000" scaled="0"/>
-        </a:gradFill>
-        <a:ln>
-          <a:noFill/>
-        </a:ln>
-        <a:effectLst>
-          <a:outerShdw blurRad="40000" dist="23000" dir="5400000" rotWithShape="0">
-            <a:srgbClr val="000000">
-              <a:alpha val="35000"/>
-            </a:srgbClr>
-          </a:outerShdw>
-        </a:effectLst>
-        <a:scene3d>
-          <a:camera prst="orthographicFront">
-            <a:rot lat="0" lon="0" rev="0"/>
-          </a:camera>
-          <a:lightRig rig="threePt" dir="t">
-            <a:rot lat="0" lon="0" rev="1200000"/>
-          </a:lightRig>
-        </a:scene3d>
-        <a:sp3d>
-          <a:bevelT w="63500" h="25400"/>
-        </a:sp3d>
-      </dsp:spPr>
-      <dsp:style>
-        <a:lnRef idx="0">
-          <a:scrgbClr r="0" g="0" b="0"/>
-        </a:lnRef>
-        <a:fillRef idx="3">
-          <a:scrgbClr r="0" g="0" b="0"/>
-        </a:fillRef>
-        <a:effectRef idx="3">
-          <a:scrgbClr r="0" g="0" b="0"/>
-        </a:effectRef>
-        <a:fontRef idx="minor">
-          <a:schemeClr val="lt1"/>
-        </a:fontRef>
-      </dsp:style>
-      <dsp:txBody>
-        <a:bodyPr spcFirstLastPara="0" vert="horz" wrap="square" lIns="49530" tIns="49530" rIns="49530" bIns="49530" numCol="1" spcCol="1270" anchor="ctr" anchorCtr="0">
-          <a:noAutofit/>
-        </a:bodyPr>
-        <a:lstStyle/>
-        <a:p>
-          <a:pPr lvl="0" algn="ctr" defTabSz="577850">
-            <a:lnSpc>
-              <a:spcPct val="90000"/>
-            </a:lnSpc>
-            <a:spcBef>
-              <a:spcPct val="0"/>
-            </a:spcBef>
-            <a:spcAft>
-              <a:spcPct val="35000"/>
-            </a:spcAft>
-          </a:pPr>
-          <a:r>
-            <a:rPr lang="de-DE" sz="1300" kern="1200" dirty="0" smtClean="0"/>
-            <a:t>Gegner zerstören</a:t>
-          </a:r>
-          <a:endParaRPr lang="de-DE" sz="1300" kern="1200" dirty="0"/>
-        </a:p>
-      </dsp:txBody>
-      <dsp:txXfrm>
-        <a:off x="2877651" y="975515"/>
-        <a:ext cx="820206" cy="513681"/>
-      </dsp:txXfrm>
-    </dsp:sp>
-    <dsp:sp modelId="{D92A7E3E-0AF7-4958-A3AE-A24DD2F922A8}">
-      <dsp:nvSpPr>
-        <dsp:cNvPr id="0" name=""/>
-        <dsp:cNvSpPr/>
-      </dsp:nvSpPr>
-      <dsp:spPr>
-        <a:xfrm>
-          <a:off x="1460281" y="191654"/>
-          <a:ext cx="1879515" cy="1879515"/>
-        </a:xfrm>
-        <a:custGeom>
-          <a:avLst/>
-          <a:gdLst/>
-          <a:ahLst/>
-          <a:cxnLst/>
-          <a:rect l="0" t="0" r="0" b="0"/>
-          <a:pathLst>
-            <a:path>
-              <a:moveTo>
-                <a:pt x="1683981" y="1513582"/>
-              </a:moveTo>
-              <a:arcTo wR="939757" hR="939757" stAng="2258013" swAng="2688294"/>
-            </a:path>
-          </a:pathLst>
-        </a:custGeom>
-        <a:noFill/>
-        <a:ln w="9525" cap="flat" cmpd="sng" algn="ctr">
-          <a:solidFill>
-            <a:schemeClr val="accent2">
-              <a:hueOff val="0"/>
-              <a:satOff val="0"/>
-              <a:lumOff val="0"/>
-              <a:alphaOff val="0"/>
-            </a:schemeClr>
-          </a:solidFill>
-          <a:prstDash val="solid"/>
-          <a:tailEnd type="arrow"/>
-        </a:ln>
-        <a:effectLst/>
-      </dsp:spPr>
-      <dsp:style>
-        <a:lnRef idx="1">
-          <a:scrgbClr r="0" g="0" b="0"/>
-        </a:lnRef>
-        <a:fillRef idx="0">
-          <a:scrgbClr r="0" g="0" b="0"/>
-        </a:fillRef>
-        <a:effectRef idx="0">
-          <a:scrgbClr r="0" g="0" b="0"/>
-        </a:effectRef>
-        <a:fontRef idx="minor"/>
-      </dsp:style>
-    </dsp:sp>
-    <dsp:sp modelId="{572ADCD4-3005-40F1-BC9E-A1BF3103D95E}">
-      <dsp:nvSpPr>
-        <dsp:cNvPr id="0" name=""/>
-        <dsp:cNvSpPr/>
-      </dsp:nvSpPr>
-      <dsp:spPr>
-        <a:xfrm>
-          <a:off x="1428489" y="1880592"/>
-          <a:ext cx="875784" cy="569259"/>
-        </a:xfrm>
-        <a:prstGeom prst="roundRect">
-          <a:avLst/>
-        </a:prstGeom>
-        <a:gradFill rotWithShape="0">
-          <a:gsLst>
-            <a:gs pos="0">
-              <a:schemeClr val="accent2">
-                <a:hueOff val="0"/>
-                <a:satOff val="0"/>
-                <a:lumOff val="0"/>
-                <a:alphaOff val="0"/>
-                <a:shade val="51000"/>
-                <a:satMod val="130000"/>
-              </a:schemeClr>
-            </a:gs>
-            <a:gs pos="80000">
-              <a:schemeClr val="accent2">
-                <a:hueOff val="0"/>
-                <a:satOff val="0"/>
-                <a:lumOff val="0"/>
-                <a:alphaOff val="0"/>
-                <a:shade val="93000"/>
-                <a:satMod val="130000"/>
-              </a:schemeClr>
-            </a:gs>
-            <a:gs pos="100000">
-              <a:schemeClr val="accent2">
-                <a:hueOff val="0"/>
-                <a:satOff val="0"/>
-                <a:lumOff val="0"/>
-                <a:alphaOff val="0"/>
-                <a:shade val="94000"/>
-                <a:satMod val="135000"/>
-              </a:schemeClr>
-            </a:gs>
-          </a:gsLst>
-          <a:lin ang="16200000" scaled="0"/>
-        </a:gradFill>
-        <a:ln>
-          <a:noFill/>
-        </a:ln>
-        <a:effectLst>
-          <a:outerShdw blurRad="40000" dist="23000" dir="5400000" rotWithShape="0">
-            <a:srgbClr val="000000">
-              <a:alpha val="35000"/>
-            </a:srgbClr>
-          </a:outerShdw>
-        </a:effectLst>
-        <a:scene3d>
-          <a:camera prst="orthographicFront">
-            <a:rot lat="0" lon="0" rev="0"/>
-          </a:camera>
-          <a:lightRig rig="threePt" dir="t">
-            <a:rot lat="0" lon="0" rev="1200000"/>
-          </a:lightRig>
-        </a:scene3d>
-        <a:sp3d>
-          <a:bevelT w="63500" h="25400"/>
-        </a:sp3d>
-      </dsp:spPr>
-      <dsp:style>
-        <a:lnRef idx="0">
-          <a:scrgbClr r="0" g="0" b="0"/>
-        </a:lnRef>
-        <a:fillRef idx="3">
-          <a:scrgbClr r="0" g="0" b="0"/>
-        </a:fillRef>
-        <a:effectRef idx="3">
-          <a:scrgbClr r="0" g="0" b="0"/>
-        </a:effectRef>
-        <a:fontRef idx="minor">
-          <a:schemeClr val="lt1"/>
-        </a:fontRef>
-      </dsp:style>
-      <dsp:txBody>
-        <a:bodyPr spcFirstLastPara="0" vert="horz" wrap="square" lIns="49530" tIns="49530" rIns="49530" bIns="49530" numCol="1" spcCol="1270" anchor="ctr" anchorCtr="0">
-          <a:noAutofit/>
-        </a:bodyPr>
-        <a:lstStyle/>
-        <a:p>
-          <a:pPr lvl="0" algn="ctr" defTabSz="577850">
-            <a:lnSpc>
-              <a:spcPct val="90000"/>
-            </a:lnSpc>
-            <a:spcBef>
-              <a:spcPct val="0"/>
-            </a:spcBef>
-            <a:spcAft>
-              <a:spcPct val="35000"/>
-            </a:spcAft>
-          </a:pPr>
-          <a:r>
-            <a:rPr lang="de-DE" sz="1300" kern="1200" dirty="0" smtClean="0"/>
-            <a:t>Verfolgen</a:t>
-          </a:r>
-          <a:endParaRPr lang="de-DE" sz="1300" kern="1200" dirty="0"/>
-        </a:p>
-      </dsp:txBody>
-      <dsp:txXfrm>
-        <a:off x="1456278" y="1908381"/>
-        <a:ext cx="820206" cy="513681"/>
-      </dsp:txXfrm>
-    </dsp:sp>
-    <dsp:sp modelId="{C03B017B-D526-4168-B33C-86F58F8D2514}">
-      <dsp:nvSpPr>
-        <dsp:cNvPr id="0" name=""/>
-        <dsp:cNvSpPr/>
-      </dsp:nvSpPr>
-      <dsp:spPr>
-        <a:xfrm>
-          <a:off x="377156" y="174822"/>
-          <a:ext cx="1879515" cy="1879515"/>
-        </a:xfrm>
-        <a:custGeom>
-          <a:avLst/>
-          <a:gdLst/>
-          <a:ahLst/>
-          <a:cxnLst/>
-          <a:rect l="0" t="0" r="0" b="0"/>
-          <a:pathLst>
-            <a:path>
-              <a:moveTo>
-                <a:pt x="832303" y="1873351"/>
-              </a:moveTo>
-              <a:arcTo wR="939757" hR="939757" stAng="5793941" swAng="2681783"/>
-            </a:path>
-          </a:pathLst>
-        </a:custGeom>
-        <a:noFill/>
-        <a:ln w="9525" cap="flat" cmpd="sng" algn="ctr">
-          <a:solidFill>
-            <a:schemeClr val="accent2">
-              <a:hueOff val="0"/>
-              <a:satOff val="0"/>
-              <a:lumOff val="0"/>
-              <a:alphaOff val="0"/>
-            </a:schemeClr>
-          </a:solidFill>
-          <a:prstDash val="solid"/>
-          <a:tailEnd type="arrow"/>
-        </a:ln>
-        <a:effectLst/>
-      </dsp:spPr>
-      <dsp:style>
-        <a:lnRef idx="1">
-          <a:scrgbClr r="0" g="0" b="0"/>
-        </a:lnRef>
-        <a:fillRef idx="0">
-          <a:scrgbClr r="0" g="0" b="0"/>
-        </a:fillRef>
-        <a:effectRef idx="0">
-          <a:scrgbClr r="0" g="0" b="0"/>
-        </a:effectRef>
-        <a:fontRef idx="minor"/>
-      </dsp:style>
-    </dsp:sp>
-    <dsp:sp modelId="{24BA29C2-1A84-4723-A7B6-2207A218A271}">
-      <dsp:nvSpPr>
-        <dsp:cNvPr id="0" name=""/>
-        <dsp:cNvSpPr/>
-      </dsp:nvSpPr>
-      <dsp:spPr>
-        <a:xfrm>
-          <a:off x="0" y="947727"/>
-          <a:ext cx="875784" cy="569259"/>
-        </a:xfrm>
-        <a:prstGeom prst="roundRect">
-          <a:avLst/>
-        </a:prstGeom>
-        <a:gradFill rotWithShape="0">
-          <a:gsLst>
-            <a:gs pos="0">
-              <a:schemeClr val="accent2">
-                <a:hueOff val="0"/>
-                <a:satOff val="0"/>
-                <a:lumOff val="0"/>
-                <a:alphaOff val="0"/>
-                <a:shade val="51000"/>
-                <a:satMod val="130000"/>
-              </a:schemeClr>
-            </a:gs>
-            <a:gs pos="80000">
-              <a:schemeClr val="accent2">
-                <a:hueOff val="0"/>
-                <a:satOff val="0"/>
-                <a:lumOff val="0"/>
-                <a:alphaOff val="0"/>
-                <a:shade val="93000"/>
-                <a:satMod val="130000"/>
-              </a:schemeClr>
-            </a:gs>
-            <a:gs pos="100000">
-              <a:schemeClr val="accent2">
-                <a:hueOff val="0"/>
-                <a:satOff val="0"/>
-                <a:lumOff val="0"/>
-                <a:alphaOff val="0"/>
-                <a:shade val="94000"/>
-                <a:satMod val="135000"/>
-              </a:schemeClr>
-            </a:gs>
-          </a:gsLst>
-          <a:lin ang="16200000" scaled="0"/>
-        </a:gradFill>
-        <a:ln>
-          <a:noFill/>
-        </a:ln>
-        <a:effectLst>
-          <a:outerShdw blurRad="40000" dist="23000" dir="5400000" rotWithShape="0">
-            <a:srgbClr val="000000">
-              <a:alpha val="35000"/>
-            </a:srgbClr>
-          </a:outerShdw>
-        </a:effectLst>
-        <a:scene3d>
-          <a:camera prst="orthographicFront">
-            <a:rot lat="0" lon="0" rev="0"/>
-          </a:camera>
-          <a:lightRig rig="threePt" dir="t">
-            <a:rot lat="0" lon="0" rev="1200000"/>
-          </a:lightRig>
-        </a:scene3d>
-        <a:sp3d>
-          <a:bevelT w="63500" h="25400"/>
-        </a:sp3d>
-      </dsp:spPr>
-      <dsp:style>
-        <a:lnRef idx="0">
-          <a:scrgbClr r="0" g="0" b="0"/>
-        </a:lnRef>
-        <a:fillRef idx="3">
-          <a:scrgbClr r="0" g="0" b="0"/>
-        </a:fillRef>
-        <a:effectRef idx="3">
-          <a:scrgbClr r="0" g="0" b="0"/>
-        </a:effectRef>
-        <a:fontRef idx="minor">
-          <a:schemeClr val="lt1"/>
-        </a:fontRef>
-      </dsp:style>
-      <dsp:txBody>
-        <a:bodyPr spcFirstLastPara="0" vert="horz" wrap="square" lIns="49530" tIns="49530" rIns="49530" bIns="49530" numCol="1" spcCol="1270" anchor="ctr" anchorCtr="0">
-          <a:noAutofit/>
-        </a:bodyPr>
-        <a:lstStyle/>
-        <a:p>
-          <a:pPr lvl="0" algn="ctr" defTabSz="577850">
-            <a:lnSpc>
-              <a:spcPct val="90000"/>
-            </a:lnSpc>
-            <a:spcBef>
-              <a:spcPct val="0"/>
-            </a:spcBef>
-            <a:spcAft>
-              <a:spcPct val="35000"/>
-            </a:spcAft>
-          </a:pPr>
-          <a:r>
-            <a:rPr lang="de-DE" sz="1300" kern="1200" dirty="0" smtClean="0"/>
-            <a:t>Vorrücken</a:t>
-          </a:r>
-          <a:endParaRPr lang="de-DE" sz="1300" kern="1200" dirty="0"/>
-        </a:p>
-      </dsp:txBody>
-      <dsp:txXfrm>
-        <a:off x="27789" y="975516"/>
-        <a:ext cx="820206" cy="513681"/>
-      </dsp:txXfrm>
-    </dsp:sp>
-    <dsp:sp modelId="{F643DEB2-262E-45F6-88E0-83A1AB099C26}">
-      <dsp:nvSpPr>
-        <dsp:cNvPr id="0" name=""/>
-        <dsp:cNvSpPr/>
-      </dsp:nvSpPr>
-      <dsp:spPr>
-        <a:xfrm>
-          <a:off x="382149" y="393093"/>
-          <a:ext cx="1879515" cy="1879515"/>
-        </a:xfrm>
-        <a:custGeom>
-          <a:avLst/>
-          <a:gdLst/>
-          <a:ahLst/>
-          <a:cxnLst/>
-          <a:rect l="0" t="0" r="0" b="0"/>
-          <a:pathLst>
-            <a:path>
-              <a:moveTo>
-                <a:pt x="196816" y="364272"/>
-              </a:moveTo>
-              <a:arcTo wR="939757" hR="939757" stAng="13065691" swAng="2728001"/>
-            </a:path>
-          </a:pathLst>
-        </a:custGeom>
-        <a:noFill/>
-        <a:ln w="9525" cap="flat" cmpd="sng" algn="ctr">
-          <a:solidFill>
-            <a:schemeClr val="accent2">
-              <a:hueOff val="0"/>
-              <a:satOff val="0"/>
-              <a:lumOff val="0"/>
-              <a:alphaOff val="0"/>
-            </a:schemeClr>
-          </a:solidFill>
-          <a:prstDash val="solid"/>
-          <a:tailEnd type="arrow"/>
-        </a:ln>
-        <a:effectLst/>
-      </dsp:spPr>
-      <dsp:style>
-        <a:lnRef idx="1">
-          <a:scrgbClr r="0" g="0" b="0"/>
-        </a:lnRef>
-        <a:fillRef idx="0">
-          <a:scrgbClr r="0" g="0" b="0"/>
-        </a:fillRef>
-        <a:effectRef idx="0">
-          <a:scrgbClr r="0" g="0" b="0"/>
-        </a:effectRef>
-        <a:fontRef idx="minor"/>
-      </dsp:style>
-    </dsp:sp>
   </dsp:spTree>
 </dsp:drawing>
 </file>

</xml_diff>